<commit_message>
modi: Makefile modified and in progress about ppt
</commit_message>
<xml_diff>
--- a/OOP_Project02_Team07.pptx
+++ b/OOP_Project02_Team07.pptx
@@ -3341,8 +3341,8 @@
         </p:nvSpPr>
         <p:spPr>
           <a:xfrm>
-            <a:off x="264784" y="174172"/>
-            <a:ext cx="5570756" cy="704873"/>
+            <a:off x="17043" y="0"/>
+            <a:ext cx="6827510" cy="704873"/>
           </a:xfrm>
           <a:prstGeom prst="rect">
             <a:avLst/>
@@ -3375,7 +3375,7 @@
                 <a:ea typeface="함초롬바탕" panose="02030504000101010101" pitchFamily="18" charset="-127"/>
                 <a:cs typeface="Times New Roman" panose="02020603050405020304" pitchFamily="18" charset="0"/>
               </a:rPr>
-              <a:t>Infinite Int Calculator Report</a:t>
+              <a:t>Infinite Int Calculator Presentation</a:t>
             </a:r>
             <a:endParaRPr lang="ko-KR" altLang="ko-KR" sz="2800" dirty="0">
               <a:solidFill>
@@ -3406,7 +3406,7 @@
         <p:spPr>
           <a:xfrm>
             <a:off x="-6276" y="1496724"/>
-            <a:ext cx="503818" cy="5361276"/>
+            <a:ext cx="503818" cy="5035802"/>
           </a:xfrm>
           <a:prstGeom prst="rect">
             <a:avLst/>
@@ -3421,7 +3421,7 @@
           <a:p>
             <a:pPr algn="r" latinLnBrk="0">
               <a:lnSpc>
-                <a:spcPct val="160000"/>
+                <a:spcPct val="150000"/>
               </a:lnSpc>
               <a:tabLst>
                 <a:tab pos="1630680" algn="l"/>
@@ -3445,7 +3445,7 @@
           <a:p>
             <a:pPr algn="r" latinLnBrk="0">
               <a:lnSpc>
-                <a:spcPct val="160000"/>
+                <a:spcPct val="150000"/>
               </a:lnSpc>
               <a:tabLst>
                 <a:tab pos="1630680" algn="l"/>
@@ -3468,7 +3468,7 @@
           <a:p>
             <a:pPr algn="r" latinLnBrk="0">
               <a:lnSpc>
-                <a:spcPct val="160000"/>
+                <a:spcPct val="150000"/>
               </a:lnSpc>
               <a:tabLst>
                 <a:tab pos="1630680" algn="l"/>
@@ -3492,7 +3492,7 @@
           <a:p>
             <a:pPr algn="r" latinLnBrk="0">
               <a:lnSpc>
-                <a:spcPct val="160000"/>
+                <a:spcPct val="150000"/>
               </a:lnSpc>
               <a:tabLst>
                 <a:tab pos="1630680" algn="l"/>
@@ -3515,7 +3515,7 @@
           <a:p>
             <a:pPr algn="r" latinLnBrk="0">
               <a:lnSpc>
-                <a:spcPct val="160000"/>
+                <a:spcPct val="150000"/>
               </a:lnSpc>
               <a:tabLst>
                 <a:tab pos="1630680" algn="l"/>
@@ -3539,7 +3539,7 @@
           <a:p>
             <a:pPr algn="r" latinLnBrk="0">
               <a:lnSpc>
-                <a:spcPct val="160000"/>
+                <a:spcPct val="150000"/>
               </a:lnSpc>
               <a:tabLst>
                 <a:tab pos="1630680" algn="l"/>
@@ -3562,7 +3562,7 @@
           <a:p>
             <a:pPr algn="r" latinLnBrk="0">
               <a:lnSpc>
-                <a:spcPct val="160000"/>
+                <a:spcPct val="150000"/>
               </a:lnSpc>
               <a:tabLst>
                 <a:tab pos="1630680" algn="l"/>
@@ -3586,7 +3586,7 @@
           <a:p>
             <a:pPr algn="r" latinLnBrk="0">
               <a:lnSpc>
-                <a:spcPct val="160000"/>
+                <a:spcPct val="150000"/>
               </a:lnSpc>
               <a:tabLst>
                 <a:tab pos="1630680" algn="l"/>
@@ -3610,7 +3610,7 @@
           <a:p>
             <a:pPr algn="r" latinLnBrk="0">
               <a:lnSpc>
-                <a:spcPct val="160000"/>
+                <a:spcPct val="150000"/>
               </a:lnSpc>
               <a:tabLst>
                 <a:tab pos="1630680" algn="l"/>
@@ -3633,7 +3633,7 @@
           <a:p>
             <a:pPr algn="r" latinLnBrk="0">
               <a:lnSpc>
-                <a:spcPct val="160000"/>
+                <a:spcPct val="150000"/>
               </a:lnSpc>
               <a:tabLst>
                 <a:tab pos="1630680" algn="l"/>
@@ -3657,7 +3657,7 @@
           <a:p>
             <a:pPr algn="r" latinLnBrk="0">
               <a:lnSpc>
-                <a:spcPct val="160000"/>
+                <a:spcPct val="150000"/>
               </a:lnSpc>
               <a:tabLst>
                 <a:tab pos="1630680" algn="l"/>
@@ -3681,7 +3681,7 @@
           <a:p>
             <a:pPr algn="r" latinLnBrk="0">
               <a:lnSpc>
-                <a:spcPct val="160000"/>
+                <a:spcPct val="150000"/>
               </a:lnSpc>
               <a:tabLst>
                 <a:tab pos="1630680" algn="l"/>
@@ -3730,7 +3730,7 @@
         </p:nvCxnSpPr>
         <p:spPr>
           <a:xfrm>
-            <a:off x="551330" y="1519519"/>
+            <a:off x="536816" y="1519519"/>
             <a:ext cx="0" cy="5351929"/>
           </a:xfrm>
           <a:prstGeom prst="line">
@@ -3759,6 +3759,1001 @@
           </a:fontRef>
         </p:style>
       </p:cxnSp>
+      <p:sp>
+        <p:nvSpPr>
+          <p:cNvPr id="10" name="TextBox 9">
+            <a:extLst>
+              <a:ext uri="{FF2B5EF4-FFF2-40B4-BE49-F238E27FC236}">
+                <a16:creationId xmlns:a16="http://schemas.microsoft.com/office/drawing/2014/main" id="{5505C672-E1E0-7DF4-4E3C-3B02260F67F1}"/>
+              </a:ext>
+            </a:extLst>
+          </p:cNvPr>
+          <p:cNvSpPr txBox="1"/>
+          <p:nvPr/>
+        </p:nvSpPr>
+        <p:spPr>
+          <a:xfrm>
+            <a:off x="551330" y="1519519"/>
+            <a:ext cx="6293223" cy="5035802"/>
+          </a:xfrm>
+          <a:prstGeom prst="rect">
+            <a:avLst/>
+          </a:prstGeom>
+          <a:noFill/>
+        </p:spPr>
+        <p:txBody>
+          <a:bodyPr wrap="square" rtlCol="0">
+            <a:spAutoFit/>
+          </a:bodyPr>
+          <a:lstStyle/>
+          <a:p>
+            <a:pPr>
+              <a:lnSpc>
+                <a:spcPct val="150000"/>
+              </a:lnSpc>
+            </a:pPr>
+            <a:r>
+              <a:rPr lang="en-US" altLang="ko-KR" sz="1800" dirty="0">
+                <a:solidFill>
+                  <a:srgbClr val="499CD5"/>
+                </a:solidFill>
+                <a:effectLst/>
+                <a:latin typeface="D2Coding" panose="020B0609020101020101" pitchFamily="49" charset="-127"/>
+                <a:ea typeface="D2Coding" panose="020B0609020101020101" pitchFamily="49" charset="-127"/>
+              </a:rPr>
+              <a:t>int </a:t>
+            </a:r>
+            <a:r>
+              <a:rPr lang="en-US" altLang="ko-KR" sz="1800" dirty="0">
+                <a:solidFill>
+                  <a:srgbClr val="DCDCAA"/>
+                </a:solidFill>
+                <a:effectLst/>
+                <a:latin typeface="D2Coding" panose="020B0609020101020101" pitchFamily="49" charset="-127"/>
+                <a:ea typeface="D2Coding" panose="020B0609020101020101" pitchFamily="49" charset="-127"/>
+              </a:rPr>
+              <a:t>main</a:t>
+            </a:r>
+            <a:r>
+              <a:rPr lang="en-US" altLang="ko-KR" sz="1800" dirty="0">
+                <a:solidFill>
+                  <a:srgbClr val="D4D4D4"/>
+                </a:solidFill>
+                <a:effectLst/>
+                <a:latin typeface="D2Coding" panose="020B0609020101020101" pitchFamily="49" charset="-127"/>
+                <a:ea typeface="D2Coding" panose="020B0609020101020101" pitchFamily="49" charset="-127"/>
+              </a:rPr>
+              <a:t>(</a:t>
+            </a:r>
+            <a:r>
+              <a:rPr lang="en-US" altLang="ko-KR" sz="1800" dirty="0">
+                <a:solidFill>
+                  <a:srgbClr val="499CD5"/>
+                </a:solidFill>
+                <a:effectLst/>
+                <a:latin typeface="D2Coding" panose="020B0609020101020101" pitchFamily="49" charset="-127"/>
+                <a:ea typeface="D2Coding" panose="020B0609020101020101" pitchFamily="49" charset="-127"/>
+              </a:rPr>
+              <a:t>void</a:t>
+            </a:r>
+            <a:r>
+              <a:rPr lang="en-US" altLang="ko-KR" sz="1800" dirty="0">
+                <a:solidFill>
+                  <a:srgbClr val="D4D4D4"/>
+                </a:solidFill>
+                <a:effectLst/>
+                <a:latin typeface="D2Coding" panose="020B0609020101020101" pitchFamily="49" charset="-127"/>
+                <a:ea typeface="D2Coding" panose="020B0609020101020101" pitchFamily="49" charset="-127"/>
+              </a:rPr>
+              <a:t>)</a:t>
+            </a:r>
+            <a:br>
+              <a:rPr lang="en-US" altLang="ko-KR" sz="1800" dirty="0">
+                <a:solidFill>
+                  <a:srgbClr val="D4D4D4"/>
+                </a:solidFill>
+                <a:effectLst/>
+                <a:latin typeface="D2Coding" panose="020B0609020101020101" pitchFamily="49" charset="-127"/>
+                <a:ea typeface="D2Coding" panose="020B0609020101020101" pitchFamily="49" charset="-127"/>
+              </a:rPr>
+            </a:br>
+            <a:r>
+              <a:rPr lang="en-US" altLang="ko-KR" sz="1800" dirty="0">
+                <a:solidFill>
+                  <a:srgbClr val="D4D4D4"/>
+                </a:solidFill>
+                <a:effectLst/>
+                <a:latin typeface="D2Coding" panose="020B0609020101020101" pitchFamily="49" charset="-127"/>
+                <a:ea typeface="D2Coding" panose="020B0609020101020101" pitchFamily="49" charset="-127"/>
+              </a:rPr>
+              <a:t>{</a:t>
+            </a:r>
+            <a:br>
+              <a:rPr lang="en-US" altLang="ko-KR" sz="1800" dirty="0">
+                <a:solidFill>
+                  <a:srgbClr val="D4D4D4"/>
+                </a:solidFill>
+                <a:effectLst/>
+                <a:latin typeface="D2Coding" panose="020B0609020101020101" pitchFamily="49" charset="-127"/>
+                <a:ea typeface="D2Coding" panose="020B0609020101020101" pitchFamily="49" charset="-127"/>
+              </a:rPr>
+            </a:br>
+            <a:r>
+              <a:rPr lang="en-US" altLang="ko-KR" sz="1800" dirty="0">
+                <a:solidFill>
+                  <a:srgbClr val="D4D4D4"/>
+                </a:solidFill>
+                <a:effectLst/>
+                <a:latin typeface="D2Coding" panose="020B0609020101020101" pitchFamily="49" charset="-127"/>
+                <a:ea typeface="D2Coding" panose="020B0609020101020101" pitchFamily="49" charset="-127"/>
+              </a:rPr>
+              <a:t>    </a:t>
+            </a:r>
+            <a:r>
+              <a:rPr lang="en-US" altLang="ko-KR" sz="1800" dirty="0">
+                <a:solidFill>
+                  <a:srgbClr val="4CC9B0"/>
+                </a:solidFill>
+                <a:effectLst/>
+                <a:latin typeface="D2Coding" panose="020B0609020101020101" pitchFamily="49" charset="-127"/>
+                <a:ea typeface="D2Coding" panose="020B0609020101020101" pitchFamily="49" charset="-127"/>
+              </a:rPr>
+              <a:t>Team </a:t>
+            </a:r>
+            <a:r>
+              <a:rPr lang="en-US" altLang="ko-KR" sz="1800" dirty="0">
+                <a:solidFill>
+                  <a:srgbClr val="94DBFD"/>
+                </a:solidFill>
+                <a:effectLst/>
+                <a:latin typeface="D2Coding" panose="020B0609020101020101" pitchFamily="49" charset="-127"/>
+                <a:ea typeface="D2Coding" panose="020B0609020101020101" pitchFamily="49" charset="-127"/>
+              </a:rPr>
+              <a:t>team07 </a:t>
+            </a:r>
+            <a:r>
+              <a:rPr lang="en-US" altLang="ko-KR" sz="1800" dirty="0">
+                <a:solidFill>
+                  <a:srgbClr val="D4D4D4"/>
+                </a:solidFill>
+                <a:effectLst/>
+                <a:latin typeface="D2Coding" panose="020B0609020101020101" pitchFamily="49" charset="-127"/>
+                <a:ea typeface="D2Coding" panose="020B0609020101020101" pitchFamily="49" charset="-127"/>
+              </a:rPr>
+              <a:t>= </a:t>
+            </a:r>
+            <a:r>
+              <a:rPr lang="en-US" altLang="ko-KR" sz="1800" dirty="0">
+                <a:solidFill>
+                  <a:srgbClr val="499CD5"/>
+                </a:solidFill>
+                <a:effectLst/>
+                <a:latin typeface="D2Coding" panose="020B0609020101020101" pitchFamily="49" charset="-127"/>
+                <a:ea typeface="D2Coding" panose="020B0609020101020101" pitchFamily="49" charset="-127"/>
+              </a:rPr>
+              <a:t>new </a:t>
+            </a:r>
+            <a:r>
+              <a:rPr lang="en-US" altLang="ko-KR" sz="1800" dirty="0">
+                <a:solidFill>
+                  <a:srgbClr val="DBDBAA"/>
+                </a:solidFill>
+                <a:effectLst/>
+                <a:latin typeface="D2Coding" panose="020B0609020101020101" pitchFamily="49" charset="-127"/>
+                <a:ea typeface="D2Coding" panose="020B0609020101020101" pitchFamily="49" charset="-127"/>
+              </a:rPr>
+              <a:t>Team</a:t>
+            </a:r>
+            <a:r>
+              <a:rPr lang="en-US" altLang="ko-KR" sz="1800" dirty="0">
+                <a:solidFill>
+                  <a:srgbClr val="D4D4D4"/>
+                </a:solidFill>
+                <a:effectLst/>
+                <a:latin typeface="D2Coding" panose="020B0609020101020101" pitchFamily="49" charset="-127"/>
+                <a:ea typeface="D2Coding" panose="020B0609020101020101" pitchFamily="49" charset="-127"/>
+              </a:rPr>
+              <a:t>();</a:t>
+            </a:r>
+            <a:br>
+              <a:rPr lang="en-US" altLang="ko-KR" sz="1800" dirty="0">
+                <a:solidFill>
+                  <a:srgbClr val="D4D4D4"/>
+                </a:solidFill>
+                <a:effectLst/>
+                <a:latin typeface="D2Coding" panose="020B0609020101020101" pitchFamily="49" charset="-127"/>
+                <a:ea typeface="D2Coding" panose="020B0609020101020101" pitchFamily="49" charset="-127"/>
+              </a:rPr>
+            </a:br>
+            <a:r>
+              <a:rPr lang="en-US" altLang="ko-KR" sz="1800" dirty="0">
+                <a:solidFill>
+                  <a:srgbClr val="D4D4D4"/>
+                </a:solidFill>
+                <a:effectLst/>
+                <a:latin typeface="D2Coding" panose="020B0609020101020101" pitchFamily="49" charset="-127"/>
+                <a:ea typeface="D2Coding" panose="020B0609020101020101" pitchFamily="49" charset="-127"/>
+              </a:rPr>
+              <a:t>    </a:t>
+            </a:r>
+            <a:r>
+              <a:rPr lang="en-US" altLang="ko-KR" sz="1800" dirty="0">
+                <a:solidFill>
+                  <a:srgbClr val="94DBFD"/>
+                </a:solidFill>
+                <a:effectLst/>
+                <a:latin typeface="D2Coding" panose="020B0609020101020101" pitchFamily="49" charset="-127"/>
+                <a:ea typeface="D2Coding" panose="020B0609020101020101" pitchFamily="49" charset="-127"/>
+              </a:rPr>
+              <a:t>team07</a:t>
+            </a:r>
+            <a:r>
+              <a:rPr lang="en-US" altLang="ko-KR" sz="1800" dirty="0">
+                <a:solidFill>
+                  <a:srgbClr val="D4D4D4"/>
+                </a:solidFill>
+                <a:effectLst/>
+                <a:latin typeface="D2Coding" panose="020B0609020101020101" pitchFamily="49" charset="-127"/>
+                <a:ea typeface="D2Coding" panose="020B0609020101020101" pitchFamily="49" charset="-127"/>
+              </a:rPr>
+              <a:t>.</a:t>
+            </a:r>
+            <a:r>
+              <a:rPr lang="en-US" altLang="ko-KR" sz="1800" dirty="0">
+                <a:solidFill>
+                  <a:srgbClr val="DBDBAA"/>
+                </a:solidFill>
+                <a:effectLst/>
+                <a:latin typeface="D2Coding" panose="020B0609020101020101" pitchFamily="49" charset="-127"/>
+                <a:ea typeface="D2Coding" panose="020B0609020101020101" pitchFamily="49" charset="-127"/>
+              </a:rPr>
+              <a:t>add_member</a:t>
+            </a:r>
+            <a:r>
+              <a:rPr lang="en-US" altLang="ko-KR" sz="1800" dirty="0">
+                <a:solidFill>
+                  <a:srgbClr val="D4D4D4"/>
+                </a:solidFill>
+                <a:effectLst/>
+                <a:latin typeface="D2Coding" panose="020B0609020101020101" pitchFamily="49" charset="-127"/>
+                <a:ea typeface="D2Coding" panose="020B0609020101020101" pitchFamily="49" charset="-127"/>
+              </a:rPr>
+              <a:t>(</a:t>
+            </a:r>
+            <a:r>
+              <a:rPr lang="en-US" altLang="ko-KR" sz="1800" dirty="0">
+                <a:solidFill>
+                  <a:srgbClr val="CD9069"/>
+                </a:solidFill>
+                <a:effectLst/>
+                <a:latin typeface="D2Coding" panose="020B0609020101020101" pitchFamily="49" charset="-127"/>
+                <a:ea typeface="D2Coding" panose="020B0609020101020101" pitchFamily="49" charset="-127"/>
+              </a:rPr>
+              <a:t>"20204946"</a:t>
+            </a:r>
+            <a:r>
+              <a:rPr lang="en-US" altLang="ko-KR" sz="1800" dirty="0">
+                <a:solidFill>
+                  <a:srgbClr val="D4D4D4"/>
+                </a:solidFill>
+                <a:effectLst/>
+                <a:latin typeface="D2Coding" panose="020B0609020101020101" pitchFamily="49" charset="-127"/>
+                <a:ea typeface="D2Coding" panose="020B0609020101020101" pitchFamily="49" charset="-127"/>
+              </a:rPr>
+              <a:t>, </a:t>
+            </a:r>
+            <a:r>
+              <a:rPr lang="en-US" altLang="ko-KR" sz="1800" dirty="0">
+                <a:solidFill>
+                  <a:srgbClr val="CD9069"/>
+                </a:solidFill>
+                <a:effectLst/>
+                <a:latin typeface="D2Coding" panose="020B0609020101020101" pitchFamily="49" charset="-127"/>
+                <a:ea typeface="D2Coding" panose="020B0609020101020101" pitchFamily="49" charset="-127"/>
+              </a:rPr>
+              <a:t>"</a:t>
+            </a:r>
+            <a:r>
+              <a:rPr lang="ko-KR" altLang="en-US" sz="1800" dirty="0">
+                <a:solidFill>
+                  <a:srgbClr val="CD9069"/>
+                </a:solidFill>
+                <a:effectLst/>
+                <a:latin typeface="D2Coding" panose="020B0609020101020101" pitchFamily="49" charset="-127"/>
+                <a:ea typeface="D2Coding" panose="020B0609020101020101" pitchFamily="49" charset="-127"/>
+              </a:rPr>
+              <a:t>이규성</a:t>
+            </a:r>
+            <a:r>
+              <a:rPr lang="en-US" altLang="ko-KR" sz="1800" dirty="0">
+                <a:solidFill>
+                  <a:srgbClr val="CD9069"/>
+                </a:solidFill>
+                <a:effectLst/>
+                <a:latin typeface="D2Coding" panose="020B0609020101020101" pitchFamily="49" charset="-127"/>
+                <a:ea typeface="D2Coding" panose="020B0609020101020101" pitchFamily="49" charset="-127"/>
+              </a:rPr>
+              <a:t>"</a:t>
+            </a:r>
+            <a:r>
+              <a:rPr lang="en-US" altLang="ko-KR" sz="1800" dirty="0">
+                <a:solidFill>
+                  <a:srgbClr val="D4D4D4"/>
+                </a:solidFill>
+                <a:effectLst/>
+                <a:latin typeface="D2Coding" panose="020B0609020101020101" pitchFamily="49" charset="-127"/>
+                <a:ea typeface="D2Coding" panose="020B0609020101020101" pitchFamily="49" charset="-127"/>
+              </a:rPr>
+              <a:t>);</a:t>
+            </a:r>
+            <a:br>
+              <a:rPr lang="en-US" altLang="ko-KR" sz="1800" dirty="0">
+                <a:solidFill>
+                  <a:srgbClr val="D4D4D4"/>
+                </a:solidFill>
+                <a:effectLst/>
+                <a:latin typeface="D2Coding" panose="020B0609020101020101" pitchFamily="49" charset="-127"/>
+                <a:ea typeface="D2Coding" panose="020B0609020101020101" pitchFamily="49" charset="-127"/>
+              </a:rPr>
+            </a:br>
+            <a:r>
+              <a:rPr lang="en-US" altLang="ko-KR" sz="1800" dirty="0">
+                <a:solidFill>
+                  <a:srgbClr val="D4D4D4"/>
+                </a:solidFill>
+                <a:effectLst/>
+                <a:latin typeface="D2Coding" panose="020B0609020101020101" pitchFamily="49" charset="-127"/>
+                <a:ea typeface="D2Coding" panose="020B0609020101020101" pitchFamily="49" charset="-127"/>
+              </a:rPr>
+              <a:t>    </a:t>
+            </a:r>
+            <a:r>
+              <a:rPr lang="en-US" altLang="ko-KR" sz="1800" dirty="0">
+                <a:solidFill>
+                  <a:srgbClr val="94DBFD"/>
+                </a:solidFill>
+                <a:effectLst/>
+                <a:latin typeface="D2Coding" panose="020B0609020101020101" pitchFamily="49" charset="-127"/>
+                <a:ea typeface="D2Coding" panose="020B0609020101020101" pitchFamily="49" charset="-127"/>
+              </a:rPr>
+              <a:t>team07</a:t>
+            </a:r>
+            <a:r>
+              <a:rPr lang="en-US" altLang="ko-KR" sz="1800" dirty="0">
+                <a:solidFill>
+                  <a:srgbClr val="D4D4D4"/>
+                </a:solidFill>
+                <a:effectLst/>
+                <a:latin typeface="D2Coding" panose="020B0609020101020101" pitchFamily="49" charset="-127"/>
+                <a:ea typeface="D2Coding" panose="020B0609020101020101" pitchFamily="49" charset="-127"/>
+              </a:rPr>
+              <a:t>.</a:t>
+            </a:r>
+            <a:r>
+              <a:rPr lang="en-US" altLang="ko-KR" sz="1800" dirty="0">
+                <a:solidFill>
+                  <a:srgbClr val="DBDBAA"/>
+                </a:solidFill>
+                <a:effectLst/>
+                <a:latin typeface="D2Coding" panose="020B0609020101020101" pitchFamily="49" charset="-127"/>
+                <a:ea typeface="D2Coding" panose="020B0609020101020101" pitchFamily="49" charset="-127"/>
+              </a:rPr>
+              <a:t>add_member</a:t>
+            </a:r>
+            <a:r>
+              <a:rPr lang="en-US" altLang="ko-KR" sz="1800" dirty="0">
+                <a:solidFill>
+                  <a:srgbClr val="D4D4D4"/>
+                </a:solidFill>
+                <a:effectLst/>
+                <a:latin typeface="D2Coding" panose="020B0609020101020101" pitchFamily="49" charset="-127"/>
+                <a:ea typeface="D2Coding" panose="020B0609020101020101" pitchFamily="49" charset="-127"/>
+              </a:rPr>
+              <a:t>(</a:t>
+            </a:r>
+            <a:r>
+              <a:rPr lang="en-US" altLang="ko-KR" sz="1800" dirty="0">
+                <a:solidFill>
+                  <a:srgbClr val="CD9069"/>
+                </a:solidFill>
+                <a:effectLst/>
+                <a:latin typeface="D2Coding" panose="020B0609020101020101" pitchFamily="49" charset="-127"/>
+                <a:ea typeface="D2Coding" panose="020B0609020101020101" pitchFamily="49" charset="-127"/>
+              </a:rPr>
+              <a:t>"20203436"</a:t>
+            </a:r>
+            <a:r>
+              <a:rPr lang="en-US" altLang="ko-KR" sz="1800" dirty="0">
+                <a:solidFill>
+                  <a:srgbClr val="D4D4D4"/>
+                </a:solidFill>
+                <a:effectLst/>
+                <a:latin typeface="D2Coding" panose="020B0609020101020101" pitchFamily="49" charset="-127"/>
+                <a:ea typeface="D2Coding" panose="020B0609020101020101" pitchFamily="49" charset="-127"/>
+              </a:rPr>
+              <a:t>, </a:t>
+            </a:r>
+            <a:r>
+              <a:rPr lang="en-US" altLang="ko-KR" sz="1800" dirty="0">
+                <a:solidFill>
+                  <a:srgbClr val="CD9069"/>
+                </a:solidFill>
+                <a:effectLst/>
+                <a:latin typeface="D2Coding" panose="020B0609020101020101" pitchFamily="49" charset="-127"/>
+                <a:ea typeface="D2Coding" panose="020B0609020101020101" pitchFamily="49" charset="-127"/>
+              </a:rPr>
+              <a:t>"</a:t>
+            </a:r>
+            <a:r>
+              <a:rPr lang="ko-KR" altLang="en-US" sz="1800" dirty="0" err="1">
+                <a:solidFill>
+                  <a:srgbClr val="CD9069"/>
+                </a:solidFill>
+                <a:effectLst/>
+                <a:latin typeface="D2Coding" panose="020B0609020101020101" pitchFamily="49" charset="-127"/>
+                <a:ea typeface="D2Coding" panose="020B0609020101020101" pitchFamily="49" charset="-127"/>
+              </a:rPr>
+              <a:t>이병구</a:t>
+            </a:r>
+            <a:r>
+              <a:rPr lang="en-US" altLang="ko-KR" sz="1800" dirty="0">
+                <a:solidFill>
+                  <a:srgbClr val="CD9069"/>
+                </a:solidFill>
+                <a:effectLst/>
+                <a:latin typeface="D2Coding" panose="020B0609020101020101" pitchFamily="49" charset="-127"/>
+                <a:ea typeface="D2Coding" panose="020B0609020101020101" pitchFamily="49" charset="-127"/>
+              </a:rPr>
+              <a:t>"</a:t>
+            </a:r>
+            <a:r>
+              <a:rPr lang="en-US" altLang="ko-KR" sz="1800" dirty="0">
+                <a:solidFill>
+                  <a:srgbClr val="D4D4D4"/>
+                </a:solidFill>
+                <a:effectLst/>
+                <a:latin typeface="D2Coding" panose="020B0609020101020101" pitchFamily="49" charset="-127"/>
+                <a:ea typeface="D2Coding" panose="020B0609020101020101" pitchFamily="49" charset="-127"/>
+              </a:rPr>
+              <a:t>);</a:t>
+            </a:r>
+            <a:br>
+              <a:rPr lang="en-US" altLang="ko-KR" sz="1800" dirty="0">
+                <a:solidFill>
+                  <a:srgbClr val="D4D4D4"/>
+                </a:solidFill>
+                <a:effectLst/>
+                <a:latin typeface="D2Coding" panose="020B0609020101020101" pitchFamily="49" charset="-127"/>
+                <a:ea typeface="D2Coding" panose="020B0609020101020101" pitchFamily="49" charset="-127"/>
+              </a:rPr>
+            </a:br>
+            <a:r>
+              <a:rPr lang="en-US" altLang="ko-KR" sz="1800" dirty="0">
+                <a:solidFill>
+                  <a:srgbClr val="D4D4D4"/>
+                </a:solidFill>
+                <a:effectLst/>
+                <a:latin typeface="D2Coding" panose="020B0609020101020101" pitchFamily="49" charset="-127"/>
+                <a:ea typeface="D2Coding" panose="020B0609020101020101" pitchFamily="49" charset="-127"/>
+              </a:rPr>
+              <a:t>    </a:t>
+            </a:r>
+            <a:r>
+              <a:rPr lang="en-US" altLang="ko-KR" sz="1800" dirty="0">
+                <a:solidFill>
+                  <a:srgbClr val="94DBFD"/>
+                </a:solidFill>
+                <a:effectLst/>
+                <a:latin typeface="D2Coding" panose="020B0609020101020101" pitchFamily="49" charset="-127"/>
+                <a:ea typeface="D2Coding" panose="020B0609020101020101" pitchFamily="49" charset="-127"/>
+              </a:rPr>
+              <a:t>team07</a:t>
+            </a:r>
+            <a:r>
+              <a:rPr lang="en-US" altLang="ko-KR" sz="1800" dirty="0">
+                <a:solidFill>
+                  <a:srgbClr val="D4D4D4"/>
+                </a:solidFill>
+                <a:effectLst/>
+                <a:latin typeface="D2Coding" panose="020B0609020101020101" pitchFamily="49" charset="-127"/>
+                <a:ea typeface="D2Coding" panose="020B0609020101020101" pitchFamily="49" charset="-127"/>
+              </a:rPr>
+              <a:t>.</a:t>
+            </a:r>
+            <a:r>
+              <a:rPr lang="en-US" altLang="ko-KR" sz="1800" dirty="0">
+                <a:solidFill>
+                  <a:srgbClr val="DBDBAA"/>
+                </a:solidFill>
+                <a:effectLst/>
+                <a:latin typeface="D2Coding" panose="020B0609020101020101" pitchFamily="49" charset="-127"/>
+                <a:ea typeface="D2Coding" panose="020B0609020101020101" pitchFamily="49" charset="-127"/>
+              </a:rPr>
+              <a:t>add_member</a:t>
+            </a:r>
+            <a:r>
+              <a:rPr lang="en-US" altLang="ko-KR" sz="1800" dirty="0">
+                <a:solidFill>
+                  <a:srgbClr val="D4D4D4"/>
+                </a:solidFill>
+                <a:effectLst/>
+                <a:latin typeface="D2Coding" panose="020B0609020101020101" pitchFamily="49" charset="-127"/>
+                <a:ea typeface="D2Coding" panose="020B0609020101020101" pitchFamily="49" charset="-127"/>
+              </a:rPr>
+              <a:t>(</a:t>
+            </a:r>
+            <a:r>
+              <a:rPr lang="en-US" altLang="ko-KR" sz="1800" dirty="0">
+                <a:solidFill>
+                  <a:srgbClr val="CD9069"/>
+                </a:solidFill>
+                <a:effectLst/>
+                <a:latin typeface="D2Coding" panose="020B0609020101020101" pitchFamily="49" charset="-127"/>
+                <a:ea typeface="D2Coding" panose="020B0609020101020101" pitchFamily="49" charset="-127"/>
+              </a:rPr>
+              <a:t>"20203458"</a:t>
+            </a:r>
+            <a:r>
+              <a:rPr lang="en-US" altLang="ko-KR" sz="1800" dirty="0">
+                <a:solidFill>
+                  <a:srgbClr val="D4D4D4"/>
+                </a:solidFill>
+                <a:effectLst/>
+                <a:latin typeface="D2Coding" panose="020B0609020101020101" pitchFamily="49" charset="-127"/>
+                <a:ea typeface="D2Coding" panose="020B0609020101020101" pitchFamily="49" charset="-127"/>
+              </a:rPr>
+              <a:t>, </a:t>
+            </a:r>
+            <a:r>
+              <a:rPr lang="en-US" altLang="ko-KR" sz="1800" dirty="0">
+                <a:solidFill>
+                  <a:srgbClr val="CD9069"/>
+                </a:solidFill>
+                <a:effectLst/>
+                <a:latin typeface="D2Coding" panose="020B0609020101020101" pitchFamily="49" charset="-127"/>
+                <a:ea typeface="D2Coding" panose="020B0609020101020101" pitchFamily="49" charset="-127"/>
+              </a:rPr>
+              <a:t>"</a:t>
+            </a:r>
+            <a:r>
+              <a:rPr lang="ko-KR" altLang="en-US" sz="1800" dirty="0">
+                <a:solidFill>
+                  <a:srgbClr val="CD9069"/>
+                </a:solidFill>
+                <a:effectLst/>
+                <a:latin typeface="D2Coding" panose="020B0609020101020101" pitchFamily="49" charset="-127"/>
+                <a:ea typeface="D2Coding" panose="020B0609020101020101" pitchFamily="49" charset="-127"/>
+              </a:rPr>
+              <a:t>조영호</a:t>
+            </a:r>
+            <a:r>
+              <a:rPr lang="en-US" altLang="ko-KR" sz="1800" dirty="0">
+                <a:solidFill>
+                  <a:srgbClr val="CD9069"/>
+                </a:solidFill>
+                <a:effectLst/>
+                <a:latin typeface="D2Coding" panose="020B0609020101020101" pitchFamily="49" charset="-127"/>
+                <a:ea typeface="D2Coding" panose="020B0609020101020101" pitchFamily="49" charset="-127"/>
+              </a:rPr>
+              <a:t>"</a:t>
+            </a:r>
+            <a:r>
+              <a:rPr lang="en-US" altLang="ko-KR" sz="1800" dirty="0">
+                <a:solidFill>
+                  <a:srgbClr val="D4D4D4"/>
+                </a:solidFill>
+                <a:effectLst/>
+                <a:latin typeface="D2Coding" panose="020B0609020101020101" pitchFamily="49" charset="-127"/>
+                <a:ea typeface="D2Coding" panose="020B0609020101020101" pitchFamily="49" charset="-127"/>
+              </a:rPr>
+              <a:t>);</a:t>
+            </a:r>
+            <a:br>
+              <a:rPr lang="en-US" altLang="ko-KR" sz="1800" dirty="0">
+                <a:solidFill>
+                  <a:srgbClr val="D4D4D4"/>
+                </a:solidFill>
+                <a:effectLst/>
+                <a:latin typeface="D2Coding" panose="020B0609020101020101" pitchFamily="49" charset="-127"/>
+                <a:ea typeface="D2Coding" panose="020B0609020101020101" pitchFamily="49" charset="-127"/>
+              </a:rPr>
+            </a:br>
+            <a:br>
+              <a:rPr lang="en-US" altLang="ko-KR" sz="1800" dirty="0">
+                <a:solidFill>
+                  <a:srgbClr val="D4D4D4"/>
+                </a:solidFill>
+                <a:effectLst/>
+                <a:latin typeface="D2Coding" panose="020B0609020101020101" pitchFamily="49" charset="-127"/>
+                <a:ea typeface="D2Coding" panose="020B0609020101020101" pitchFamily="49" charset="-127"/>
+              </a:rPr>
+            </a:br>
+            <a:r>
+              <a:rPr lang="en-US" altLang="ko-KR" sz="1800" dirty="0">
+                <a:solidFill>
+                  <a:srgbClr val="D4D4D4"/>
+                </a:solidFill>
+                <a:effectLst/>
+                <a:latin typeface="D2Coding" panose="020B0609020101020101" pitchFamily="49" charset="-127"/>
+                <a:ea typeface="D2Coding" panose="020B0609020101020101" pitchFamily="49" charset="-127"/>
+              </a:rPr>
+              <a:t>    </a:t>
+            </a:r>
+            <a:r>
+              <a:rPr lang="en-US" altLang="ko-KR" sz="1800" dirty="0">
+                <a:solidFill>
+                  <a:srgbClr val="94DBFD"/>
+                </a:solidFill>
+                <a:effectLst/>
+                <a:latin typeface="D2Coding" panose="020B0609020101020101" pitchFamily="49" charset="-127"/>
+                <a:ea typeface="D2Coding" panose="020B0609020101020101" pitchFamily="49" charset="-127"/>
+              </a:rPr>
+              <a:t>team07</a:t>
+            </a:r>
+            <a:r>
+              <a:rPr lang="en-US" altLang="ko-KR" sz="1800" dirty="0">
+                <a:solidFill>
+                  <a:srgbClr val="D4D4D4"/>
+                </a:solidFill>
+                <a:effectLst/>
+                <a:latin typeface="D2Coding" panose="020B0609020101020101" pitchFamily="49" charset="-127"/>
+                <a:ea typeface="D2Coding" panose="020B0609020101020101" pitchFamily="49" charset="-127"/>
+              </a:rPr>
+              <a:t>.</a:t>
+            </a:r>
+            <a:r>
+              <a:rPr lang="en-US" altLang="ko-KR" sz="1800" dirty="0">
+                <a:solidFill>
+                  <a:srgbClr val="DBDBAA"/>
+                </a:solidFill>
+                <a:effectLst/>
+                <a:latin typeface="D2Coding" panose="020B0609020101020101" pitchFamily="49" charset="-127"/>
+                <a:ea typeface="D2Coding" panose="020B0609020101020101" pitchFamily="49" charset="-127"/>
+              </a:rPr>
+              <a:t>set_project</a:t>
+            </a:r>
+            <a:r>
+              <a:rPr lang="en-US" altLang="ko-KR" sz="1800" dirty="0">
+                <a:solidFill>
+                  <a:srgbClr val="D4D4D4"/>
+                </a:solidFill>
+                <a:effectLst/>
+                <a:latin typeface="D2Coding" panose="020B0609020101020101" pitchFamily="49" charset="-127"/>
+                <a:ea typeface="D2Coding" panose="020B0609020101020101" pitchFamily="49" charset="-127"/>
+              </a:rPr>
+              <a:t>(</a:t>
+            </a:r>
+            <a:r>
+              <a:rPr lang="en-US" altLang="ko-KR" sz="1800" dirty="0">
+                <a:solidFill>
+                  <a:srgbClr val="CD9069"/>
+                </a:solidFill>
+                <a:effectLst/>
+                <a:latin typeface="D2Coding" panose="020B0609020101020101" pitchFamily="49" charset="-127"/>
+                <a:ea typeface="D2Coding" panose="020B0609020101020101" pitchFamily="49" charset="-127"/>
+              </a:rPr>
+              <a:t>"</a:t>
+            </a:r>
+            <a:r>
+              <a:rPr lang="en-US" altLang="ko-KR" sz="1800" dirty="0" err="1">
+                <a:solidFill>
+                  <a:srgbClr val="CD9069"/>
+                </a:solidFill>
+                <a:effectLst/>
+                <a:latin typeface="D2Coding" panose="020B0609020101020101" pitchFamily="49" charset="-127"/>
+                <a:ea typeface="D2Coding" panose="020B0609020101020101" pitchFamily="49" charset="-127"/>
+              </a:rPr>
+              <a:t>inf_int</a:t>
+            </a:r>
+            <a:r>
+              <a:rPr lang="en-US" altLang="ko-KR" sz="1800" dirty="0">
+                <a:solidFill>
+                  <a:srgbClr val="CD9069"/>
+                </a:solidFill>
+                <a:effectLst/>
+                <a:latin typeface="D2Coding" panose="020B0609020101020101" pitchFamily="49" charset="-127"/>
+                <a:ea typeface="D2Coding" panose="020B0609020101020101" pitchFamily="49" charset="-127"/>
+              </a:rPr>
+              <a:t> calculator"</a:t>
+            </a:r>
+            <a:r>
+              <a:rPr lang="en-US" altLang="ko-KR" sz="1800" dirty="0">
+                <a:solidFill>
+                  <a:srgbClr val="D4D4D4"/>
+                </a:solidFill>
+                <a:effectLst/>
+                <a:latin typeface="D2Coding" panose="020B0609020101020101" pitchFamily="49" charset="-127"/>
+                <a:ea typeface="D2Coding" panose="020B0609020101020101" pitchFamily="49" charset="-127"/>
+              </a:rPr>
+              <a:t>);</a:t>
+            </a:r>
+            <a:br>
+              <a:rPr lang="en-US" altLang="ko-KR" sz="1800" dirty="0">
+                <a:solidFill>
+                  <a:srgbClr val="D4D4D4"/>
+                </a:solidFill>
+                <a:effectLst/>
+                <a:latin typeface="D2Coding" panose="020B0609020101020101" pitchFamily="49" charset="-127"/>
+                <a:ea typeface="D2Coding" panose="020B0609020101020101" pitchFamily="49" charset="-127"/>
+              </a:rPr>
+            </a:br>
+            <a:br>
+              <a:rPr lang="en-US" altLang="ko-KR" sz="1800" dirty="0">
+                <a:solidFill>
+                  <a:srgbClr val="D4D4D4"/>
+                </a:solidFill>
+                <a:effectLst/>
+                <a:latin typeface="D2Coding" panose="020B0609020101020101" pitchFamily="49" charset="-127"/>
+                <a:ea typeface="D2Coding" panose="020B0609020101020101" pitchFamily="49" charset="-127"/>
+              </a:rPr>
+            </a:br>
+            <a:r>
+              <a:rPr lang="en-US" altLang="ko-KR" sz="1800" dirty="0">
+                <a:solidFill>
+                  <a:srgbClr val="D4D4D4"/>
+                </a:solidFill>
+                <a:effectLst/>
+                <a:latin typeface="D2Coding" panose="020B0609020101020101" pitchFamily="49" charset="-127"/>
+                <a:ea typeface="D2Coding" panose="020B0609020101020101" pitchFamily="49" charset="-127"/>
+              </a:rPr>
+              <a:t>    </a:t>
+            </a:r>
+            <a:r>
+              <a:rPr lang="en-US" altLang="ko-KR" sz="1800" dirty="0">
+                <a:solidFill>
+                  <a:srgbClr val="94DBFD"/>
+                </a:solidFill>
+                <a:effectLst/>
+                <a:latin typeface="D2Coding" panose="020B0609020101020101" pitchFamily="49" charset="-127"/>
+                <a:ea typeface="D2Coding" panose="020B0609020101020101" pitchFamily="49" charset="-127"/>
+              </a:rPr>
+              <a:t>team07</a:t>
+            </a:r>
+            <a:r>
+              <a:rPr lang="en-US" altLang="ko-KR" sz="1800" dirty="0">
+                <a:solidFill>
+                  <a:srgbClr val="D4D4D4"/>
+                </a:solidFill>
+                <a:effectLst/>
+                <a:latin typeface="D2Coding" panose="020B0609020101020101" pitchFamily="49" charset="-127"/>
+                <a:ea typeface="D2Coding" panose="020B0609020101020101" pitchFamily="49" charset="-127"/>
+              </a:rPr>
+              <a:t>.</a:t>
+            </a:r>
+            <a:r>
+              <a:rPr lang="en-US" altLang="ko-KR" sz="1800" dirty="0">
+                <a:solidFill>
+                  <a:srgbClr val="DBDBAA"/>
+                </a:solidFill>
+                <a:effectLst/>
+                <a:latin typeface="D2Coding" panose="020B0609020101020101" pitchFamily="49" charset="-127"/>
+                <a:ea typeface="D2Coding" panose="020B0609020101020101" pitchFamily="49" charset="-127"/>
+              </a:rPr>
+              <a:t>start_presentation</a:t>
+            </a:r>
+            <a:r>
+              <a:rPr lang="en-US" altLang="ko-KR" sz="1800" dirty="0">
+                <a:solidFill>
+                  <a:srgbClr val="D4D4D4"/>
+                </a:solidFill>
+                <a:effectLst/>
+                <a:latin typeface="D2Coding" panose="020B0609020101020101" pitchFamily="49" charset="-127"/>
+                <a:ea typeface="D2Coding" panose="020B0609020101020101" pitchFamily="49" charset="-127"/>
+              </a:rPr>
+              <a:t>();</a:t>
+            </a:r>
+            <a:br>
+              <a:rPr lang="en-US" altLang="ko-KR" sz="1800" dirty="0">
+                <a:solidFill>
+                  <a:srgbClr val="D4D4D4"/>
+                </a:solidFill>
+                <a:effectLst/>
+                <a:latin typeface="D2Coding" panose="020B0609020101020101" pitchFamily="49" charset="-127"/>
+                <a:ea typeface="D2Coding" panose="020B0609020101020101" pitchFamily="49" charset="-127"/>
+              </a:rPr>
+            </a:br>
+            <a:r>
+              <a:rPr lang="en-US" altLang="ko-KR" sz="1800" dirty="0">
+                <a:solidFill>
+                  <a:srgbClr val="D4D4D4"/>
+                </a:solidFill>
+                <a:effectLst/>
+                <a:latin typeface="D2Coding" panose="020B0609020101020101" pitchFamily="49" charset="-127"/>
+                <a:ea typeface="D2Coding" panose="020B0609020101020101" pitchFamily="49" charset="-127"/>
+              </a:rPr>
+              <a:t>    </a:t>
+            </a:r>
+            <a:r>
+              <a:rPr lang="en-US" altLang="ko-KR" sz="1800" dirty="0">
+                <a:solidFill>
+                  <a:srgbClr val="499CD5"/>
+                </a:solidFill>
+                <a:effectLst/>
+                <a:latin typeface="D2Coding" panose="020B0609020101020101" pitchFamily="49" charset="-127"/>
+                <a:ea typeface="D2Coding" panose="020B0609020101020101" pitchFamily="49" charset="-127"/>
+              </a:rPr>
+              <a:t>return </a:t>
+            </a:r>
+            <a:r>
+              <a:rPr lang="en-US" altLang="ko-KR" sz="1800" dirty="0">
+                <a:solidFill>
+                  <a:srgbClr val="D4D4D4"/>
+                </a:solidFill>
+                <a:effectLst/>
+                <a:latin typeface="D2Coding" panose="020B0609020101020101" pitchFamily="49" charset="-127"/>
+                <a:ea typeface="D2Coding" panose="020B0609020101020101" pitchFamily="49" charset="-127"/>
+              </a:rPr>
+              <a:t>(</a:t>
+            </a:r>
+            <a:r>
+              <a:rPr lang="en-US" altLang="ko-KR" sz="1800" dirty="0">
+                <a:solidFill>
+                  <a:srgbClr val="B4CDA8"/>
+                </a:solidFill>
+                <a:effectLst/>
+                <a:latin typeface="D2Coding" panose="020B0609020101020101" pitchFamily="49" charset="-127"/>
+                <a:ea typeface="D2Coding" panose="020B0609020101020101" pitchFamily="49" charset="-127"/>
+              </a:rPr>
+              <a:t>0</a:t>
+            </a:r>
+            <a:r>
+              <a:rPr lang="en-US" altLang="ko-KR" sz="1800" dirty="0">
+                <a:solidFill>
+                  <a:srgbClr val="D4D4D4"/>
+                </a:solidFill>
+                <a:effectLst/>
+                <a:latin typeface="D2Coding" panose="020B0609020101020101" pitchFamily="49" charset="-127"/>
+                <a:ea typeface="D2Coding" panose="020B0609020101020101" pitchFamily="49" charset="-127"/>
+              </a:rPr>
+              <a:t>);</a:t>
+            </a:r>
+            <a:br>
+              <a:rPr lang="en-US" altLang="ko-KR" sz="1800" dirty="0">
+                <a:solidFill>
+                  <a:srgbClr val="D4D4D4"/>
+                </a:solidFill>
+                <a:effectLst/>
+                <a:latin typeface="D2Coding" panose="020B0609020101020101" pitchFamily="49" charset="-127"/>
+                <a:ea typeface="D2Coding" panose="020B0609020101020101" pitchFamily="49" charset="-127"/>
+              </a:rPr>
+            </a:br>
+            <a:r>
+              <a:rPr lang="en-US" altLang="ko-KR" sz="1800" dirty="0">
+                <a:solidFill>
+                  <a:srgbClr val="D4D4D4"/>
+                </a:solidFill>
+                <a:effectLst/>
+                <a:latin typeface="D2Coding" panose="020B0609020101020101" pitchFamily="49" charset="-127"/>
+                <a:ea typeface="D2Coding" panose="020B0609020101020101" pitchFamily="49" charset="-127"/>
+              </a:rPr>
+              <a:t>}</a:t>
+            </a:r>
+          </a:p>
+        </p:txBody>
+      </p:sp>
+      <p:sp>
+        <p:nvSpPr>
+          <p:cNvPr id="11" name="TextBox 10">
+            <a:extLst>
+              <a:ext uri="{FF2B5EF4-FFF2-40B4-BE49-F238E27FC236}">
+                <a16:creationId xmlns:a16="http://schemas.microsoft.com/office/drawing/2014/main" id="{CC25FBCF-46AD-19E6-1FB3-C8574DB33503}"/>
+              </a:ext>
+            </a:extLst>
+          </p:cNvPr>
+          <p:cNvSpPr txBox="1"/>
+          <p:nvPr/>
+        </p:nvSpPr>
+        <p:spPr>
+          <a:xfrm>
+            <a:off x="9237280" y="5627791"/>
+            <a:ext cx="2954720" cy="1230209"/>
+          </a:xfrm>
+          <a:prstGeom prst="rect">
+            <a:avLst/>
+          </a:prstGeom>
+          <a:noFill/>
+        </p:spPr>
+        <p:txBody>
+          <a:bodyPr wrap="none" rtlCol="0">
+            <a:spAutoFit/>
+          </a:bodyPr>
+          <a:lstStyle/>
+          <a:p>
+            <a:pPr algn="r" latinLnBrk="0">
+              <a:lnSpc>
+                <a:spcPct val="160000"/>
+              </a:lnSpc>
+              <a:tabLst>
+                <a:tab pos="1630680" algn="l"/>
+              </a:tabLst>
+            </a:pPr>
+            <a:r>
+              <a:rPr lang="en-US" altLang="ko-KR" sz="1600" b="1" dirty="0">
+                <a:solidFill>
+                  <a:schemeClr val="bg1">
+                    <a:lumMod val="95000"/>
+                  </a:schemeClr>
+                </a:solidFill>
+                <a:latin typeface="+mj-lt"/>
+                <a:ea typeface="함초롬바탕" panose="02030504000101010101" pitchFamily="18" charset="-127"/>
+                <a:cs typeface="Times New Roman" panose="02020603050405020304" pitchFamily="18" charset="0"/>
+              </a:rPr>
+              <a:t>CAU CSE 23-2</a:t>
+            </a:r>
+          </a:p>
+          <a:p>
+            <a:pPr algn="r" latinLnBrk="0">
+              <a:lnSpc>
+                <a:spcPct val="160000"/>
+              </a:lnSpc>
+              <a:tabLst>
+                <a:tab pos="1630680" algn="l"/>
+              </a:tabLst>
+            </a:pPr>
+            <a:r>
+              <a:rPr lang="en-US" altLang="ko-KR" sz="1600" b="1" dirty="0">
+                <a:solidFill>
+                  <a:schemeClr val="bg1">
+                    <a:lumMod val="95000"/>
+                  </a:schemeClr>
+                </a:solidFill>
+                <a:latin typeface="+mj-lt"/>
+                <a:ea typeface="함초롬바탕" panose="02030504000101010101" pitchFamily="18" charset="-127"/>
+                <a:cs typeface="Times New Roman" panose="02020603050405020304" pitchFamily="18" charset="0"/>
+              </a:rPr>
+              <a:t>Team #7</a:t>
+            </a:r>
+          </a:p>
+          <a:p>
+            <a:pPr algn="r" latinLnBrk="0">
+              <a:lnSpc>
+                <a:spcPct val="160000"/>
+              </a:lnSpc>
+              <a:tabLst>
+                <a:tab pos="1630680" algn="l"/>
+              </a:tabLst>
+            </a:pPr>
+            <a:r>
+              <a:rPr lang="en-US" altLang="ko-KR" sz="1600" b="1" dirty="0">
+                <a:solidFill>
+                  <a:schemeClr val="bg1">
+                    <a:lumMod val="95000"/>
+                  </a:schemeClr>
+                </a:solidFill>
+                <a:effectLst/>
+                <a:latin typeface="+mj-lt"/>
+                <a:ea typeface="함초롬바탕" panose="02030504000101010101" pitchFamily="18" charset="-127"/>
+                <a:cs typeface="Times New Roman" panose="02020603050405020304" pitchFamily="18" charset="0"/>
+              </a:rPr>
+              <a:t>Object Or</a:t>
+            </a:r>
+            <a:r>
+              <a:rPr lang="en-US" altLang="ko-KR" sz="1600" b="1" dirty="0">
+                <a:solidFill>
+                  <a:schemeClr val="bg1">
+                    <a:lumMod val="95000"/>
+                  </a:schemeClr>
+                </a:solidFill>
+                <a:latin typeface="+mj-lt"/>
+                <a:ea typeface="함초롬바탕" panose="02030504000101010101" pitchFamily="18" charset="-127"/>
+                <a:cs typeface="Times New Roman" panose="02020603050405020304" pitchFamily="18" charset="0"/>
+              </a:rPr>
+              <a:t>iented Programming</a:t>
+            </a:r>
+            <a:endParaRPr lang="ko-KR" altLang="ko-KR" sz="1600" dirty="0">
+              <a:solidFill>
+                <a:schemeClr val="bg1">
+                  <a:lumMod val="95000"/>
+                </a:schemeClr>
+              </a:solidFill>
+              <a:effectLst/>
+              <a:latin typeface="+mj-lt"/>
+              <a:ea typeface="함초롬바탕" panose="02030504000101010101" pitchFamily="18" charset="-127"/>
+              <a:cs typeface="굴림" panose="020B0600000101010101" pitchFamily="50" charset="-127"/>
+            </a:endParaRPr>
+          </a:p>
+        </p:txBody>
+      </p:sp>
     </p:spTree>
     <p:extLst>
       <p:ext uri="{BB962C8B-B14F-4D97-AF65-F5344CB8AC3E}">

</xml_diff>

<commit_message>
feat: add ppt, it is almost done
</commit_message>
<xml_diff>
--- a/OOP_Project02_Team07.pptx
+++ b/OOP_Project02_Team07.pptx
@@ -6,9 +6,16 @@
   </p:sldMasterIdLst>
   <p:sldIdLst>
     <p:sldId id="256" r:id="rId2"/>
-    <p:sldId id="259" r:id="rId3"/>
-    <p:sldId id="260" r:id="rId4"/>
-    <p:sldId id="261" r:id="rId5"/>
+    <p:sldId id="267" r:id="rId3"/>
+    <p:sldId id="259" r:id="rId4"/>
+    <p:sldId id="260" r:id="rId5"/>
+    <p:sldId id="261" r:id="rId6"/>
+    <p:sldId id="262" r:id="rId7"/>
+    <p:sldId id="263" r:id="rId8"/>
+    <p:sldId id="264" r:id="rId9"/>
+    <p:sldId id="265" r:id="rId10"/>
+    <p:sldId id="266" r:id="rId11"/>
+    <p:sldId id="268" r:id="rId12"/>
   </p:sldIdLst>
   <p:sldSz cx="12192000" cy="6858000"/>
   <p:notesSz cx="6858000" cy="9144000"/>
@@ -107,6 +114,11 @@
       </a:defRPr>
     </a:lvl9pPr>
   </p:defaultTextStyle>
+  <p:extLst>
+    <p:ext uri="{EFAFB233-063F-42B5-8137-9DF3F51BA10A}">
+      <p15:sldGuideLst xmlns:p15="http://schemas.microsoft.com/office/powerpoint/2012/main"/>
+    </p:ext>
+  </p:extLst>
 </p:presentation>
 </file>
 
@@ -257,7 +269,7 @@
           <a:p>
             <a:fld id="{37F81158-0E34-4120-9E9D-39DF41EA7255}" type="datetimeFigureOut">
               <a:rPr lang="ko-KR" altLang="en-US" smtClean="0"/>
-              <a:t>2023-11-05</a:t>
+              <a:t>2023. 11. 5.</a:t>
             </a:fld>
             <a:endParaRPr lang="ko-KR" altLang="en-US"/>
           </a:p>
@@ -455,7 +467,7 @@
           <a:p>
             <a:fld id="{37F81158-0E34-4120-9E9D-39DF41EA7255}" type="datetimeFigureOut">
               <a:rPr lang="ko-KR" altLang="en-US" smtClean="0"/>
-              <a:t>2023-11-05</a:t>
+              <a:t>2023. 11. 5.</a:t>
             </a:fld>
             <a:endParaRPr lang="ko-KR" altLang="en-US"/>
           </a:p>
@@ -663,7 +675,7 @@
           <a:p>
             <a:fld id="{37F81158-0E34-4120-9E9D-39DF41EA7255}" type="datetimeFigureOut">
               <a:rPr lang="ko-KR" altLang="en-US" smtClean="0"/>
-              <a:t>2023-11-05</a:t>
+              <a:t>2023. 11. 5.</a:t>
             </a:fld>
             <a:endParaRPr lang="ko-KR" altLang="en-US"/>
           </a:p>
@@ -861,7 +873,7 @@
           <a:p>
             <a:fld id="{37F81158-0E34-4120-9E9D-39DF41EA7255}" type="datetimeFigureOut">
               <a:rPr lang="ko-KR" altLang="en-US" smtClean="0"/>
-              <a:t>2023-11-05</a:t>
+              <a:t>2023. 11. 5.</a:t>
             </a:fld>
             <a:endParaRPr lang="ko-KR" altLang="en-US"/>
           </a:p>
@@ -1136,7 +1148,7 @@
           <a:p>
             <a:fld id="{37F81158-0E34-4120-9E9D-39DF41EA7255}" type="datetimeFigureOut">
               <a:rPr lang="ko-KR" altLang="en-US" smtClean="0"/>
-              <a:t>2023-11-05</a:t>
+              <a:t>2023. 11. 5.</a:t>
             </a:fld>
             <a:endParaRPr lang="ko-KR" altLang="en-US"/>
           </a:p>
@@ -1401,7 +1413,7 @@
           <a:p>
             <a:fld id="{37F81158-0E34-4120-9E9D-39DF41EA7255}" type="datetimeFigureOut">
               <a:rPr lang="ko-KR" altLang="en-US" smtClean="0"/>
-              <a:t>2023-11-05</a:t>
+              <a:t>2023. 11. 5.</a:t>
             </a:fld>
             <a:endParaRPr lang="ko-KR" altLang="en-US"/>
           </a:p>
@@ -1813,7 +1825,7 @@
           <a:p>
             <a:fld id="{37F81158-0E34-4120-9E9D-39DF41EA7255}" type="datetimeFigureOut">
               <a:rPr lang="ko-KR" altLang="en-US" smtClean="0"/>
-              <a:t>2023-11-05</a:t>
+              <a:t>2023. 11. 5.</a:t>
             </a:fld>
             <a:endParaRPr lang="ko-KR" altLang="en-US"/>
           </a:p>
@@ -1954,7 +1966,7 @@
           <a:p>
             <a:fld id="{37F81158-0E34-4120-9E9D-39DF41EA7255}" type="datetimeFigureOut">
               <a:rPr lang="ko-KR" altLang="en-US" smtClean="0"/>
-              <a:t>2023-11-05</a:t>
+              <a:t>2023. 11. 5.</a:t>
             </a:fld>
             <a:endParaRPr lang="ko-KR" altLang="en-US"/>
           </a:p>
@@ -2067,7 +2079,7 @@
           <a:p>
             <a:fld id="{37F81158-0E34-4120-9E9D-39DF41EA7255}" type="datetimeFigureOut">
               <a:rPr lang="ko-KR" altLang="en-US" smtClean="0"/>
-              <a:t>2023-11-05</a:t>
+              <a:t>2023. 11. 5.</a:t>
             </a:fld>
             <a:endParaRPr lang="ko-KR" altLang="en-US"/>
           </a:p>
@@ -2378,7 +2390,7 @@
           <a:p>
             <a:fld id="{37F81158-0E34-4120-9E9D-39DF41EA7255}" type="datetimeFigureOut">
               <a:rPr lang="ko-KR" altLang="en-US" smtClean="0"/>
-              <a:t>2023-11-05</a:t>
+              <a:t>2023. 11. 5.</a:t>
             </a:fld>
             <a:endParaRPr lang="ko-KR" altLang="en-US"/>
           </a:p>
@@ -2666,7 +2678,7 @@
           <a:p>
             <a:fld id="{37F81158-0E34-4120-9E9D-39DF41EA7255}" type="datetimeFigureOut">
               <a:rPr lang="ko-KR" altLang="en-US" smtClean="0"/>
-              <a:t>2023-11-05</a:t>
+              <a:t>2023. 11. 5.</a:t>
             </a:fld>
             <a:endParaRPr lang="ko-KR" altLang="en-US"/>
           </a:p>
@@ -2910,7 +2922,7 @@
           <a:p>
             <a:fld id="{37F81158-0E34-4120-9E9D-39DF41EA7255}" type="datetimeFigureOut">
               <a:rPr lang="ko-KR" altLang="en-US" smtClean="0"/>
-              <a:t>2023-11-05</a:t>
+              <a:t>2023. 11. 5.</a:t>
             </a:fld>
             <a:endParaRPr lang="ko-KR" altLang="en-US"/>
           </a:p>
@@ -4645,8 +4657,8 @@
         </p:nvSpPr>
         <p:spPr>
           <a:xfrm>
-            <a:off x="9237280" y="5627791"/>
-            <a:ext cx="2954720" cy="1230209"/>
+            <a:off x="8211423" y="5627791"/>
+            <a:ext cx="3980577" cy="1230209"/>
           </a:xfrm>
           <a:prstGeom prst="rect">
             <a:avLst/>
@@ -4738,7 +4750,7 @@
                 <a:ea typeface="함초롬바탕" panose="02030504000101010101" pitchFamily="18" charset="-127"/>
                 <a:cs typeface="Times New Roman" panose="02020603050405020304" pitchFamily="18" charset="0"/>
               </a:rPr>
-              <a:t>iented Programming</a:t>
+              <a:t>iented Programming Project02</a:t>
             </a:r>
             <a:endParaRPr lang="ko-KR" altLang="ko-KR" sz="1600" dirty="0">
               <a:solidFill>
@@ -4758,6 +4770,340 @@
     <p:extLst>
       <p:ext uri="{BB962C8B-B14F-4D97-AF65-F5344CB8AC3E}">
         <p14:creationId xmlns:p14="http://schemas.microsoft.com/office/powerpoint/2010/main" val="1253038588"/>
+      </p:ext>
+    </p:extLst>
+  </p:cSld>
+  <p:clrMapOvr>
+    <a:masterClrMapping/>
+  </p:clrMapOvr>
+</p:sld>
+</file>
+
+<file path=ppt/slides/slide10.xml><?xml version="1.0" encoding="utf-8"?>
+<p:sld xmlns:a="http://schemas.openxmlformats.org/drawingml/2006/main" xmlns:r="http://schemas.openxmlformats.org/officeDocument/2006/relationships" xmlns:p="http://schemas.openxmlformats.org/presentationml/2006/main">
+  <p:cSld>
+    <p:spTree>
+      <p:nvGrpSpPr>
+        <p:cNvPr id="1" name=""/>
+        <p:cNvGrpSpPr/>
+        <p:nvPr/>
+      </p:nvGrpSpPr>
+      <p:grpSpPr>
+        <a:xfrm>
+          <a:off x="0" y="0"/>
+          <a:ext cx="0" cy="0"/>
+          <a:chOff x="0" y="0"/>
+          <a:chExt cx="0" cy="0"/>
+        </a:xfrm>
+      </p:grpSpPr>
+      <p:sp>
+        <p:nvSpPr>
+          <p:cNvPr id="4" name="TextBox 3">
+            <a:extLst>
+              <a:ext uri="{FF2B5EF4-FFF2-40B4-BE49-F238E27FC236}">
+                <a16:creationId xmlns:a16="http://schemas.microsoft.com/office/drawing/2014/main" id="{86F8687B-DF9F-3ABD-B296-52BB83E79372}"/>
+              </a:ext>
+            </a:extLst>
+          </p:cNvPr>
+          <p:cNvSpPr txBox="1"/>
+          <p:nvPr/>
+        </p:nvSpPr>
+        <p:spPr>
+          <a:xfrm>
+            <a:off x="116114" y="0"/>
+            <a:ext cx="1980029" cy="704873"/>
+          </a:xfrm>
+          <a:prstGeom prst="rect">
+            <a:avLst/>
+          </a:prstGeom>
+          <a:noFill/>
+        </p:spPr>
+        <p:txBody>
+          <a:bodyPr wrap="none" rtlCol="0">
+            <a:spAutoFit/>
+          </a:bodyPr>
+          <a:lstStyle/>
+          <a:p>
+            <a:pPr latinLnBrk="0">
+              <a:lnSpc>
+                <a:spcPct val="160000"/>
+              </a:lnSpc>
+              <a:tabLst>
+                <a:tab pos="1630680" algn="l"/>
+              </a:tabLst>
+            </a:pPr>
+            <a:r>
+              <a:rPr lang="en-US" altLang="ko-KR" sz="2800" dirty="0">
+                <a:solidFill>
+                  <a:schemeClr val="bg1">
+                    <a:lumMod val="95000"/>
+                  </a:schemeClr>
+                </a:solidFill>
+                <a:effectLst/>
+                <a:latin typeface="+mj-lt"/>
+                <a:ea typeface="함초롬바탕" panose="02030504000101010101" pitchFamily="18" charset="-127"/>
+                <a:cs typeface="굴림" panose="020B0600000101010101" pitchFamily="50" charset="-127"/>
+              </a:rPr>
+              <a:t>Conclusion</a:t>
+            </a:r>
+            <a:endParaRPr lang="ko-KR" altLang="ko-KR" sz="2800" dirty="0">
+              <a:solidFill>
+                <a:schemeClr val="bg1">
+                  <a:lumMod val="95000"/>
+                </a:schemeClr>
+              </a:solidFill>
+              <a:effectLst/>
+              <a:latin typeface="+mj-lt"/>
+              <a:ea typeface="함초롬바탕" panose="02030504000101010101" pitchFamily="18" charset="-127"/>
+              <a:cs typeface="굴림" panose="020B0600000101010101" pitchFamily="50" charset="-127"/>
+            </a:endParaRPr>
+          </a:p>
+        </p:txBody>
+      </p:sp>
+      <p:sp>
+        <p:nvSpPr>
+          <p:cNvPr id="7" name="TextBox 6">
+            <a:extLst>
+              <a:ext uri="{FF2B5EF4-FFF2-40B4-BE49-F238E27FC236}">
+                <a16:creationId xmlns:a16="http://schemas.microsoft.com/office/drawing/2014/main" id="{9F6AA450-5858-A76A-A041-785533F3724B}"/>
+              </a:ext>
+            </a:extLst>
+          </p:cNvPr>
+          <p:cNvSpPr txBox="1"/>
+          <p:nvPr/>
+        </p:nvSpPr>
+        <p:spPr>
+          <a:xfrm>
+            <a:off x="329126" y="2425423"/>
+            <a:ext cx="6724918" cy="2007153"/>
+          </a:xfrm>
+          <a:prstGeom prst="rect">
+            <a:avLst/>
+          </a:prstGeom>
+          <a:noFill/>
+        </p:spPr>
+        <p:txBody>
+          <a:bodyPr wrap="none" rtlCol="0">
+            <a:spAutoFit/>
+          </a:bodyPr>
+          <a:lstStyle/>
+          <a:p>
+            <a:pPr latinLnBrk="0">
+              <a:lnSpc>
+                <a:spcPct val="160000"/>
+              </a:lnSpc>
+              <a:tabLst>
+                <a:tab pos="1630680" algn="l"/>
+              </a:tabLst>
+            </a:pPr>
+            <a:r>
+              <a:rPr lang="en-US" altLang="ko-KR" sz="2000" dirty="0">
+                <a:solidFill>
+                  <a:schemeClr val="bg1">
+                    <a:lumMod val="95000"/>
+                  </a:schemeClr>
+                </a:solidFill>
+                <a:latin typeface="+mj-lt"/>
+                <a:ea typeface="함초롬바탕" panose="02030504000101010101" pitchFamily="18" charset="-127"/>
+                <a:cs typeface="굴림" panose="020B0600000101010101" pitchFamily="50" charset="-127"/>
+              </a:rPr>
+              <a:t>1. Operator Overloading</a:t>
+            </a:r>
+          </a:p>
+          <a:p>
+            <a:pPr latinLnBrk="0">
+              <a:lnSpc>
+                <a:spcPct val="160000"/>
+              </a:lnSpc>
+              <a:tabLst>
+                <a:tab pos="1630680" algn="l"/>
+              </a:tabLst>
+            </a:pPr>
+            <a:r>
+              <a:rPr lang="en-US" altLang="ko-KR" sz="2000" dirty="0">
+                <a:solidFill>
+                  <a:schemeClr val="bg1">
+                    <a:lumMod val="95000"/>
+                  </a:schemeClr>
+                </a:solidFill>
+                <a:latin typeface="+mj-lt"/>
+                <a:ea typeface="함초롬바탕" panose="02030504000101010101" pitchFamily="18" charset="-127"/>
+                <a:cs typeface="굴림" panose="020B0600000101010101" pitchFamily="50" charset="-127"/>
+              </a:rPr>
+              <a:t>2. Constructor and Destructor</a:t>
+            </a:r>
+          </a:p>
+          <a:p>
+            <a:pPr latinLnBrk="0">
+              <a:lnSpc>
+                <a:spcPct val="160000"/>
+              </a:lnSpc>
+              <a:tabLst>
+                <a:tab pos="1630680" algn="l"/>
+              </a:tabLst>
+            </a:pPr>
+            <a:r>
+              <a:rPr lang="en-US" altLang="ko-KR" sz="2000" dirty="0">
+                <a:solidFill>
+                  <a:schemeClr val="bg1">
+                    <a:lumMod val="95000"/>
+                  </a:schemeClr>
+                </a:solidFill>
+                <a:effectLst/>
+                <a:latin typeface="+mj-lt"/>
+                <a:ea typeface="함초롬바탕" panose="02030504000101010101" pitchFamily="18" charset="-127"/>
+                <a:cs typeface="굴림" panose="020B0600000101010101" pitchFamily="50" charset="-127"/>
+              </a:rPr>
+              <a:t>3. Copy Constructor and Assign Operator Overloading</a:t>
+            </a:r>
+          </a:p>
+          <a:p>
+            <a:pPr latinLnBrk="0">
+              <a:lnSpc>
+                <a:spcPct val="160000"/>
+              </a:lnSpc>
+              <a:tabLst>
+                <a:tab pos="1630680" algn="l"/>
+              </a:tabLst>
+            </a:pPr>
+            <a:r>
+              <a:rPr lang="en-US" altLang="ko-KR" sz="2000" dirty="0">
+                <a:solidFill>
+                  <a:schemeClr val="bg1">
+                    <a:lumMod val="95000"/>
+                  </a:schemeClr>
+                </a:solidFill>
+                <a:latin typeface="+mj-lt"/>
+                <a:ea typeface="함초롬바탕" panose="02030504000101010101" pitchFamily="18" charset="-127"/>
+                <a:cs typeface="굴림" panose="020B0600000101010101" pitchFamily="50" charset="-127"/>
+              </a:rPr>
+              <a:t>4. Encapsulation</a:t>
+            </a:r>
+            <a:endParaRPr lang="en-US" altLang="ko-KR" sz="2000" dirty="0">
+              <a:solidFill>
+                <a:schemeClr val="bg1">
+                  <a:lumMod val="95000"/>
+                </a:schemeClr>
+              </a:solidFill>
+              <a:effectLst/>
+              <a:latin typeface="+mj-lt"/>
+              <a:ea typeface="함초롬바탕" panose="02030504000101010101" pitchFamily="18" charset="-127"/>
+              <a:cs typeface="굴림" panose="020B0600000101010101" pitchFamily="50" charset="-127"/>
+            </a:endParaRPr>
+          </a:p>
+        </p:txBody>
+      </p:sp>
+    </p:spTree>
+    <p:extLst>
+      <p:ext uri="{BB962C8B-B14F-4D97-AF65-F5344CB8AC3E}">
+        <p14:creationId xmlns:p14="http://schemas.microsoft.com/office/powerpoint/2010/main" val="2045973972"/>
+      </p:ext>
+    </p:extLst>
+  </p:cSld>
+  <p:clrMapOvr>
+    <a:masterClrMapping/>
+  </p:clrMapOvr>
+</p:sld>
+</file>
+
+<file path=ppt/slides/slide11.xml><?xml version="1.0" encoding="utf-8"?>
+<p:sld xmlns:a="http://schemas.openxmlformats.org/drawingml/2006/main" xmlns:r="http://schemas.openxmlformats.org/officeDocument/2006/relationships" xmlns:p="http://schemas.openxmlformats.org/presentationml/2006/main">
+  <p:cSld>
+    <p:spTree>
+      <p:nvGrpSpPr>
+        <p:cNvPr id="1" name=""/>
+        <p:cNvGrpSpPr/>
+        <p:nvPr/>
+      </p:nvGrpSpPr>
+      <p:grpSpPr>
+        <a:xfrm>
+          <a:off x="0" y="0"/>
+          <a:ext cx="0" cy="0"/>
+          <a:chOff x="0" y="0"/>
+          <a:chExt cx="0" cy="0"/>
+        </a:xfrm>
+      </p:grpSpPr>
+      <p:sp>
+        <p:nvSpPr>
+          <p:cNvPr id="4" name="TextBox 3">
+            <a:extLst>
+              <a:ext uri="{FF2B5EF4-FFF2-40B4-BE49-F238E27FC236}">
+                <a16:creationId xmlns:a16="http://schemas.microsoft.com/office/drawing/2014/main" id="{65F3506E-0546-F9AC-4995-8E3A7CB5FB44}"/>
+              </a:ext>
+            </a:extLst>
+          </p:cNvPr>
+          <p:cNvSpPr txBox="1"/>
+          <p:nvPr/>
+        </p:nvSpPr>
+        <p:spPr>
+          <a:xfrm>
+            <a:off x="11237893" y="5890619"/>
+            <a:ext cx="954107" cy="967381"/>
+          </a:xfrm>
+          <a:prstGeom prst="rect">
+            <a:avLst/>
+          </a:prstGeom>
+          <a:noFill/>
+        </p:spPr>
+        <p:txBody>
+          <a:bodyPr wrap="none" rtlCol="0">
+            <a:spAutoFit/>
+          </a:bodyPr>
+          <a:lstStyle/>
+          <a:p>
+            <a:pPr latinLnBrk="0">
+              <a:lnSpc>
+                <a:spcPct val="160000"/>
+              </a:lnSpc>
+              <a:tabLst>
+                <a:tab pos="1630680" algn="l"/>
+              </a:tabLst>
+            </a:pPr>
+            <a:r>
+              <a:rPr lang="en-US" altLang="ko-KR" sz="4000" dirty="0">
+                <a:solidFill>
+                  <a:schemeClr val="bg1">
+                    <a:lumMod val="95000"/>
+                  </a:schemeClr>
+                </a:solidFill>
+                <a:effectLst/>
+                <a:latin typeface="+mj-lt"/>
+                <a:ea typeface="함초롬바탕" panose="02030504000101010101" pitchFamily="18" charset="-127"/>
+                <a:cs typeface="굴림" panose="020B0600000101010101" pitchFamily="50" charset="-127"/>
+              </a:rPr>
+              <a:t>E</a:t>
+            </a:r>
+            <a:r>
+              <a:rPr lang="en-US" altLang="ko-KR" sz="4000" dirty="0">
+                <a:solidFill>
+                  <a:schemeClr val="bg1">
+                    <a:lumMod val="95000"/>
+                  </a:schemeClr>
+                </a:solidFill>
+                <a:latin typeface="+mj-lt"/>
+                <a:ea typeface="함초롬바탕" panose="02030504000101010101" pitchFamily="18" charset="-127"/>
+                <a:cs typeface="굴림" panose="020B0600000101010101" pitchFamily="50" charset="-127"/>
+              </a:rPr>
+              <a:t>OF</a:t>
+            </a:r>
+            <a:endParaRPr lang="en-US" altLang="ko-KR" sz="4000" dirty="0">
+              <a:solidFill>
+                <a:schemeClr val="bg1">
+                  <a:lumMod val="95000"/>
+                </a:schemeClr>
+              </a:solidFill>
+              <a:effectLst/>
+              <a:latin typeface="+mj-lt"/>
+              <a:ea typeface="함초롬바탕" panose="02030504000101010101" pitchFamily="18" charset="-127"/>
+              <a:cs typeface="굴림" panose="020B0600000101010101" pitchFamily="50" charset="-127"/>
+            </a:endParaRPr>
+          </a:p>
+        </p:txBody>
+      </p:sp>
+    </p:spTree>
+    <p:extLst>
+      <p:ext uri="{BB962C8B-B14F-4D97-AF65-F5344CB8AC3E}">
+        <p14:creationId xmlns:p14="http://schemas.microsoft.com/office/powerpoint/2010/main" val="1829985206"/>
       </p:ext>
     </p:extLst>
   </p:cSld>
@@ -4784,10 +5130,185 @@
           <a:chExt cx="0" cy="0"/>
         </a:xfrm>
       </p:grpSpPr>
+      <p:sp>
+        <p:nvSpPr>
+          <p:cNvPr id="4" name="TextBox 3">
+            <a:extLst>
+              <a:ext uri="{FF2B5EF4-FFF2-40B4-BE49-F238E27FC236}">
+                <a16:creationId xmlns:a16="http://schemas.microsoft.com/office/drawing/2014/main" id="{DEA59F9A-2FCD-DE57-6598-1BE3D947B8DC}"/>
+              </a:ext>
+            </a:extLst>
+          </p:cNvPr>
+          <p:cNvSpPr txBox="1"/>
+          <p:nvPr/>
+        </p:nvSpPr>
+        <p:spPr>
+          <a:xfrm>
+            <a:off x="141777" y="0"/>
+            <a:ext cx="3153427" cy="704873"/>
+          </a:xfrm>
+          <a:prstGeom prst="rect">
+            <a:avLst/>
+          </a:prstGeom>
+          <a:noFill/>
+        </p:spPr>
+        <p:txBody>
+          <a:bodyPr wrap="none" rtlCol="0">
+            <a:spAutoFit/>
+          </a:bodyPr>
+          <a:lstStyle/>
+          <a:p>
+            <a:pPr latinLnBrk="0">
+              <a:lnSpc>
+                <a:spcPct val="160000"/>
+              </a:lnSpc>
+              <a:tabLst>
+                <a:tab pos="1630680" algn="l"/>
+              </a:tabLst>
+            </a:pPr>
+            <a:r>
+              <a:rPr lang="en-US" altLang="ko-KR" sz="2800" b="1" dirty="0">
+                <a:solidFill>
+                  <a:schemeClr val="bg1">
+                    <a:lumMod val="95000"/>
+                  </a:schemeClr>
+                </a:solidFill>
+                <a:effectLst/>
+                <a:latin typeface="+mj-lt"/>
+                <a:ea typeface="함초롬바탕" panose="02030504000101010101" pitchFamily="18" charset="-127"/>
+                <a:cs typeface="Times New Roman" panose="02020603050405020304" pitchFamily="18" charset="0"/>
+              </a:rPr>
+              <a:t>Project Managing</a:t>
+            </a:r>
+            <a:endParaRPr lang="ko-KR" altLang="ko-KR" sz="2800" dirty="0">
+              <a:solidFill>
+                <a:schemeClr val="bg1">
+                  <a:lumMod val="95000"/>
+                </a:schemeClr>
+              </a:solidFill>
+              <a:effectLst/>
+              <a:latin typeface="+mj-lt"/>
+              <a:ea typeface="함초롬바탕" panose="02030504000101010101" pitchFamily="18" charset="-127"/>
+              <a:cs typeface="굴림" panose="020B0600000101010101" pitchFamily="50" charset="-127"/>
+            </a:endParaRPr>
+          </a:p>
+        </p:txBody>
+      </p:sp>
+      <p:pic>
+        <p:nvPicPr>
+          <p:cNvPr id="6" name="Picture 5">
+            <a:extLst>
+              <a:ext uri="{FF2B5EF4-FFF2-40B4-BE49-F238E27FC236}">
+                <a16:creationId xmlns:a16="http://schemas.microsoft.com/office/drawing/2014/main" id="{8569720A-52D5-8189-9D1D-EA6ECE2E4101}"/>
+              </a:ext>
+            </a:extLst>
+          </p:cNvPr>
+          <p:cNvPicPr>
+            <a:picLocks noChangeAspect="1"/>
+          </p:cNvPicPr>
+          <p:nvPr/>
+        </p:nvPicPr>
+        <p:blipFill>
+          <a:blip r:embed="rId2"/>
+          <a:stretch>
+            <a:fillRect/>
+          </a:stretch>
+        </p:blipFill>
+        <p:spPr>
+          <a:xfrm>
+            <a:off x="141777" y="704873"/>
+            <a:ext cx="9889570" cy="5993877"/>
+          </a:xfrm>
+          <a:prstGeom prst="roundRect">
+            <a:avLst>
+              <a:gd name="adj" fmla="val 2075"/>
+            </a:avLst>
+          </a:prstGeom>
+        </p:spPr>
+      </p:pic>
+      <p:sp>
+        <p:nvSpPr>
+          <p:cNvPr id="7" name="TextBox 6">
+            <a:extLst>
+              <a:ext uri="{FF2B5EF4-FFF2-40B4-BE49-F238E27FC236}">
+                <a16:creationId xmlns:a16="http://schemas.microsoft.com/office/drawing/2014/main" id="{2B087C76-4F21-8E34-FA7A-16F269355651}"/>
+              </a:ext>
+            </a:extLst>
+          </p:cNvPr>
+          <p:cNvSpPr txBox="1"/>
+          <p:nvPr/>
+        </p:nvSpPr>
+        <p:spPr>
+          <a:xfrm>
+            <a:off x="135916" y="6188297"/>
+            <a:ext cx="6566221" cy="529825"/>
+          </a:xfrm>
+          <a:prstGeom prst="rect">
+            <a:avLst/>
+          </a:prstGeom>
+          <a:noFill/>
+        </p:spPr>
+        <p:txBody>
+          <a:bodyPr wrap="none" rtlCol="0">
+            <a:spAutoFit/>
+          </a:bodyPr>
+          <a:lstStyle/>
+          <a:p>
+            <a:pPr latinLnBrk="0">
+              <a:lnSpc>
+                <a:spcPct val="160000"/>
+              </a:lnSpc>
+              <a:tabLst>
+                <a:tab pos="1630680" algn="l"/>
+              </a:tabLst>
+            </a:pPr>
+            <a:r>
+              <a:rPr lang="en-US" altLang="ko-KR" sz="2000" b="1" dirty="0">
+                <a:solidFill>
+                  <a:schemeClr val="bg1">
+                    <a:lumMod val="95000"/>
+                  </a:schemeClr>
+                </a:solidFill>
+                <a:effectLst/>
+                <a:latin typeface="+mj-lt"/>
+                <a:ea typeface="함초롬바탕" panose="02030504000101010101" pitchFamily="18" charset="-127"/>
+                <a:cs typeface="Times New Roman" panose="02020603050405020304" pitchFamily="18" charset="0"/>
+                <a:hlinkClick r:id="rId3"/>
+              </a:rPr>
+              <a:t>https://github.com/Tastypotato245/OOP_Project02</a:t>
+            </a:r>
+            <a:r>
+              <a:rPr lang="en-US" altLang="ko-KR" sz="2000" b="1" dirty="0">
+                <a:solidFill>
+                  <a:schemeClr val="bg1">
+                    <a:lumMod val="95000"/>
+                  </a:schemeClr>
+                </a:solidFill>
+                <a:effectLst/>
+                <a:latin typeface="+mj-lt"/>
+                <a:ea typeface="함초롬바탕" panose="02030504000101010101" pitchFamily="18" charset="-127"/>
+                <a:cs typeface="Times New Roman" panose="02020603050405020304" pitchFamily="18" charset="0"/>
+              </a:rPr>
+              <a:t> </a:t>
+            </a:r>
+            <a:endParaRPr lang="ko-KR" altLang="ko-KR" sz="2000" dirty="0">
+              <a:solidFill>
+                <a:schemeClr val="bg1">
+                  <a:lumMod val="95000"/>
+                </a:schemeClr>
+              </a:solidFill>
+              <a:effectLst/>
+              <a:latin typeface="+mj-lt"/>
+              <a:ea typeface="함초롬바탕" panose="02030504000101010101" pitchFamily="18" charset="-127"/>
+              <a:cs typeface="굴림" panose="020B0600000101010101" pitchFamily="50" charset="-127"/>
+            </a:endParaRPr>
+          </a:p>
+        </p:txBody>
+      </p:sp>
     </p:spTree>
     <p:extLst>
       <p:ext uri="{BB962C8B-B14F-4D97-AF65-F5344CB8AC3E}">
-        <p14:creationId xmlns:p14="http://schemas.microsoft.com/office/powerpoint/2010/main" val="2130851643"/>
+        <p14:creationId xmlns:p14="http://schemas.microsoft.com/office/powerpoint/2010/main" val="520946006"/>
       </p:ext>
     </p:extLst>
   </p:cSld>
@@ -4814,10 +5335,74 @@
           <a:chExt cx="0" cy="0"/>
         </a:xfrm>
       </p:grpSpPr>
+      <p:sp>
+        <p:nvSpPr>
+          <p:cNvPr id="3" name="TextBox 2">
+            <a:extLst>
+              <a:ext uri="{FF2B5EF4-FFF2-40B4-BE49-F238E27FC236}">
+                <a16:creationId xmlns:a16="http://schemas.microsoft.com/office/drawing/2014/main" id="{6A7EBF06-2277-8CDD-7051-FC57179ABF0E}"/>
+              </a:ext>
+            </a:extLst>
+          </p:cNvPr>
+          <p:cNvSpPr txBox="1"/>
+          <p:nvPr/>
+        </p:nvSpPr>
+        <p:spPr>
+          <a:xfrm>
+            <a:off x="116114" y="0"/>
+            <a:ext cx="1800493" cy="704873"/>
+          </a:xfrm>
+          <a:prstGeom prst="rect">
+            <a:avLst/>
+          </a:prstGeom>
+          <a:noFill/>
+        </p:spPr>
+        <p:txBody>
+          <a:bodyPr wrap="none" rtlCol="0">
+            <a:spAutoFit/>
+          </a:bodyPr>
+          <a:lstStyle/>
+          <a:p>
+            <a:pPr algn="ctr" latinLnBrk="0">
+              <a:lnSpc>
+                <a:spcPct val="160000"/>
+              </a:lnSpc>
+              <a:tabLst>
+                <a:tab pos="1630680" algn="l"/>
+              </a:tabLst>
+            </a:pPr>
+            <a:r>
+              <a:rPr lang="en-US" altLang="ko-KR" sz="2800" b="1" dirty="0">
+                <a:solidFill>
+                  <a:schemeClr val="bg1">
+                    <a:lumMod val="95000"/>
+                  </a:schemeClr>
+                </a:solidFill>
+                <a:effectLst/>
+                <a:latin typeface="+mj-lt"/>
+                <a:ea typeface="함초롬바탕" panose="02030504000101010101" pitchFamily="18" charset="-127"/>
+                <a:cs typeface="Times New Roman" panose="02020603050405020304" pitchFamily="18" charset="0"/>
+              </a:rPr>
+              <a:t>Class UML</a:t>
+            </a:r>
+            <a:endParaRPr lang="ko-KR" altLang="ko-KR" sz="2800" dirty="0">
+              <a:solidFill>
+                <a:schemeClr val="bg1">
+                  <a:lumMod val="95000"/>
+                </a:schemeClr>
+              </a:solidFill>
+              <a:effectLst/>
+              <a:latin typeface="+mj-lt"/>
+              <a:ea typeface="함초롬바탕" panose="02030504000101010101" pitchFamily="18" charset="-127"/>
+              <a:cs typeface="굴림" panose="020B0600000101010101" pitchFamily="50" charset="-127"/>
+            </a:endParaRPr>
+          </a:p>
+        </p:txBody>
+      </p:sp>
     </p:spTree>
     <p:extLst>
       <p:ext uri="{BB962C8B-B14F-4D97-AF65-F5344CB8AC3E}">
-        <p14:creationId xmlns:p14="http://schemas.microsoft.com/office/powerpoint/2010/main" val="896900891"/>
+        <p14:creationId xmlns:p14="http://schemas.microsoft.com/office/powerpoint/2010/main" val="2130851643"/>
       </p:ext>
     </p:extLst>
   </p:cSld>
@@ -4844,10 +5429,1934 @@
           <a:chExt cx="0" cy="0"/>
         </a:xfrm>
       </p:grpSpPr>
+      <p:sp>
+        <p:nvSpPr>
+          <p:cNvPr id="2" name="TextBox 1">
+            <a:extLst>
+              <a:ext uri="{FF2B5EF4-FFF2-40B4-BE49-F238E27FC236}">
+                <a16:creationId xmlns:a16="http://schemas.microsoft.com/office/drawing/2014/main" id="{73186738-1BF1-BB66-67A8-AFD124A8ED81}"/>
+              </a:ext>
+            </a:extLst>
+          </p:cNvPr>
+          <p:cNvSpPr txBox="1"/>
+          <p:nvPr/>
+        </p:nvSpPr>
+        <p:spPr>
+          <a:xfrm>
+            <a:off x="116114" y="0"/>
+            <a:ext cx="2877711" cy="704873"/>
+          </a:xfrm>
+          <a:prstGeom prst="rect">
+            <a:avLst/>
+          </a:prstGeom>
+          <a:noFill/>
+        </p:spPr>
+        <p:txBody>
+          <a:bodyPr wrap="none" rtlCol="0">
+            <a:spAutoFit/>
+          </a:bodyPr>
+          <a:lstStyle/>
+          <a:p>
+            <a:pPr latinLnBrk="0">
+              <a:lnSpc>
+                <a:spcPct val="160000"/>
+              </a:lnSpc>
+              <a:tabLst>
+                <a:tab pos="1630680" algn="l"/>
+              </a:tabLst>
+            </a:pPr>
+            <a:r>
+              <a:rPr lang="en-US" altLang="ko-KR" sz="2800" b="1" dirty="0">
+                <a:solidFill>
+                  <a:schemeClr val="bg1">
+                    <a:lumMod val="95000"/>
+                  </a:schemeClr>
+                </a:solidFill>
+                <a:latin typeface="+mj-lt"/>
+                <a:ea typeface="함초롬바탕" panose="02030504000101010101" pitchFamily="18" charset="-127"/>
+                <a:cs typeface="Times New Roman" panose="02020603050405020304" pitchFamily="18" charset="0"/>
+              </a:rPr>
+              <a:t>Functionalities</a:t>
+            </a:r>
+            <a:endParaRPr lang="ko-KR" altLang="ko-KR" sz="2800" dirty="0">
+              <a:solidFill>
+                <a:schemeClr val="bg1">
+                  <a:lumMod val="95000"/>
+                </a:schemeClr>
+              </a:solidFill>
+              <a:effectLst/>
+              <a:latin typeface="+mj-lt"/>
+              <a:ea typeface="함초롬바탕" panose="02030504000101010101" pitchFamily="18" charset="-127"/>
+              <a:cs typeface="굴림" panose="020B0600000101010101" pitchFamily="50" charset="-127"/>
+            </a:endParaRPr>
+          </a:p>
+        </p:txBody>
+      </p:sp>
+      <p:grpSp>
+        <p:nvGrpSpPr>
+          <p:cNvPr id="22" name="그룹 21">
+            <a:extLst>
+              <a:ext uri="{FF2B5EF4-FFF2-40B4-BE49-F238E27FC236}">
+                <a16:creationId xmlns:a16="http://schemas.microsoft.com/office/drawing/2014/main" id="{5C9D5DAD-17EE-F8E9-44BE-1C80F0BA5CBA}"/>
+              </a:ext>
+            </a:extLst>
+          </p:cNvPr>
+          <p:cNvGrpSpPr/>
+          <p:nvPr/>
+        </p:nvGrpSpPr>
+        <p:grpSpPr>
+          <a:xfrm>
+            <a:off x="407125" y="2506376"/>
+            <a:ext cx="11377749" cy="2474828"/>
+            <a:chOff x="391882" y="2402067"/>
+            <a:chExt cx="11377749" cy="2474828"/>
+          </a:xfrm>
+        </p:grpSpPr>
+        <p:grpSp>
+          <p:nvGrpSpPr>
+            <p:cNvPr id="8" name="그룹 7">
+              <a:extLst>
+                <a:ext uri="{FF2B5EF4-FFF2-40B4-BE49-F238E27FC236}">
+                  <a16:creationId xmlns:a16="http://schemas.microsoft.com/office/drawing/2014/main" id="{79ACBDF6-A690-BC92-82B5-4F8C72C4C64C}"/>
+                </a:ext>
+              </a:extLst>
+            </p:cNvPr>
+            <p:cNvGrpSpPr/>
+            <p:nvPr/>
+          </p:nvGrpSpPr>
+          <p:grpSpPr>
+            <a:xfrm>
+              <a:off x="391882" y="2431096"/>
+              <a:ext cx="2877711" cy="2431285"/>
+              <a:chOff x="1374256" y="2380827"/>
+              <a:chExt cx="2877711" cy="2431285"/>
+            </a:xfrm>
+          </p:grpSpPr>
+          <p:sp>
+            <p:nvSpPr>
+              <p:cNvPr id="3" name="타원 2">
+                <a:extLst>
+                  <a:ext uri="{FF2B5EF4-FFF2-40B4-BE49-F238E27FC236}">
+                    <a16:creationId xmlns:a16="http://schemas.microsoft.com/office/drawing/2014/main" id="{FDC69717-7C9C-A516-77F0-A130DF6C9354}"/>
+                  </a:ext>
+                </a:extLst>
+              </p:cNvPr>
+              <p:cNvSpPr/>
+              <p:nvPr/>
+            </p:nvSpPr>
+            <p:spPr>
+              <a:xfrm>
+                <a:off x="1968140" y="2380827"/>
+                <a:ext cx="1689944" cy="1689944"/>
+              </a:xfrm>
+              <a:prstGeom prst="ellipse">
+                <a:avLst/>
+              </a:prstGeom>
+              <a:solidFill>
+                <a:srgbClr val="3B3B3B"/>
+              </a:solidFill>
+              <a:ln>
+                <a:noFill/>
+              </a:ln>
+            </p:spPr>
+            <p:style>
+              <a:lnRef idx="2">
+                <a:schemeClr val="accent1">
+                  <a:shade val="15000"/>
+                </a:schemeClr>
+              </a:lnRef>
+              <a:fillRef idx="1">
+                <a:schemeClr val="accent1"/>
+              </a:fillRef>
+              <a:effectRef idx="0">
+                <a:schemeClr val="accent1"/>
+              </a:effectRef>
+              <a:fontRef idx="minor">
+                <a:schemeClr val="lt1"/>
+              </a:fontRef>
+            </p:style>
+            <p:txBody>
+              <a:bodyPr rtlCol="0" anchor="ctr"/>
+              <a:lstStyle/>
+              <a:p>
+                <a:pPr algn="ctr"/>
+                <a:r>
+                  <a:rPr lang="en-US" altLang="ko-KR" dirty="0"/>
+                  <a:t>==</a:t>
+                </a:r>
+              </a:p>
+              <a:p>
+                <a:pPr algn="ctr"/>
+                <a:r>
+                  <a:rPr lang="en-US" altLang="ko-KR" dirty="0"/>
+                  <a:t>!=</a:t>
+                </a:r>
+              </a:p>
+              <a:p>
+                <a:pPr algn="ctr"/>
+                <a:r>
+                  <a:rPr lang="en-US" altLang="ko-KR" dirty="0"/>
+                  <a:t>&lt;</a:t>
+                </a:r>
+              </a:p>
+              <a:p>
+                <a:pPr algn="ctr"/>
+                <a:r>
+                  <a:rPr lang="en-US" altLang="ko-KR" dirty="0"/>
+                  <a:t>&gt;</a:t>
+                </a:r>
+                <a:endParaRPr lang="ko-KR" altLang="en-US" dirty="0"/>
+              </a:p>
+            </p:txBody>
+          </p:sp>
+          <p:sp>
+            <p:nvSpPr>
+              <p:cNvPr id="7" name="TextBox 6">
+                <a:extLst>
+                  <a:ext uri="{FF2B5EF4-FFF2-40B4-BE49-F238E27FC236}">
+                    <a16:creationId xmlns:a16="http://schemas.microsoft.com/office/drawing/2014/main" id="{39A2A685-DA17-01AA-909A-1B11CB85C596}"/>
+                  </a:ext>
+                </a:extLst>
+              </p:cNvPr>
+              <p:cNvSpPr txBox="1"/>
+              <p:nvPr/>
+            </p:nvSpPr>
+            <p:spPr>
+              <a:xfrm>
+                <a:off x="1374256" y="4442780"/>
+                <a:ext cx="2877711" cy="369332"/>
+              </a:xfrm>
+              <a:prstGeom prst="rect">
+                <a:avLst/>
+              </a:prstGeom>
+              <a:noFill/>
+            </p:spPr>
+            <p:txBody>
+              <a:bodyPr wrap="square">
+                <a:spAutoFit/>
+              </a:bodyPr>
+              <a:lstStyle/>
+              <a:p>
+                <a:pPr marL="0" marR="0" lvl="0" indent="0" algn="ctr" defTabSz="914400" rtl="0" eaLnBrk="1" fontAlgn="auto" latinLnBrk="1" hangingPunct="1">
+                  <a:lnSpc>
+                    <a:spcPct val="100000"/>
+                  </a:lnSpc>
+                  <a:spcBef>
+                    <a:spcPts val="0"/>
+                  </a:spcBef>
+                  <a:spcAft>
+                    <a:spcPts val="0"/>
+                  </a:spcAft>
+                  <a:buClrTx/>
+                  <a:buSzTx/>
+                  <a:buFontTx/>
+                  <a:buNone/>
+                  <a:tabLst/>
+                  <a:defRPr/>
+                </a:pPr>
+                <a:r>
+                  <a:rPr kumimoji="0" lang="en-US" altLang="ko-KR" sz="1800" b="0" i="0" u="none" strike="noStrike" kern="1200" cap="none" spc="0" normalizeH="0" baseline="0" noProof="0" dirty="0">
+                    <a:ln>
+                      <a:noFill/>
+                    </a:ln>
+                    <a:solidFill>
+                      <a:prstClr val="white"/>
+                    </a:solidFill>
+                    <a:effectLst/>
+                    <a:uLnTx/>
+                    <a:uFillTx/>
+                    <a:latin typeface="D2Coding"/>
+                    <a:ea typeface="D2Coding"/>
+                    <a:cs typeface="+mn-cs"/>
+                  </a:rPr>
+                  <a:t>Comparison </a:t>
+                </a:r>
+                <a:r>
+                  <a:rPr lang="en-US" altLang="ko-KR" dirty="0">
+                    <a:solidFill>
+                      <a:prstClr val="white"/>
+                    </a:solidFill>
+                    <a:latin typeface="D2Coding"/>
+                    <a:ea typeface="D2Coding"/>
+                  </a:rPr>
+                  <a:t>O</a:t>
+                </a:r>
+                <a:r>
+                  <a:rPr kumimoji="0" lang="en-US" altLang="ko-KR" sz="1800" b="0" i="0" u="none" strike="noStrike" kern="1200" cap="none" spc="0" normalizeH="0" baseline="0" noProof="0" dirty="0" err="1">
+                    <a:ln>
+                      <a:noFill/>
+                    </a:ln>
+                    <a:solidFill>
+                      <a:prstClr val="white"/>
+                    </a:solidFill>
+                    <a:effectLst/>
+                    <a:uLnTx/>
+                    <a:uFillTx/>
+                    <a:latin typeface="D2Coding"/>
+                    <a:ea typeface="D2Coding"/>
+                    <a:cs typeface="+mn-cs"/>
+                  </a:rPr>
+                  <a:t>perator</a:t>
+                </a:r>
+                <a:endParaRPr kumimoji="0" lang="ko-KR" altLang="en-US" sz="1800" b="0" i="0" u="none" strike="noStrike" kern="1200" cap="none" spc="0" normalizeH="0" baseline="0" noProof="0" dirty="0">
+                  <a:ln>
+                    <a:noFill/>
+                  </a:ln>
+                  <a:solidFill>
+                    <a:prstClr val="white"/>
+                  </a:solidFill>
+                  <a:effectLst/>
+                  <a:uLnTx/>
+                  <a:uFillTx/>
+                  <a:latin typeface="D2Coding"/>
+                  <a:ea typeface="D2Coding"/>
+                  <a:cs typeface="+mn-cs"/>
+                </a:endParaRPr>
+              </a:p>
+            </p:txBody>
+          </p:sp>
+        </p:grpSp>
+        <p:grpSp>
+          <p:nvGrpSpPr>
+            <p:cNvPr id="12" name="그룹 11">
+              <a:extLst>
+                <a:ext uri="{FF2B5EF4-FFF2-40B4-BE49-F238E27FC236}">
+                  <a16:creationId xmlns:a16="http://schemas.microsoft.com/office/drawing/2014/main" id="{33493380-4270-A576-90BE-F786D61D15C9}"/>
+                </a:ext>
+              </a:extLst>
+            </p:cNvPr>
+            <p:cNvGrpSpPr/>
+            <p:nvPr/>
+          </p:nvGrpSpPr>
+          <p:grpSpPr>
+            <a:xfrm>
+              <a:off x="3225228" y="2431096"/>
+              <a:ext cx="2877711" cy="2431285"/>
+              <a:chOff x="1294914" y="2380826"/>
+              <a:chExt cx="2877711" cy="2431285"/>
+            </a:xfrm>
+          </p:grpSpPr>
+          <p:sp>
+            <p:nvSpPr>
+              <p:cNvPr id="13" name="타원 12">
+                <a:extLst>
+                  <a:ext uri="{FF2B5EF4-FFF2-40B4-BE49-F238E27FC236}">
+                    <a16:creationId xmlns:a16="http://schemas.microsoft.com/office/drawing/2014/main" id="{B2606C68-1404-B539-9738-B3715F22B910}"/>
+                  </a:ext>
+                </a:extLst>
+              </p:cNvPr>
+              <p:cNvSpPr/>
+              <p:nvPr/>
+            </p:nvSpPr>
+            <p:spPr>
+              <a:xfrm>
+                <a:off x="1888798" y="2380826"/>
+                <a:ext cx="1689945" cy="1689945"/>
+              </a:xfrm>
+              <a:prstGeom prst="ellipse">
+                <a:avLst/>
+              </a:prstGeom>
+              <a:solidFill>
+                <a:srgbClr val="3B3B3B"/>
+              </a:solidFill>
+              <a:ln>
+                <a:noFill/>
+              </a:ln>
+            </p:spPr>
+            <p:style>
+              <a:lnRef idx="2">
+                <a:schemeClr val="accent1">
+                  <a:shade val="15000"/>
+                </a:schemeClr>
+              </a:lnRef>
+              <a:fillRef idx="1">
+                <a:schemeClr val="accent1"/>
+              </a:fillRef>
+              <a:effectRef idx="0">
+                <a:schemeClr val="accent1"/>
+              </a:effectRef>
+              <a:fontRef idx="minor">
+                <a:schemeClr val="lt1"/>
+              </a:fontRef>
+            </p:style>
+            <p:txBody>
+              <a:bodyPr rtlCol="0" anchor="ctr"/>
+              <a:lstStyle/>
+              <a:p>
+                <a:pPr algn="ctr"/>
+                <a:r>
+                  <a:rPr lang="en-US" altLang="ko-KR" dirty="0"/>
+                  <a:t>+</a:t>
+                </a:r>
+              </a:p>
+              <a:p>
+                <a:pPr algn="ctr"/>
+                <a:r>
+                  <a:rPr lang="en-US" altLang="ko-KR" dirty="0"/>
+                  <a:t>-</a:t>
+                </a:r>
+              </a:p>
+              <a:p>
+                <a:pPr algn="ctr"/>
+                <a:r>
+                  <a:rPr lang="en-US" altLang="ko-KR" dirty="0"/>
+                  <a:t>*</a:t>
+                </a:r>
+              </a:p>
+            </p:txBody>
+          </p:sp>
+          <p:sp>
+            <p:nvSpPr>
+              <p:cNvPr id="14" name="TextBox 13">
+                <a:extLst>
+                  <a:ext uri="{FF2B5EF4-FFF2-40B4-BE49-F238E27FC236}">
+                    <a16:creationId xmlns:a16="http://schemas.microsoft.com/office/drawing/2014/main" id="{CCA22F38-5240-2453-D2DA-8DCE3F2A0F62}"/>
+                  </a:ext>
+                </a:extLst>
+              </p:cNvPr>
+              <p:cNvSpPr txBox="1"/>
+              <p:nvPr/>
+            </p:nvSpPr>
+            <p:spPr>
+              <a:xfrm>
+                <a:off x="1294914" y="4442779"/>
+                <a:ext cx="2877711" cy="369332"/>
+              </a:xfrm>
+              <a:prstGeom prst="rect">
+                <a:avLst/>
+              </a:prstGeom>
+              <a:noFill/>
+            </p:spPr>
+            <p:txBody>
+              <a:bodyPr wrap="square">
+                <a:spAutoFit/>
+              </a:bodyPr>
+              <a:lstStyle/>
+              <a:p>
+                <a:pPr marL="0" marR="0" lvl="0" indent="0" algn="ctr" defTabSz="914400" rtl="0" eaLnBrk="1" fontAlgn="auto" latinLnBrk="1" hangingPunct="1">
+                  <a:lnSpc>
+                    <a:spcPct val="100000"/>
+                  </a:lnSpc>
+                  <a:spcBef>
+                    <a:spcPts val="0"/>
+                  </a:spcBef>
+                  <a:spcAft>
+                    <a:spcPts val="0"/>
+                  </a:spcAft>
+                  <a:buClrTx/>
+                  <a:buSzTx/>
+                  <a:buFontTx/>
+                  <a:buNone/>
+                  <a:tabLst/>
+                  <a:defRPr/>
+                </a:pPr>
+                <a:r>
+                  <a:rPr lang="en-US" altLang="ko-KR" dirty="0">
+                    <a:solidFill>
+                      <a:prstClr val="white"/>
+                    </a:solidFill>
+                    <a:latin typeface="D2Coding"/>
+                    <a:ea typeface="D2Coding"/>
+                  </a:rPr>
+                  <a:t>Arithmetic Operator</a:t>
+                </a:r>
+                <a:endParaRPr kumimoji="0" lang="ko-KR" altLang="en-US" sz="1800" b="0" i="0" u="none" strike="noStrike" kern="1200" cap="none" spc="0" normalizeH="0" baseline="0" noProof="0" dirty="0">
+                  <a:ln>
+                    <a:noFill/>
+                  </a:ln>
+                  <a:solidFill>
+                    <a:prstClr val="white"/>
+                  </a:solidFill>
+                  <a:effectLst/>
+                  <a:uLnTx/>
+                  <a:uFillTx/>
+                  <a:latin typeface="D2Coding"/>
+                  <a:ea typeface="D2Coding"/>
+                  <a:cs typeface="+mn-cs"/>
+                </a:endParaRPr>
+              </a:p>
+            </p:txBody>
+          </p:sp>
+        </p:grpSp>
+        <p:grpSp>
+          <p:nvGrpSpPr>
+            <p:cNvPr id="15" name="그룹 14">
+              <a:extLst>
+                <a:ext uri="{FF2B5EF4-FFF2-40B4-BE49-F238E27FC236}">
+                  <a16:creationId xmlns:a16="http://schemas.microsoft.com/office/drawing/2014/main" id="{F5ECE25E-92DF-16F1-7F7C-005301A60422}"/>
+                </a:ext>
+              </a:extLst>
+            </p:cNvPr>
+            <p:cNvGrpSpPr/>
+            <p:nvPr/>
+          </p:nvGrpSpPr>
+          <p:grpSpPr>
+            <a:xfrm>
+              <a:off x="6058574" y="2402067"/>
+              <a:ext cx="2877711" cy="2474828"/>
+              <a:chOff x="1425542" y="2322769"/>
+              <a:chExt cx="2877711" cy="2474828"/>
+            </a:xfrm>
+          </p:grpSpPr>
+          <p:sp>
+            <p:nvSpPr>
+              <p:cNvPr id="16" name="타원 15">
+                <a:extLst>
+                  <a:ext uri="{FF2B5EF4-FFF2-40B4-BE49-F238E27FC236}">
+                    <a16:creationId xmlns:a16="http://schemas.microsoft.com/office/drawing/2014/main" id="{292F4041-BA9A-C0A1-4CD4-074E1838675E}"/>
+                  </a:ext>
+                </a:extLst>
+              </p:cNvPr>
+              <p:cNvSpPr/>
+              <p:nvPr/>
+            </p:nvSpPr>
+            <p:spPr>
+              <a:xfrm>
+                <a:off x="2019426" y="2322769"/>
+                <a:ext cx="1689945" cy="1689945"/>
+              </a:xfrm>
+              <a:prstGeom prst="ellipse">
+                <a:avLst/>
+              </a:prstGeom>
+              <a:solidFill>
+                <a:srgbClr val="3B3B3B"/>
+              </a:solidFill>
+              <a:ln>
+                <a:noFill/>
+              </a:ln>
+            </p:spPr>
+            <p:style>
+              <a:lnRef idx="2">
+                <a:schemeClr val="accent1">
+                  <a:shade val="15000"/>
+                </a:schemeClr>
+              </a:lnRef>
+              <a:fillRef idx="1">
+                <a:schemeClr val="accent1"/>
+              </a:fillRef>
+              <a:effectRef idx="0">
+                <a:schemeClr val="accent1"/>
+              </a:effectRef>
+              <a:fontRef idx="minor">
+                <a:schemeClr val="lt1"/>
+              </a:fontRef>
+            </p:style>
+            <p:txBody>
+              <a:bodyPr rtlCol="0" anchor="ctr"/>
+              <a:lstStyle/>
+              <a:p>
+                <a:pPr algn="ctr"/>
+                <a:r>
+                  <a:rPr lang="en-US" altLang="ko-KR" dirty="0"/>
+                  <a:t>=</a:t>
+                </a:r>
+              </a:p>
+            </p:txBody>
+          </p:sp>
+          <p:sp>
+            <p:nvSpPr>
+              <p:cNvPr id="17" name="TextBox 16">
+                <a:extLst>
+                  <a:ext uri="{FF2B5EF4-FFF2-40B4-BE49-F238E27FC236}">
+                    <a16:creationId xmlns:a16="http://schemas.microsoft.com/office/drawing/2014/main" id="{29B4E870-ED38-D026-5C20-17B16014CC2B}"/>
+                  </a:ext>
+                </a:extLst>
+              </p:cNvPr>
+              <p:cNvSpPr txBox="1"/>
+              <p:nvPr/>
+            </p:nvSpPr>
+            <p:spPr>
+              <a:xfrm>
+                <a:off x="1425542" y="4428265"/>
+                <a:ext cx="2877711" cy="369332"/>
+              </a:xfrm>
+              <a:prstGeom prst="rect">
+                <a:avLst/>
+              </a:prstGeom>
+              <a:noFill/>
+            </p:spPr>
+            <p:txBody>
+              <a:bodyPr wrap="square">
+                <a:spAutoFit/>
+              </a:bodyPr>
+              <a:lstStyle/>
+              <a:p>
+                <a:pPr marL="0" marR="0" lvl="0" indent="0" algn="ctr" defTabSz="914400" rtl="0" eaLnBrk="1" fontAlgn="auto" latinLnBrk="1" hangingPunct="1">
+                  <a:lnSpc>
+                    <a:spcPct val="100000"/>
+                  </a:lnSpc>
+                  <a:spcBef>
+                    <a:spcPts val="0"/>
+                  </a:spcBef>
+                  <a:spcAft>
+                    <a:spcPts val="0"/>
+                  </a:spcAft>
+                  <a:buClrTx/>
+                  <a:buSzTx/>
+                  <a:buFontTx/>
+                  <a:buNone/>
+                  <a:tabLst/>
+                  <a:defRPr/>
+                </a:pPr>
+                <a:r>
+                  <a:rPr lang="en-US" altLang="ko-KR" dirty="0">
+                    <a:solidFill>
+                      <a:prstClr val="white"/>
+                    </a:solidFill>
+                    <a:latin typeface="D2Coding"/>
+                    <a:ea typeface="D2Coding"/>
+                  </a:rPr>
+                  <a:t>Assignment Operator</a:t>
+                </a:r>
+                <a:endParaRPr kumimoji="0" lang="ko-KR" altLang="en-US" sz="1800" b="0" i="0" u="none" strike="noStrike" kern="1200" cap="none" spc="0" normalizeH="0" baseline="0" noProof="0" dirty="0">
+                  <a:ln>
+                    <a:noFill/>
+                  </a:ln>
+                  <a:solidFill>
+                    <a:prstClr val="white"/>
+                  </a:solidFill>
+                  <a:effectLst/>
+                  <a:uLnTx/>
+                  <a:uFillTx/>
+                  <a:latin typeface="D2Coding"/>
+                  <a:ea typeface="D2Coding"/>
+                  <a:cs typeface="+mn-cs"/>
+                </a:endParaRPr>
+              </a:p>
+            </p:txBody>
+          </p:sp>
+        </p:grpSp>
+        <p:grpSp>
+          <p:nvGrpSpPr>
+            <p:cNvPr id="18" name="그룹 17">
+              <a:extLst>
+                <a:ext uri="{FF2B5EF4-FFF2-40B4-BE49-F238E27FC236}">
+                  <a16:creationId xmlns:a16="http://schemas.microsoft.com/office/drawing/2014/main" id="{1314E209-21CC-7BA2-2B9D-39548419671A}"/>
+                </a:ext>
+              </a:extLst>
+            </p:cNvPr>
+            <p:cNvGrpSpPr/>
+            <p:nvPr/>
+          </p:nvGrpSpPr>
+          <p:grpSpPr>
+            <a:xfrm>
+              <a:off x="8891920" y="2431096"/>
+              <a:ext cx="2877711" cy="2431285"/>
+              <a:chOff x="1483600" y="2380826"/>
+              <a:chExt cx="2877711" cy="2431285"/>
+            </a:xfrm>
+          </p:grpSpPr>
+          <p:sp>
+            <p:nvSpPr>
+              <p:cNvPr id="19" name="타원 18">
+                <a:extLst>
+                  <a:ext uri="{FF2B5EF4-FFF2-40B4-BE49-F238E27FC236}">
+                    <a16:creationId xmlns:a16="http://schemas.microsoft.com/office/drawing/2014/main" id="{CD835328-0449-E5C9-757B-CABB29143596}"/>
+                  </a:ext>
+                </a:extLst>
+              </p:cNvPr>
+              <p:cNvSpPr/>
+              <p:nvPr/>
+            </p:nvSpPr>
+            <p:spPr>
+              <a:xfrm>
+                <a:off x="2077484" y="2380826"/>
+                <a:ext cx="1689945" cy="1689945"/>
+              </a:xfrm>
+              <a:prstGeom prst="ellipse">
+                <a:avLst/>
+              </a:prstGeom>
+              <a:solidFill>
+                <a:srgbClr val="3B3B3B"/>
+              </a:solidFill>
+              <a:ln>
+                <a:noFill/>
+              </a:ln>
+            </p:spPr>
+            <p:style>
+              <a:lnRef idx="2">
+                <a:schemeClr val="accent1">
+                  <a:shade val="15000"/>
+                </a:schemeClr>
+              </a:lnRef>
+              <a:fillRef idx="1">
+                <a:schemeClr val="accent1"/>
+              </a:fillRef>
+              <a:effectRef idx="0">
+                <a:schemeClr val="accent1"/>
+              </a:effectRef>
+              <a:fontRef idx="minor">
+                <a:schemeClr val="lt1"/>
+              </a:fontRef>
+            </p:style>
+            <p:txBody>
+              <a:bodyPr rtlCol="0" anchor="ctr"/>
+              <a:lstStyle/>
+              <a:p>
+                <a:pPr algn="ctr"/>
+                <a:r>
+                  <a:rPr lang="en-US" altLang="ko-KR" dirty="0"/>
+                  <a:t>&lt;&lt;</a:t>
+                </a:r>
+              </a:p>
+            </p:txBody>
+          </p:sp>
+          <p:sp>
+            <p:nvSpPr>
+              <p:cNvPr id="20" name="TextBox 19">
+                <a:extLst>
+                  <a:ext uri="{FF2B5EF4-FFF2-40B4-BE49-F238E27FC236}">
+                    <a16:creationId xmlns:a16="http://schemas.microsoft.com/office/drawing/2014/main" id="{0CF499E1-ED97-D984-5D32-24698E99F2FA}"/>
+                  </a:ext>
+                </a:extLst>
+              </p:cNvPr>
+              <p:cNvSpPr txBox="1"/>
+              <p:nvPr/>
+            </p:nvSpPr>
+            <p:spPr>
+              <a:xfrm>
+                <a:off x="1483600" y="4442779"/>
+                <a:ext cx="2877711" cy="369332"/>
+              </a:xfrm>
+              <a:prstGeom prst="rect">
+                <a:avLst/>
+              </a:prstGeom>
+              <a:noFill/>
+            </p:spPr>
+            <p:txBody>
+              <a:bodyPr wrap="square">
+                <a:spAutoFit/>
+              </a:bodyPr>
+              <a:lstStyle/>
+              <a:p>
+                <a:pPr marL="0" marR="0" lvl="0" indent="0" algn="ctr" defTabSz="914400" rtl="0" eaLnBrk="1" fontAlgn="auto" latinLnBrk="1" hangingPunct="1">
+                  <a:lnSpc>
+                    <a:spcPct val="100000"/>
+                  </a:lnSpc>
+                  <a:spcBef>
+                    <a:spcPts val="0"/>
+                  </a:spcBef>
+                  <a:spcAft>
+                    <a:spcPts val="0"/>
+                  </a:spcAft>
+                  <a:buClrTx/>
+                  <a:buSzTx/>
+                  <a:buFontTx/>
+                  <a:buNone/>
+                  <a:tabLst/>
+                  <a:defRPr/>
+                </a:pPr>
+                <a:r>
+                  <a:rPr lang="en-US" altLang="ko-KR" dirty="0" err="1">
+                    <a:solidFill>
+                      <a:prstClr val="white"/>
+                    </a:solidFill>
+                    <a:latin typeface="D2Coding"/>
+                    <a:ea typeface="D2Coding"/>
+                  </a:rPr>
+                  <a:t>Ostream</a:t>
+                </a:r>
+                <a:r>
+                  <a:rPr lang="en-US" altLang="ko-KR" dirty="0">
+                    <a:solidFill>
+                      <a:prstClr val="white"/>
+                    </a:solidFill>
+                    <a:latin typeface="D2Coding"/>
+                    <a:ea typeface="D2Coding"/>
+                  </a:rPr>
+                  <a:t> Operator</a:t>
+                </a:r>
+                <a:endParaRPr kumimoji="0" lang="ko-KR" altLang="en-US" sz="1800" b="0" i="0" u="none" strike="noStrike" kern="1200" cap="none" spc="0" normalizeH="0" baseline="0" noProof="0" dirty="0">
+                  <a:ln>
+                    <a:noFill/>
+                  </a:ln>
+                  <a:solidFill>
+                    <a:prstClr val="white"/>
+                  </a:solidFill>
+                  <a:effectLst/>
+                  <a:uLnTx/>
+                  <a:uFillTx/>
+                  <a:latin typeface="D2Coding"/>
+                  <a:ea typeface="D2Coding"/>
+                  <a:cs typeface="+mn-cs"/>
+                </a:endParaRPr>
+              </a:p>
+            </p:txBody>
+          </p:sp>
+        </p:grpSp>
+      </p:grpSp>
+    </p:spTree>
+    <p:extLst>
+      <p:ext uri="{BB962C8B-B14F-4D97-AF65-F5344CB8AC3E}">
+        <p14:creationId xmlns:p14="http://schemas.microsoft.com/office/powerpoint/2010/main" val="896900891"/>
+      </p:ext>
+    </p:extLst>
+  </p:cSld>
+  <p:clrMapOvr>
+    <a:masterClrMapping/>
+  </p:clrMapOvr>
+</p:sld>
+</file>
+
+<file path=ppt/slides/slide5.xml><?xml version="1.0" encoding="utf-8"?>
+<p:sld xmlns:a="http://schemas.openxmlformats.org/drawingml/2006/main" xmlns:r="http://schemas.openxmlformats.org/officeDocument/2006/relationships" xmlns:p="http://schemas.openxmlformats.org/presentationml/2006/main">
+  <p:cSld>
+    <p:spTree>
+      <p:nvGrpSpPr>
+        <p:cNvPr id="1" name=""/>
+        <p:cNvGrpSpPr/>
+        <p:nvPr/>
+      </p:nvGrpSpPr>
+      <p:grpSpPr>
+        <a:xfrm>
+          <a:off x="0" y="0"/>
+          <a:ext cx="0" cy="0"/>
+          <a:chOff x="0" y="0"/>
+          <a:chExt cx="0" cy="0"/>
+        </a:xfrm>
+      </p:grpSpPr>
+      <p:sp>
+        <p:nvSpPr>
+          <p:cNvPr id="2" name="TextBox 1">
+            <a:extLst>
+              <a:ext uri="{FF2B5EF4-FFF2-40B4-BE49-F238E27FC236}">
+                <a16:creationId xmlns:a16="http://schemas.microsoft.com/office/drawing/2014/main" id="{4E856CC1-67DF-D2B7-2862-704626C3D540}"/>
+              </a:ext>
+            </a:extLst>
+          </p:cNvPr>
+          <p:cNvSpPr txBox="1"/>
+          <p:nvPr/>
+        </p:nvSpPr>
+        <p:spPr>
+          <a:xfrm>
+            <a:off x="116114" y="0"/>
+            <a:ext cx="2877711" cy="704873"/>
+          </a:xfrm>
+          <a:prstGeom prst="rect">
+            <a:avLst/>
+          </a:prstGeom>
+          <a:noFill/>
+        </p:spPr>
+        <p:txBody>
+          <a:bodyPr wrap="none" rtlCol="0">
+            <a:spAutoFit/>
+          </a:bodyPr>
+          <a:lstStyle/>
+          <a:p>
+            <a:pPr latinLnBrk="0">
+              <a:lnSpc>
+                <a:spcPct val="160000"/>
+              </a:lnSpc>
+              <a:tabLst>
+                <a:tab pos="1630680" algn="l"/>
+              </a:tabLst>
+            </a:pPr>
+            <a:r>
+              <a:rPr lang="en-US" altLang="ko-KR" sz="2800" b="1" dirty="0">
+                <a:solidFill>
+                  <a:schemeClr val="bg1">
+                    <a:lumMod val="95000"/>
+                  </a:schemeClr>
+                </a:solidFill>
+                <a:latin typeface="+mj-lt"/>
+                <a:ea typeface="함초롬바탕" panose="02030504000101010101" pitchFamily="18" charset="-127"/>
+                <a:cs typeface="Times New Roman" panose="02020603050405020304" pitchFamily="18" charset="0"/>
+              </a:rPr>
+              <a:t>Functionalities</a:t>
+            </a:r>
+            <a:endParaRPr lang="ko-KR" altLang="ko-KR" sz="2800" dirty="0">
+              <a:solidFill>
+                <a:schemeClr val="bg1">
+                  <a:lumMod val="95000"/>
+                </a:schemeClr>
+              </a:solidFill>
+              <a:effectLst/>
+              <a:latin typeface="+mj-lt"/>
+              <a:ea typeface="함초롬바탕" panose="02030504000101010101" pitchFamily="18" charset="-127"/>
+              <a:cs typeface="굴림" panose="020B0600000101010101" pitchFamily="50" charset="-127"/>
+            </a:endParaRPr>
+          </a:p>
+        </p:txBody>
+      </p:sp>
+      <p:sp>
+        <p:nvSpPr>
+          <p:cNvPr id="17" name="TextBox 16">
+            <a:extLst>
+              <a:ext uri="{FF2B5EF4-FFF2-40B4-BE49-F238E27FC236}">
+                <a16:creationId xmlns:a16="http://schemas.microsoft.com/office/drawing/2014/main" id="{AAC8B719-EC07-B938-6B3F-C222546812E6}"/>
+              </a:ext>
+            </a:extLst>
+          </p:cNvPr>
+          <p:cNvSpPr txBox="1"/>
+          <p:nvPr/>
+        </p:nvSpPr>
+        <p:spPr>
+          <a:xfrm>
+            <a:off x="116114" y="1033156"/>
+            <a:ext cx="4471616" cy="400110"/>
+          </a:xfrm>
+          <a:prstGeom prst="rect">
+            <a:avLst/>
+          </a:prstGeom>
+          <a:noFill/>
+        </p:spPr>
+        <p:txBody>
+          <a:bodyPr wrap="square">
+            <a:spAutoFit/>
+          </a:bodyPr>
+          <a:lstStyle/>
+          <a:p>
+            <a:pPr marL="0" marR="0" lvl="0" indent="0" defTabSz="914400" rtl="0" eaLnBrk="1" fontAlgn="auto" latinLnBrk="1" hangingPunct="1">
+              <a:lnSpc>
+                <a:spcPct val="100000"/>
+              </a:lnSpc>
+              <a:spcBef>
+                <a:spcPts val="0"/>
+              </a:spcBef>
+              <a:spcAft>
+                <a:spcPts val="0"/>
+              </a:spcAft>
+              <a:buClrTx/>
+              <a:buSzTx/>
+              <a:buFontTx/>
+              <a:buNone/>
+              <a:tabLst/>
+              <a:defRPr/>
+            </a:pPr>
+            <a:r>
+              <a:rPr lang="en-US" altLang="ko-KR" sz="2000" dirty="0">
+                <a:solidFill>
+                  <a:prstClr val="white"/>
+                </a:solidFill>
+                <a:latin typeface="D2Coding"/>
+                <a:ea typeface="D2Coding"/>
+              </a:rPr>
+              <a:t>Single Operation</a:t>
+            </a:r>
+            <a:endParaRPr kumimoji="0" lang="ko-KR" altLang="en-US" sz="2000" b="0" i="0" u="none" strike="noStrike" kern="1200" cap="none" spc="0" normalizeH="0" baseline="0" noProof="0" dirty="0">
+              <a:ln>
+                <a:noFill/>
+              </a:ln>
+              <a:solidFill>
+                <a:prstClr val="white"/>
+              </a:solidFill>
+              <a:effectLst/>
+              <a:uLnTx/>
+              <a:uFillTx/>
+              <a:latin typeface="D2Coding"/>
+              <a:ea typeface="D2Coding"/>
+              <a:cs typeface="+mn-cs"/>
+            </a:endParaRPr>
+          </a:p>
+        </p:txBody>
+      </p:sp>
+      <p:pic>
+        <p:nvPicPr>
+          <p:cNvPr id="7" name="Picture 6">
+            <a:extLst>
+              <a:ext uri="{FF2B5EF4-FFF2-40B4-BE49-F238E27FC236}">
+                <a16:creationId xmlns:a16="http://schemas.microsoft.com/office/drawing/2014/main" id="{43748868-81FB-BB1E-613F-262ED8AEB592}"/>
+              </a:ext>
+            </a:extLst>
+          </p:cNvPr>
+          <p:cNvPicPr>
+            <a:picLocks noChangeAspect="1"/>
+          </p:cNvPicPr>
+          <p:nvPr/>
+        </p:nvPicPr>
+        <p:blipFill rotWithShape="1">
+          <a:blip r:embed="rId2"/>
+          <a:srcRect l="257"/>
+          <a:stretch/>
+        </p:blipFill>
+        <p:spPr>
+          <a:xfrm>
+            <a:off x="274761" y="1603386"/>
+            <a:ext cx="8911769" cy="1632631"/>
+          </a:xfrm>
+          <a:prstGeom prst="rect">
+            <a:avLst/>
+          </a:prstGeom>
+        </p:spPr>
+      </p:pic>
+      <p:pic>
+        <p:nvPicPr>
+          <p:cNvPr id="8" name="Picture 7">
+            <a:extLst>
+              <a:ext uri="{FF2B5EF4-FFF2-40B4-BE49-F238E27FC236}">
+                <a16:creationId xmlns:a16="http://schemas.microsoft.com/office/drawing/2014/main" id="{E0EA1DFC-66A0-106D-0A2F-78903225E7E0}"/>
+              </a:ext>
+            </a:extLst>
+          </p:cNvPr>
+          <p:cNvPicPr>
+            <a:picLocks noChangeAspect="1"/>
+          </p:cNvPicPr>
+          <p:nvPr/>
+        </p:nvPicPr>
+        <p:blipFill>
+          <a:blip r:embed="rId3"/>
+          <a:stretch>
+            <a:fillRect/>
+          </a:stretch>
+        </p:blipFill>
+        <p:spPr>
+          <a:xfrm>
+            <a:off x="274761" y="3879609"/>
+            <a:ext cx="5054477" cy="2398188"/>
+          </a:xfrm>
+          <a:prstGeom prst="rect">
+            <a:avLst/>
+          </a:prstGeom>
+        </p:spPr>
+      </p:pic>
     </p:spTree>
     <p:extLst>
       <p:ext uri="{BB962C8B-B14F-4D97-AF65-F5344CB8AC3E}">
         <p14:creationId xmlns:p14="http://schemas.microsoft.com/office/powerpoint/2010/main" val="3681593338"/>
+      </p:ext>
+    </p:extLst>
+  </p:cSld>
+  <p:clrMapOvr>
+    <a:masterClrMapping/>
+  </p:clrMapOvr>
+</p:sld>
+</file>
+
+<file path=ppt/slides/slide6.xml><?xml version="1.0" encoding="utf-8"?>
+<p:sld xmlns:a="http://schemas.openxmlformats.org/drawingml/2006/main" xmlns:r="http://schemas.openxmlformats.org/officeDocument/2006/relationships" xmlns:p="http://schemas.openxmlformats.org/presentationml/2006/main">
+  <p:cSld>
+    <p:spTree>
+      <p:nvGrpSpPr>
+        <p:cNvPr id="1" name=""/>
+        <p:cNvGrpSpPr/>
+        <p:nvPr/>
+      </p:nvGrpSpPr>
+      <p:grpSpPr>
+        <a:xfrm>
+          <a:off x="0" y="0"/>
+          <a:ext cx="0" cy="0"/>
+          <a:chOff x="0" y="0"/>
+          <a:chExt cx="0" cy="0"/>
+        </a:xfrm>
+      </p:grpSpPr>
+      <p:sp>
+        <p:nvSpPr>
+          <p:cNvPr id="2" name="TextBox 1">
+            <a:extLst>
+              <a:ext uri="{FF2B5EF4-FFF2-40B4-BE49-F238E27FC236}">
+                <a16:creationId xmlns:a16="http://schemas.microsoft.com/office/drawing/2014/main" id="{4E856CC1-67DF-D2B7-2862-704626C3D540}"/>
+              </a:ext>
+            </a:extLst>
+          </p:cNvPr>
+          <p:cNvSpPr txBox="1"/>
+          <p:nvPr/>
+        </p:nvSpPr>
+        <p:spPr>
+          <a:xfrm>
+            <a:off x="116114" y="0"/>
+            <a:ext cx="2877711" cy="704873"/>
+          </a:xfrm>
+          <a:prstGeom prst="rect">
+            <a:avLst/>
+          </a:prstGeom>
+          <a:noFill/>
+        </p:spPr>
+        <p:txBody>
+          <a:bodyPr wrap="none" rtlCol="0">
+            <a:spAutoFit/>
+          </a:bodyPr>
+          <a:lstStyle/>
+          <a:p>
+            <a:pPr latinLnBrk="0">
+              <a:lnSpc>
+                <a:spcPct val="160000"/>
+              </a:lnSpc>
+              <a:tabLst>
+                <a:tab pos="1630680" algn="l"/>
+              </a:tabLst>
+            </a:pPr>
+            <a:r>
+              <a:rPr lang="en-US" altLang="ko-KR" sz="2800" b="1" dirty="0">
+                <a:solidFill>
+                  <a:schemeClr val="bg1">
+                    <a:lumMod val="95000"/>
+                  </a:schemeClr>
+                </a:solidFill>
+                <a:latin typeface="+mj-lt"/>
+                <a:ea typeface="함초롬바탕" panose="02030504000101010101" pitchFamily="18" charset="-127"/>
+                <a:cs typeface="Times New Roman" panose="02020603050405020304" pitchFamily="18" charset="0"/>
+              </a:rPr>
+              <a:t>Functionalities</a:t>
+            </a:r>
+            <a:endParaRPr lang="ko-KR" altLang="ko-KR" sz="2800" dirty="0">
+              <a:solidFill>
+                <a:schemeClr val="bg1">
+                  <a:lumMod val="95000"/>
+                </a:schemeClr>
+              </a:solidFill>
+              <a:effectLst/>
+              <a:latin typeface="+mj-lt"/>
+              <a:ea typeface="함초롬바탕" panose="02030504000101010101" pitchFamily="18" charset="-127"/>
+              <a:cs typeface="굴림" panose="020B0600000101010101" pitchFamily="50" charset="-127"/>
+            </a:endParaRPr>
+          </a:p>
+        </p:txBody>
+      </p:sp>
+      <p:sp>
+        <p:nvSpPr>
+          <p:cNvPr id="17" name="TextBox 16">
+            <a:extLst>
+              <a:ext uri="{FF2B5EF4-FFF2-40B4-BE49-F238E27FC236}">
+                <a16:creationId xmlns:a16="http://schemas.microsoft.com/office/drawing/2014/main" id="{AAC8B719-EC07-B938-6B3F-C222546812E6}"/>
+              </a:ext>
+            </a:extLst>
+          </p:cNvPr>
+          <p:cNvSpPr txBox="1"/>
+          <p:nvPr/>
+        </p:nvSpPr>
+        <p:spPr>
+          <a:xfrm>
+            <a:off x="116114" y="1033156"/>
+            <a:ext cx="4471616" cy="400110"/>
+          </a:xfrm>
+          <a:prstGeom prst="rect">
+            <a:avLst/>
+          </a:prstGeom>
+          <a:noFill/>
+        </p:spPr>
+        <p:txBody>
+          <a:bodyPr wrap="square">
+            <a:spAutoFit/>
+          </a:bodyPr>
+          <a:lstStyle/>
+          <a:p>
+            <a:pPr marL="0" marR="0" lvl="0" indent="0" defTabSz="914400" rtl="0" eaLnBrk="1" fontAlgn="auto" latinLnBrk="1" hangingPunct="1">
+              <a:lnSpc>
+                <a:spcPct val="100000"/>
+              </a:lnSpc>
+              <a:spcBef>
+                <a:spcPts val="0"/>
+              </a:spcBef>
+              <a:spcAft>
+                <a:spcPts val="0"/>
+              </a:spcAft>
+              <a:buClrTx/>
+              <a:buSzTx/>
+              <a:buFontTx/>
+              <a:buNone/>
+              <a:tabLst/>
+              <a:defRPr/>
+            </a:pPr>
+            <a:r>
+              <a:rPr lang="en-US" altLang="ko-KR" sz="2000" dirty="0">
+                <a:solidFill>
+                  <a:prstClr val="white"/>
+                </a:solidFill>
+                <a:latin typeface="D2Coding"/>
+                <a:ea typeface="D2Coding"/>
+              </a:rPr>
+              <a:t>Multiple Operation</a:t>
+            </a:r>
+            <a:endParaRPr kumimoji="0" lang="ko-KR" altLang="en-US" sz="2000" b="0" i="0" u="none" strike="noStrike" kern="1200" cap="none" spc="0" normalizeH="0" baseline="0" noProof="0" dirty="0">
+              <a:ln>
+                <a:noFill/>
+              </a:ln>
+              <a:solidFill>
+                <a:prstClr val="white"/>
+              </a:solidFill>
+              <a:effectLst/>
+              <a:uLnTx/>
+              <a:uFillTx/>
+              <a:latin typeface="D2Coding"/>
+              <a:ea typeface="D2Coding"/>
+              <a:cs typeface="+mn-cs"/>
+            </a:endParaRPr>
+          </a:p>
+        </p:txBody>
+      </p:sp>
+      <p:pic>
+        <p:nvPicPr>
+          <p:cNvPr id="3" name="Picture 2">
+            <a:extLst>
+              <a:ext uri="{FF2B5EF4-FFF2-40B4-BE49-F238E27FC236}">
+                <a16:creationId xmlns:a16="http://schemas.microsoft.com/office/drawing/2014/main" id="{4696EC97-5338-D3EF-AB3D-8BF51C0B5D9A}"/>
+              </a:ext>
+            </a:extLst>
+          </p:cNvPr>
+          <p:cNvPicPr>
+            <a:picLocks noChangeAspect="1"/>
+          </p:cNvPicPr>
+          <p:nvPr/>
+        </p:nvPicPr>
+        <p:blipFill>
+          <a:blip r:embed="rId2"/>
+          <a:stretch>
+            <a:fillRect/>
+          </a:stretch>
+        </p:blipFill>
+        <p:spPr>
+          <a:xfrm>
+            <a:off x="211365" y="1890465"/>
+            <a:ext cx="11076600" cy="1481714"/>
+          </a:xfrm>
+          <a:prstGeom prst="rect">
+            <a:avLst/>
+          </a:prstGeom>
+        </p:spPr>
+      </p:pic>
+      <p:pic>
+        <p:nvPicPr>
+          <p:cNvPr id="4" name="Picture 3">
+            <a:extLst>
+              <a:ext uri="{FF2B5EF4-FFF2-40B4-BE49-F238E27FC236}">
+                <a16:creationId xmlns:a16="http://schemas.microsoft.com/office/drawing/2014/main" id="{6638C943-658F-9EE6-E0E7-DEED6DFC7740}"/>
+              </a:ext>
+            </a:extLst>
+          </p:cNvPr>
+          <p:cNvPicPr>
+            <a:picLocks noChangeAspect="1"/>
+          </p:cNvPicPr>
+          <p:nvPr/>
+        </p:nvPicPr>
+        <p:blipFill>
+          <a:blip r:embed="rId3"/>
+          <a:stretch>
+            <a:fillRect/>
+          </a:stretch>
+        </p:blipFill>
+        <p:spPr>
+          <a:xfrm>
+            <a:off x="211365" y="4100572"/>
+            <a:ext cx="8375424" cy="1267333"/>
+          </a:xfrm>
+          <a:prstGeom prst="rect">
+            <a:avLst/>
+          </a:prstGeom>
+        </p:spPr>
+      </p:pic>
+    </p:spTree>
+    <p:extLst>
+      <p:ext uri="{BB962C8B-B14F-4D97-AF65-F5344CB8AC3E}">
+        <p14:creationId xmlns:p14="http://schemas.microsoft.com/office/powerpoint/2010/main" val="1298364371"/>
+      </p:ext>
+    </p:extLst>
+  </p:cSld>
+  <p:clrMapOvr>
+    <a:masterClrMapping/>
+  </p:clrMapOvr>
+</p:sld>
+</file>
+
+<file path=ppt/slides/slide7.xml><?xml version="1.0" encoding="utf-8"?>
+<p:sld xmlns:a="http://schemas.openxmlformats.org/drawingml/2006/main" xmlns:r="http://schemas.openxmlformats.org/officeDocument/2006/relationships" xmlns:p="http://schemas.openxmlformats.org/presentationml/2006/main">
+  <p:cSld>
+    <p:spTree>
+      <p:nvGrpSpPr>
+        <p:cNvPr id="1" name=""/>
+        <p:cNvGrpSpPr/>
+        <p:nvPr/>
+      </p:nvGrpSpPr>
+      <p:grpSpPr>
+        <a:xfrm>
+          <a:off x="0" y="0"/>
+          <a:ext cx="0" cy="0"/>
+          <a:chOff x="0" y="0"/>
+          <a:chExt cx="0" cy="0"/>
+        </a:xfrm>
+      </p:grpSpPr>
+      <p:pic>
+        <p:nvPicPr>
+          <p:cNvPr id="4" name="Picture 3">
+            <a:extLst>
+              <a:ext uri="{FF2B5EF4-FFF2-40B4-BE49-F238E27FC236}">
+                <a16:creationId xmlns:a16="http://schemas.microsoft.com/office/drawing/2014/main" id="{BB5ADFBC-076D-5086-41B3-3FC29E9F4AFF}"/>
+              </a:ext>
+            </a:extLst>
+          </p:cNvPr>
+          <p:cNvPicPr>
+            <a:picLocks noChangeAspect="1"/>
+          </p:cNvPicPr>
+          <p:nvPr/>
+        </p:nvPicPr>
+        <p:blipFill>
+          <a:blip r:embed="rId2"/>
+          <a:stretch>
+            <a:fillRect/>
+          </a:stretch>
+        </p:blipFill>
+        <p:spPr>
+          <a:xfrm>
+            <a:off x="337452" y="1145864"/>
+            <a:ext cx="6943882" cy="5581898"/>
+          </a:xfrm>
+          <a:prstGeom prst="rect">
+            <a:avLst/>
+          </a:prstGeom>
+        </p:spPr>
+      </p:pic>
+      <p:pic>
+        <p:nvPicPr>
+          <p:cNvPr id="5" name="Picture 4">
+            <a:extLst>
+              <a:ext uri="{FF2B5EF4-FFF2-40B4-BE49-F238E27FC236}">
+                <a16:creationId xmlns:a16="http://schemas.microsoft.com/office/drawing/2014/main" id="{023AD9F1-C378-C887-0EB9-C141E60AA002}"/>
+              </a:ext>
+            </a:extLst>
+          </p:cNvPr>
+          <p:cNvPicPr>
+            <a:picLocks noChangeAspect="1"/>
+          </p:cNvPicPr>
+          <p:nvPr/>
+        </p:nvPicPr>
+        <p:blipFill>
+          <a:blip r:embed="rId3"/>
+          <a:stretch>
+            <a:fillRect/>
+          </a:stretch>
+        </p:blipFill>
+        <p:spPr>
+          <a:xfrm>
+            <a:off x="2263127" y="4334794"/>
+            <a:ext cx="9726236" cy="1471732"/>
+          </a:xfrm>
+          <a:prstGeom prst="rect">
+            <a:avLst/>
+          </a:prstGeom>
+        </p:spPr>
+      </p:pic>
+      <p:pic>
+        <p:nvPicPr>
+          <p:cNvPr id="6" name="Picture 5">
+            <a:extLst>
+              <a:ext uri="{FF2B5EF4-FFF2-40B4-BE49-F238E27FC236}">
+                <a16:creationId xmlns:a16="http://schemas.microsoft.com/office/drawing/2014/main" id="{6E2B1E26-29A0-4843-14F7-E69CFCA4899E}"/>
+              </a:ext>
+            </a:extLst>
+          </p:cNvPr>
+          <p:cNvPicPr>
+            <a:picLocks noChangeAspect="1"/>
+          </p:cNvPicPr>
+          <p:nvPr/>
+        </p:nvPicPr>
+        <p:blipFill rotWithShape="1">
+          <a:blip r:embed="rId2"/>
+          <a:srcRect l="476" t="90930" r="73471" b="2371"/>
+          <a:stretch/>
+        </p:blipFill>
+        <p:spPr>
+          <a:xfrm>
+            <a:off x="3217968" y="5317491"/>
+            <a:ext cx="3906557" cy="807549"/>
+          </a:xfrm>
+          <a:prstGeom prst="rect">
+            <a:avLst/>
+          </a:prstGeom>
+        </p:spPr>
+      </p:pic>
+      <p:sp>
+        <p:nvSpPr>
+          <p:cNvPr id="8" name="TextBox 7">
+            <a:extLst>
+              <a:ext uri="{FF2B5EF4-FFF2-40B4-BE49-F238E27FC236}">
+                <a16:creationId xmlns:a16="http://schemas.microsoft.com/office/drawing/2014/main" id="{67843133-0215-538C-A5EC-B1BAF2396421}"/>
+              </a:ext>
+            </a:extLst>
+          </p:cNvPr>
+          <p:cNvSpPr txBox="1"/>
+          <p:nvPr/>
+        </p:nvSpPr>
+        <p:spPr>
+          <a:xfrm>
+            <a:off x="5893363" y="6241735"/>
+            <a:ext cx="6096000" cy="369332"/>
+          </a:xfrm>
+          <a:prstGeom prst="rect">
+            <a:avLst/>
+          </a:prstGeom>
+          <a:noFill/>
+        </p:spPr>
+        <p:txBody>
+          <a:bodyPr wrap="square">
+            <a:spAutoFit/>
+          </a:bodyPr>
+          <a:lstStyle/>
+          <a:p>
+            <a:pPr algn="r"/>
+            <a:r>
+              <a:rPr lang="en-KR" dirty="0">
+                <a:hlinkClick r:id="rId4"/>
+              </a:rPr>
+              <a:t>http://sage.skku.edu/</a:t>
+            </a:r>
+            <a:r>
+              <a:rPr lang="en-KR" dirty="0"/>
+              <a:t> </a:t>
+            </a:r>
+          </a:p>
+        </p:txBody>
+      </p:sp>
+      <p:sp>
+        <p:nvSpPr>
+          <p:cNvPr id="10" name="TextBox 9">
+            <a:extLst>
+              <a:ext uri="{FF2B5EF4-FFF2-40B4-BE49-F238E27FC236}">
+                <a16:creationId xmlns:a16="http://schemas.microsoft.com/office/drawing/2014/main" id="{2C3B6174-1EB5-4103-22F1-A0C924793FEA}"/>
+              </a:ext>
+            </a:extLst>
+          </p:cNvPr>
+          <p:cNvSpPr txBox="1"/>
+          <p:nvPr/>
+        </p:nvSpPr>
+        <p:spPr>
+          <a:xfrm>
+            <a:off x="116114" y="0"/>
+            <a:ext cx="2044149" cy="704873"/>
+          </a:xfrm>
+          <a:prstGeom prst="rect">
+            <a:avLst/>
+          </a:prstGeom>
+          <a:noFill/>
+        </p:spPr>
+        <p:txBody>
+          <a:bodyPr wrap="none" rtlCol="0">
+            <a:spAutoFit/>
+          </a:bodyPr>
+          <a:lstStyle/>
+          <a:p>
+            <a:pPr latinLnBrk="0">
+              <a:lnSpc>
+                <a:spcPct val="160000"/>
+              </a:lnSpc>
+              <a:tabLst>
+                <a:tab pos="1630680" algn="l"/>
+              </a:tabLst>
+            </a:pPr>
+            <a:r>
+              <a:rPr lang="en-US" altLang="ko-KR" sz="2800" b="1" dirty="0">
+                <a:solidFill>
+                  <a:schemeClr val="bg1">
+                    <a:lumMod val="95000"/>
+                  </a:schemeClr>
+                </a:solidFill>
+                <a:latin typeface="+mj-lt"/>
+                <a:ea typeface="함초롬바탕" panose="02030504000101010101" pitchFamily="18" charset="-127"/>
+                <a:cs typeface="Times New Roman" panose="02020603050405020304" pitchFamily="18" charset="0"/>
+              </a:rPr>
+              <a:t>Comparison</a:t>
+            </a:r>
+            <a:endParaRPr lang="ko-KR" altLang="ko-KR" sz="2800" dirty="0">
+              <a:solidFill>
+                <a:schemeClr val="bg1">
+                  <a:lumMod val="95000"/>
+                </a:schemeClr>
+              </a:solidFill>
+              <a:effectLst/>
+              <a:latin typeface="+mj-lt"/>
+              <a:ea typeface="함초롬바탕" panose="02030504000101010101" pitchFamily="18" charset="-127"/>
+              <a:cs typeface="굴림" panose="020B0600000101010101" pitchFamily="50" charset="-127"/>
+            </a:endParaRPr>
+          </a:p>
+        </p:txBody>
+      </p:sp>
+    </p:spTree>
+    <p:extLst>
+      <p:ext uri="{BB962C8B-B14F-4D97-AF65-F5344CB8AC3E}">
+        <p14:creationId xmlns:p14="http://schemas.microsoft.com/office/powerpoint/2010/main" val="1684936799"/>
+      </p:ext>
+    </p:extLst>
+  </p:cSld>
+  <p:clrMapOvr>
+    <a:masterClrMapping/>
+  </p:clrMapOvr>
+</p:sld>
+</file>
+
+<file path=ppt/slides/slide8.xml><?xml version="1.0" encoding="utf-8"?>
+<p:sld xmlns:a="http://schemas.openxmlformats.org/drawingml/2006/main" xmlns:r="http://schemas.openxmlformats.org/officeDocument/2006/relationships" xmlns:p="http://schemas.openxmlformats.org/presentationml/2006/main">
+  <p:cSld>
+    <p:spTree>
+      <p:nvGrpSpPr>
+        <p:cNvPr id="1" name=""/>
+        <p:cNvGrpSpPr/>
+        <p:nvPr/>
+      </p:nvGrpSpPr>
+      <p:grpSpPr>
+        <a:xfrm>
+          <a:off x="0" y="0"/>
+          <a:ext cx="0" cy="0"/>
+          <a:chOff x="0" y="0"/>
+          <a:chExt cx="0" cy="0"/>
+        </a:xfrm>
+      </p:grpSpPr>
+      <p:sp>
+        <p:nvSpPr>
+          <p:cNvPr id="4" name="TextBox 3">
+            <a:extLst>
+              <a:ext uri="{FF2B5EF4-FFF2-40B4-BE49-F238E27FC236}">
+                <a16:creationId xmlns:a16="http://schemas.microsoft.com/office/drawing/2014/main" id="{87EFD2A3-4EE1-C360-BDC0-24F7F1D8691C}"/>
+              </a:ext>
+            </a:extLst>
+          </p:cNvPr>
+          <p:cNvSpPr txBox="1"/>
+          <p:nvPr/>
+        </p:nvSpPr>
+        <p:spPr>
+          <a:xfrm>
+            <a:off x="116114" y="0"/>
+            <a:ext cx="2518638" cy="704873"/>
+          </a:xfrm>
+          <a:prstGeom prst="rect">
+            <a:avLst/>
+          </a:prstGeom>
+          <a:noFill/>
+        </p:spPr>
+        <p:txBody>
+          <a:bodyPr wrap="none" rtlCol="0">
+            <a:spAutoFit/>
+          </a:bodyPr>
+          <a:lstStyle/>
+          <a:p>
+            <a:pPr latinLnBrk="0">
+              <a:lnSpc>
+                <a:spcPct val="160000"/>
+              </a:lnSpc>
+              <a:tabLst>
+                <a:tab pos="1630680" algn="l"/>
+              </a:tabLst>
+            </a:pPr>
+            <a:r>
+              <a:rPr lang="en-US" altLang="ko-KR" sz="2800" dirty="0">
+                <a:solidFill>
+                  <a:schemeClr val="bg1">
+                    <a:lumMod val="95000"/>
+                  </a:schemeClr>
+                </a:solidFill>
+                <a:effectLst/>
+                <a:latin typeface="+mj-lt"/>
+                <a:ea typeface="함초롬바탕" panose="02030504000101010101" pitchFamily="18" charset="-127"/>
+                <a:cs typeface="굴림" panose="020B0600000101010101" pitchFamily="50" charset="-127"/>
+              </a:rPr>
+              <a:t>Build and Run</a:t>
+            </a:r>
+            <a:endParaRPr lang="ko-KR" altLang="ko-KR" sz="2800" dirty="0">
+              <a:solidFill>
+                <a:schemeClr val="bg1">
+                  <a:lumMod val="95000"/>
+                </a:schemeClr>
+              </a:solidFill>
+              <a:effectLst/>
+              <a:latin typeface="+mj-lt"/>
+              <a:ea typeface="함초롬바탕" panose="02030504000101010101" pitchFamily="18" charset="-127"/>
+              <a:cs typeface="굴림" panose="020B0600000101010101" pitchFamily="50" charset="-127"/>
+            </a:endParaRPr>
+          </a:p>
+        </p:txBody>
+      </p:sp>
+      <p:sp>
+        <p:nvSpPr>
+          <p:cNvPr id="5" name="TextBox 4">
+            <a:extLst>
+              <a:ext uri="{FF2B5EF4-FFF2-40B4-BE49-F238E27FC236}">
+                <a16:creationId xmlns:a16="http://schemas.microsoft.com/office/drawing/2014/main" id="{AC703704-3A1E-52D4-1600-CCE73D99FEFD}"/>
+              </a:ext>
+            </a:extLst>
+          </p:cNvPr>
+          <p:cNvSpPr txBox="1"/>
+          <p:nvPr/>
+        </p:nvSpPr>
+        <p:spPr>
+          <a:xfrm>
+            <a:off x="574055" y="2180896"/>
+            <a:ext cx="8353569" cy="3976923"/>
+          </a:xfrm>
+          <a:prstGeom prst="rect">
+            <a:avLst/>
+          </a:prstGeom>
+          <a:noFill/>
+        </p:spPr>
+        <p:txBody>
+          <a:bodyPr wrap="none" rtlCol="0">
+            <a:spAutoFit/>
+          </a:bodyPr>
+          <a:lstStyle/>
+          <a:p>
+            <a:pPr latinLnBrk="0">
+              <a:lnSpc>
+                <a:spcPct val="160000"/>
+              </a:lnSpc>
+              <a:tabLst>
+                <a:tab pos="1630680" algn="l"/>
+              </a:tabLst>
+            </a:pPr>
+            <a:r>
+              <a:rPr lang="en-US" altLang="ko-KR" sz="2000" dirty="0">
+                <a:solidFill>
+                  <a:schemeClr val="bg1">
+                    <a:lumMod val="95000"/>
+                  </a:schemeClr>
+                </a:solidFill>
+                <a:latin typeface="+mj-lt"/>
+                <a:ea typeface="함초롬바탕" panose="02030504000101010101" pitchFamily="18" charset="-127"/>
+                <a:cs typeface="굴림" panose="020B0600000101010101" pitchFamily="50" charset="-127"/>
+              </a:rPr>
+              <a:t># </a:t>
+            </a:r>
+            <a:r>
+              <a:rPr lang="en-US" altLang="ko-KR" sz="2000" dirty="0">
+                <a:solidFill>
+                  <a:schemeClr val="bg1">
+                    <a:lumMod val="95000"/>
+                  </a:schemeClr>
+                </a:solidFill>
+                <a:effectLst/>
+                <a:latin typeface="+mj-lt"/>
+                <a:ea typeface="함초롬바탕" panose="02030504000101010101" pitchFamily="18" charset="-127"/>
+                <a:cs typeface="굴림" panose="020B0600000101010101" pitchFamily="50" charset="-127"/>
+              </a:rPr>
+              <a:t>Build</a:t>
+            </a:r>
+          </a:p>
+          <a:p>
+            <a:pPr latinLnBrk="0">
+              <a:lnSpc>
+                <a:spcPct val="160000"/>
+              </a:lnSpc>
+              <a:tabLst>
+                <a:tab pos="1630680" algn="l"/>
+              </a:tabLst>
+            </a:pPr>
+            <a:r>
+              <a:rPr lang="en-US" altLang="ko-KR" sz="2000" dirty="0">
+                <a:solidFill>
+                  <a:schemeClr val="bg1">
+                    <a:lumMod val="95000"/>
+                  </a:schemeClr>
+                </a:solidFill>
+                <a:effectLst/>
+                <a:latin typeface="+mj-lt"/>
+                <a:ea typeface="함초롬바탕" panose="02030504000101010101" pitchFamily="18" charset="-127"/>
+                <a:cs typeface="굴림" panose="020B0600000101010101" pitchFamily="50" charset="-127"/>
+              </a:rPr>
+              <a:t>$ make</a:t>
+            </a:r>
+          </a:p>
+          <a:p>
+            <a:pPr latinLnBrk="0">
+              <a:lnSpc>
+                <a:spcPct val="160000"/>
+              </a:lnSpc>
+              <a:tabLst>
+                <a:tab pos="1630680" algn="l"/>
+              </a:tabLst>
+            </a:pPr>
+            <a:endParaRPr lang="en-US" altLang="ko-KR" sz="2000" dirty="0">
+              <a:solidFill>
+                <a:schemeClr val="bg1">
+                  <a:lumMod val="95000"/>
+                </a:schemeClr>
+              </a:solidFill>
+              <a:latin typeface="+mj-lt"/>
+              <a:ea typeface="함초롬바탕" panose="02030504000101010101" pitchFamily="18" charset="-127"/>
+              <a:cs typeface="굴림" panose="020B0600000101010101" pitchFamily="50" charset="-127"/>
+            </a:endParaRPr>
+          </a:p>
+          <a:p>
+            <a:pPr latinLnBrk="0">
+              <a:lnSpc>
+                <a:spcPct val="160000"/>
+              </a:lnSpc>
+              <a:tabLst>
+                <a:tab pos="1630680" algn="l"/>
+              </a:tabLst>
+            </a:pPr>
+            <a:r>
+              <a:rPr lang="en-US" altLang="ko-KR" sz="2000" dirty="0">
+                <a:solidFill>
+                  <a:schemeClr val="bg1">
+                    <a:lumMod val="95000"/>
+                  </a:schemeClr>
+                </a:solidFill>
+                <a:latin typeface="+mj-lt"/>
+                <a:ea typeface="함초롬바탕" panose="02030504000101010101" pitchFamily="18" charset="-127"/>
+                <a:cs typeface="굴림" panose="020B0600000101010101" pitchFamily="50" charset="-127"/>
+              </a:rPr>
+              <a:t># </a:t>
+            </a:r>
+            <a:r>
+              <a:rPr lang="en-US" altLang="ko-KR" sz="2000" dirty="0">
+                <a:solidFill>
+                  <a:schemeClr val="bg1">
+                    <a:lumMod val="95000"/>
+                  </a:schemeClr>
+                </a:solidFill>
+                <a:effectLst/>
+                <a:latin typeface="+mj-lt"/>
+                <a:ea typeface="함초롬바탕" panose="02030504000101010101" pitchFamily="18" charset="-127"/>
+                <a:cs typeface="굴림" panose="020B0600000101010101" pitchFamily="50" charset="-127"/>
+              </a:rPr>
+              <a:t>Test environment</a:t>
+            </a:r>
+          </a:p>
+          <a:p>
+            <a:pPr marL="342900" indent="-342900" latinLnBrk="0">
+              <a:lnSpc>
+                <a:spcPct val="160000"/>
+              </a:lnSpc>
+              <a:buFont typeface="Arial" panose="020B0604020202020204" pitchFamily="34" charset="0"/>
+              <a:buChar char="•"/>
+              <a:tabLst>
+                <a:tab pos="1630680" algn="l"/>
+              </a:tabLst>
+            </a:pPr>
+            <a:r>
+              <a:rPr lang="en-US" altLang="ko-KR" sz="2000" dirty="0">
+                <a:solidFill>
+                  <a:schemeClr val="bg1">
+                    <a:lumMod val="95000"/>
+                  </a:schemeClr>
+                </a:solidFill>
+                <a:effectLst/>
+                <a:latin typeface="+mj-lt"/>
+                <a:ea typeface="함초롬바탕" panose="02030504000101010101" pitchFamily="18" charset="-127"/>
+                <a:cs typeface="굴림" panose="020B0600000101010101" pitchFamily="50" charset="-127"/>
+              </a:rPr>
+              <a:t>macOS 14.0 arm64 (clang 15.0.0)</a:t>
+            </a:r>
+          </a:p>
+          <a:p>
+            <a:pPr marL="342900" indent="-342900" latinLnBrk="0">
+              <a:lnSpc>
+                <a:spcPct val="160000"/>
+              </a:lnSpc>
+              <a:buFont typeface="Arial" panose="020B0604020202020204" pitchFamily="34" charset="0"/>
+              <a:buChar char="•"/>
+              <a:tabLst>
+                <a:tab pos="1630680" algn="l"/>
+              </a:tabLst>
+            </a:pPr>
+            <a:r>
+              <a:rPr lang="en-US" altLang="ko-KR" sz="2000" dirty="0">
+                <a:solidFill>
+                  <a:schemeClr val="bg1">
+                    <a:lumMod val="95000"/>
+                  </a:schemeClr>
+                </a:solidFill>
+                <a:effectLst/>
+                <a:latin typeface="+mj-lt"/>
+                <a:ea typeface="함초롬바탕" panose="02030504000101010101" pitchFamily="18" charset="-127"/>
+                <a:cs typeface="굴림" panose="020B0600000101010101" pitchFamily="50" charset="-127"/>
+              </a:rPr>
+              <a:t>Debian GNU/Linux 11 aarch64 (g++ 10.2.1)</a:t>
+            </a:r>
+          </a:p>
+          <a:p>
+            <a:pPr marL="342900" indent="-342900" latinLnBrk="0">
+              <a:lnSpc>
+                <a:spcPct val="160000"/>
+              </a:lnSpc>
+              <a:buFont typeface="Arial" panose="020B0604020202020204" pitchFamily="34" charset="0"/>
+              <a:buChar char="•"/>
+              <a:tabLst>
+                <a:tab pos="1630680" algn="l"/>
+              </a:tabLst>
+            </a:pPr>
+            <a:r>
+              <a:rPr lang="en-US" altLang="ko-KR" sz="2000" dirty="0">
+                <a:solidFill>
+                  <a:schemeClr val="bg1">
+                    <a:lumMod val="95000"/>
+                  </a:schemeClr>
+                </a:solidFill>
+                <a:effectLst/>
+                <a:latin typeface="+mj-lt"/>
+                <a:ea typeface="함초롬바탕" panose="02030504000101010101" pitchFamily="18" charset="-127"/>
+                <a:cs typeface="굴림" panose="020B0600000101010101" pitchFamily="50" charset="-127"/>
+              </a:rPr>
+              <a:t>if you want to execute on macOS(using Intel CPU),</a:t>
+            </a:r>
+          </a:p>
+          <a:p>
+            <a:pPr marL="342900" indent="-342900" latinLnBrk="0">
+              <a:lnSpc>
+                <a:spcPct val="160000"/>
+              </a:lnSpc>
+              <a:buFont typeface="Arial" panose="020B0604020202020204" pitchFamily="34" charset="0"/>
+              <a:buChar char="•"/>
+              <a:tabLst>
+                <a:tab pos="1630680" algn="l"/>
+              </a:tabLst>
+            </a:pPr>
+            <a:r>
+              <a:rPr lang="en-US" altLang="ko-KR" sz="2000" dirty="0">
+                <a:solidFill>
+                  <a:schemeClr val="bg1">
+                    <a:lumMod val="95000"/>
+                  </a:schemeClr>
+                </a:solidFill>
+                <a:effectLst/>
+                <a:latin typeface="+mj-lt"/>
+                <a:ea typeface="함초롬바탕" panose="02030504000101010101" pitchFamily="18" charset="-127"/>
+                <a:cs typeface="굴림" panose="020B0600000101010101" pitchFamily="50" charset="-127"/>
+              </a:rPr>
+              <a:t>delete "-</a:t>
+            </a:r>
+            <a:r>
+              <a:rPr lang="en-US" altLang="ko-KR" sz="2000" dirty="0" err="1">
+                <a:solidFill>
+                  <a:schemeClr val="bg1">
+                    <a:lumMod val="95000"/>
+                  </a:schemeClr>
+                </a:solidFill>
+                <a:effectLst/>
+                <a:latin typeface="+mj-lt"/>
+                <a:ea typeface="함초롬바탕" panose="02030504000101010101" pitchFamily="18" charset="-127"/>
+                <a:cs typeface="굴림" panose="020B0600000101010101" pitchFamily="50" charset="-127"/>
+              </a:rPr>
+              <a:t>fsanitize</a:t>
+            </a:r>
+            <a:r>
+              <a:rPr lang="en-US" altLang="ko-KR" sz="2000" dirty="0">
+                <a:solidFill>
+                  <a:schemeClr val="bg1">
+                    <a:lumMod val="95000"/>
+                  </a:schemeClr>
+                </a:solidFill>
+                <a:effectLst/>
+                <a:latin typeface="+mj-lt"/>
+                <a:ea typeface="함초롬바탕" panose="02030504000101010101" pitchFamily="18" charset="-127"/>
+                <a:cs typeface="굴림" panose="020B0600000101010101" pitchFamily="50" charset="-127"/>
+              </a:rPr>
+              <a:t>=address -g3" of (</a:t>
+            </a:r>
+            <a:r>
+              <a:rPr lang="en-US" altLang="ko-KR" sz="2000" dirty="0" err="1">
+                <a:solidFill>
+                  <a:schemeClr val="bg1">
+                    <a:lumMod val="95000"/>
+                  </a:schemeClr>
+                </a:solidFill>
+                <a:effectLst/>
+                <a:latin typeface="+mj-lt"/>
+                <a:ea typeface="함초롬바탕" panose="02030504000101010101" pitchFamily="18" charset="-127"/>
+                <a:cs typeface="굴림" panose="020B0600000101010101" pitchFamily="50" charset="-127"/>
+              </a:rPr>
+              <a:t>Makefile</a:t>
+            </a:r>
+            <a:r>
+              <a:rPr lang="en-US" altLang="ko-KR" sz="2000" dirty="0">
+                <a:solidFill>
+                  <a:schemeClr val="bg1">
+                    <a:lumMod val="95000"/>
+                  </a:schemeClr>
+                </a:solidFill>
+                <a:effectLst/>
+                <a:latin typeface="+mj-lt"/>
+                <a:ea typeface="함초롬바탕" panose="02030504000101010101" pitchFamily="18" charset="-127"/>
+                <a:cs typeface="굴림" panose="020B0600000101010101" pitchFamily="50" charset="-127"/>
+              </a:rPr>
+              <a:t> - CFLAG option) </a:t>
+            </a:r>
+          </a:p>
+        </p:txBody>
+      </p:sp>
+    </p:spTree>
+    <p:extLst>
+      <p:ext uri="{BB962C8B-B14F-4D97-AF65-F5344CB8AC3E}">
+        <p14:creationId xmlns:p14="http://schemas.microsoft.com/office/powerpoint/2010/main" val="2413034989"/>
+      </p:ext>
+    </p:extLst>
+  </p:cSld>
+  <p:clrMapOvr>
+    <a:masterClrMapping/>
+  </p:clrMapOvr>
+</p:sld>
+</file>
+
+<file path=ppt/slides/slide9.xml><?xml version="1.0" encoding="utf-8"?>
+<p:sld xmlns:a="http://schemas.openxmlformats.org/drawingml/2006/main" xmlns:r="http://schemas.openxmlformats.org/officeDocument/2006/relationships" xmlns:p="http://schemas.openxmlformats.org/presentationml/2006/main">
+  <p:cSld>
+    <p:spTree>
+      <p:nvGrpSpPr>
+        <p:cNvPr id="1" name=""/>
+        <p:cNvGrpSpPr/>
+        <p:nvPr/>
+      </p:nvGrpSpPr>
+      <p:grpSpPr>
+        <a:xfrm>
+          <a:off x="0" y="0"/>
+          <a:ext cx="0" cy="0"/>
+          <a:chOff x="0" y="0"/>
+          <a:chExt cx="0" cy="0"/>
+        </a:xfrm>
+      </p:grpSpPr>
+      <p:sp>
+        <p:nvSpPr>
+          <p:cNvPr id="4" name="TextBox 3">
+            <a:extLst>
+              <a:ext uri="{FF2B5EF4-FFF2-40B4-BE49-F238E27FC236}">
+                <a16:creationId xmlns:a16="http://schemas.microsoft.com/office/drawing/2014/main" id="{BD6C7EE5-6F25-1E72-0204-44384DD90E8E}"/>
+              </a:ext>
+            </a:extLst>
+          </p:cNvPr>
+          <p:cNvSpPr txBox="1"/>
+          <p:nvPr/>
+        </p:nvSpPr>
+        <p:spPr>
+          <a:xfrm>
+            <a:off x="4208303" y="3076563"/>
+            <a:ext cx="3775393" cy="704873"/>
+          </a:xfrm>
+          <a:prstGeom prst="rect">
+            <a:avLst/>
+          </a:prstGeom>
+          <a:noFill/>
+        </p:spPr>
+        <p:txBody>
+          <a:bodyPr wrap="none" rtlCol="0">
+            <a:spAutoFit/>
+          </a:bodyPr>
+          <a:lstStyle/>
+          <a:p>
+            <a:pPr algn="ctr" latinLnBrk="0">
+              <a:lnSpc>
+                <a:spcPct val="160000"/>
+              </a:lnSpc>
+              <a:tabLst>
+                <a:tab pos="1630680" algn="l"/>
+              </a:tabLst>
+            </a:pPr>
+            <a:r>
+              <a:rPr lang="en-US" altLang="ko-KR" sz="2800" dirty="0">
+                <a:solidFill>
+                  <a:schemeClr val="bg1">
+                    <a:lumMod val="95000"/>
+                  </a:schemeClr>
+                </a:solidFill>
+                <a:effectLst/>
+                <a:latin typeface="+mj-lt"/>
+                <a:ea typeface="함초롬바탕" panose="02030504000101010101" pitchFamily="18" charset="-127"/>
+                <a:cs typeface="굴림" panose="020B0600000101010101" pitchFamily="50" charset="-127"/>
+              </a:rPr>
+              <a:t>Code Review and Demo</a:t>
+            </a:r>
+            <a:endParaRPr lang="ko-KR" altLang="ko-KR" sz="2800" dirty="0">
+              <a:solidFill>
+                <a:schemeClr val="bg1">
+                  <a:lumMod val="95000"/>
+                </a:schemeClr>
+              </a:solidFill>
+              <a:effectLst/>
+              <a:latin typeface="+mj-lt"/>
+              <a:ea typeface="함초롬바탕" panose="02030504000101010101" pitchFamily="18" charset="-127"/>
+              <a:cs typeface="굴림" panose="020B0600000101010101" pitchFamily="50" charset="-127"/>
+            </a:endParaRPr>
+          </a:p>
+        </p:txBody>
+      </p:sp>
+    </p:spTree>
+    <p:extLst>
+      <p:ext uri="{BB962C8B-B14F-4D97-AF65-F5344CB8AC3E}">
+        <p14:creationId xmlns:p14="http://schemas.microsoft.com/office/powerpoint/2010/main" val="1044177494"/>
       </p:ext>
     </p:extLst>
   </p:cSld>

</xml_diff>

<commit_message>
feat: add git log to ppt
</commit_message>
<xml_diff>
--- a/OOP_Project02_Team07.pptx
+++ b/OOP_Project02_Team07.pptx
@@ -7,15 +7,16 @@
   <p:sldIdLst>
     <p:sldId id="256" r:id="rId2"/>
     <p:sldId id="267" r:id="rId3"/>
-    <p:sldId id="259" r:id="rId4"/>
-    <p:sldId id="260" r:id="rId5"/>
-    <p:sldId id="261" r:id="rId6"/>
-    <p:sldId id="262" r:id="rId7"/>
-    <p:sldId id="263" r:id="rId8"/>
-    <p:sldId id="264" r:id="rId9"/>
-    <p:sldId id="265" r:id="rId10"/>
-    <p:sldId id="266" r:id="rId11"/>
-    <p:sldId id="268" r:id="rId12"/>
+    <p:sldId id="269" r:id="rId4"/>
+    <p:sldId id="259" r:id="rId5"/>
+    <p:sldId id="260" r:id="rId6"/>
+    <p:sldId id="261" r:id="rId7"/>
+    <p:sldId id="262" r:id="rId8"/>
+    <p:sldId id="263" r:id="rId9"/>
+    <p:sldId id="264" r:id="rId10"/>
+    <p:sldId id="265" r:id="rId11"/>
+    <p:sldId id="266" r:id="rId12"/>
+    <p:sldId id="268" r:id="rId13"/>
   </p:sldIdLst>
   <p:sldSz cx="12192000" cy="6858000"/>
   <p:notesSz cx="6858000" cy="9144000"/>
@@ -269,7 +270,7 @@
           <a:p>
             <a:fld id="{37F81158-0E34-4120-9E9D-39DF41EA7255}" type="datetimeFigureOut">
               <a:rPr lang="ko-KR" altLang="en-US" smtClean="0"/>
-              <a:t>2023. 11. 5.</a:t>
+              <a:t>2023-11-05</a:t>
             </a:fld>
             <a:endParaRPr lang="ko-KR" altLang="en-US"/>
           </a:p>
@@ -467,7 +468,7 @@
           <a:p>
             <a:fld id="{37F81158-0E34-4120-9E9D-39DF41EA7255}" type="datetimeFigureOut">
               <a:rPr lang="ko-KR" altLang="en-US" smtClean="0"/>
-              <a:t>2023. 11. 5.</a:t>
+              <a:t>2023-11-05</a:t>
             </a:fld>
             <a:endParaRPr lang="ko-KR" altLang="en-US"/>
           </a:p>
@@ -675,7 +676,7 @@
           <a:p>
             <a:fld id="{37F81158-0E34-4120-9E9D-39DF41EA7255}" type="datetimeFigureOut">
               <a:rPr lang="ko-KR" altLang="en-US" smtClean="0"/>
-              <a:t>2023. 11. 5.</a:t>
+              <a:t>2023-11-05</a:t>
             </a:fld>
             <a:endParaRPr lang="ko-KR" altLang="en-US"/>
           </a:p>
@@ -873,7 +874,7 @@
           <a:p>
             <a:fld id="{37F81158-0E34-4120-9E9D-39DF41EA7255}" type="datetimeFigureOut">
               <a:rPr lang="ko-KR" altLang="en-US" smtClean="0"/>
-              <a:t>2023. 11. 5.</a:t>
+              <a:t>2023-11-05</a:t>
             </a:fld>
             <a:endParaRPr lang="ko-KR" altLang="en-US"/>
           </a:p>
@@ -1148,7 +1149,7 @@
           <a:p>
             <a:fld id="{37F81158-0E34-4120-9E9D-39DF41EA7255}" type="datetimeFigureOut">
               <a:rPr lang="ko-KR" altLang="en-US" smtClean="0"/>
-              <a:t>2023. 11. 5.</a:t>
+              <a:t>2023-11-05</a:t>
             </a:fld>
             <a:endParaRPr lang="ko-KR" altLang="en-US"/>
           </a:p>
@@ -1413,7 +1414,7 @@
           <a:p>
             <a:fld id="{37F81158-0E34-4120-9E9D-39DF41EA7255}" type="datetimeFigureOut">
               <a:rPr lang="ko-KR" altLang="en-US" smtClean="0"/>
-              <a:t>2023. 11. 5.</a:t>
+              <a:t>2023-11-05</a:t>
             </a:fld>
             <a:endParaRPr lang="ko-KR" altLang="en-US"/>
           </a:p>
@@ -1825,7 +1826,7 @@
           <a:p>
             <a:fld id="{37F81158-0E34-4120-9E9D-39DF41EA7255}" type="datetimeFigureOut">
               <a:rPr lang="ko-KR" altLang="en-US" smtClean="0"/>
-              <a:t>2023. 11. 5.</a:t>
+              <a:t>2023-11-05</a:t>
             </a:fld>
             <a:endParaRPr lang="ko-KR" altLang="en-US"/>
           </a:p>
@@ -1966,7 +1967,7 @@
           <a:p>
             <a:fld id="{37F81158-0E34-4120-9E9D-39DF41EA7255}" type="datetimeFigureOut">
               <a:rPr lang="ko-KR" altLang="en-US" smtClean="0"/>
-              <a:t>2023. 11. 5.</a:t>
+              <a:t>2023-11-05</a:t>
             </a:fld>
             <a:endParaRPr lang="ko-KR" altLang="en-US"/>
           </a:p>
@@ -2079,7 +2080,7 @@
           <a:p>
             <a:fld id="{37F81158-0E34-4120-9E9D-39DF41EA7255}" type="datetimeFigureOut">
               <a:rPr lang="ko-KR" altLang="en-US" smtClean="0"/>
-              <a:t>2023. 11. 5.</a:t>
+              <a:t>2023-11-05</a:t>
             </a:fld>
             <a:endParaRPr lang="ko-KR" altLang="en-US"/>
           </a:p>
@@ -2390,7 +2391,7 @@
           <a:p>
             <a:fld id="{37F81158-0E34-4120-9E9D-39DF41EA7255}" type="datetimeFigureOut">
               <a:rPr lang="ko-KR" altLang="en-US" smtClean="0"/>
-              <a:t>2023. 11. 5.</a:t>
+              <a:t>2023-11-05</a:t>
             </a:fld>
             <a:endParaRPr lang="ko-KR" altLang="en-US"/>
           </a:p>
@@ -2678,7 +2679,7 @@
           <a:p>
             <a:fld id="{37F81158-0E34-4120-9E9D-39DF41EA7255}" type="datetimeFigureOut">
               <a:rPr lang="ko-KR" altLang="en-US" smtClean="0"/>
-              <a:t>2023. 11. 5.</a:t>
+              <a:t>2023-11-05</a:t>
             </a:fld>
             <a:endParaRPr lang="ko-KR" altLang="en-US"/>
           </a:p>
@@ -2922,7 +2923,7 @@
           <a:p>
             <a:fld id="{37F81158-0E34-4120-9E9D-39DF41EA7255}" type="datetimeFigureOut">
               <a:rPr lang="ko-KR" altLang="en-US" smtClean="0"/>
-              <a:t>2023. 11. 5.</a:t>
+              <a:t>2023-11-05</a:t>
             </a:fld>
             <a:endParaRPr lang="ko-KR" altLang="en-US"/>
           </a:p>
@@ -4801,6 +4802,100 @@
           <p:cNvPr id="4" name="TextBox 3">
             <a:extLst>
               <a:ext uri="{FF2B5EF4-FFF2-40B4-BE49-F238E27FC236}">
+                <a16:creationId xmlns:a16="http://schemas.microsoft.com/office/drawing/2014/main" id="{BD6C7EE5-6F25-1E72-0204-44384DD90E8E}"/>
+              </a:ext>
+            </a:extLst>
+          </p:cNvPr>
+          <p:cNvSpPr txBox="1"/>
+          <p:nvPr/>
+        </p:nvSpPr>
+        <p:spPr>
+          <a:xfrm>
+            <a:off x="4208303" y="3076563"/>
+            <a:ext cx="3775393" cy="704873"/>
+          </a:xfrm>
+          <a:prstGeom prst="rect">
+            <a:avLst/>
+          </a:prstGeom>
+          <a:noFill/>
+        </p:spPr>
+        <p:txBody>
+          <a:bodyPr wrap="none" rtlCol="0">
+            <a:spAutoFit/>
+          </a:bodyPr>
+          <a:lstStyle/>
+          <a:p>
+            <a:pPr algn="ctr" latinLnBrk="0">
+              <a:lnSpc>
+                <a:spcPct val="160000"/>
+              </a:lnSpc>
+              <a:tabLst>
+                <a:tab pos="1630680" algn="l"/>
+              </a:tabLst>
+            </a:pPr>
+            <a:r>
+              <a:rPr lang="en-US" altLang="ko-KR" sz="2800" dirty="0">
+                <a:solidFill>
+                  <a:schemeClr val="bg1">
+                    <a:lumMod val="95000"/>
+                  </a:schemeClr>
+                </a:solidFill>
+                <a:effectLst/>
+                <a:latin typeface="+mj-lt"/>
+                <a:ea typeface="함초롬바탕" panose="02030504000101010101" pitchFamily="18" charset="-127"/>
+                <a:cs typeface="굴림" panose="020B0600000101010101" pitchFamily="50" charset="-127"/>
+              </a:rPr>
+              <a:t>Code Review and Demo</a:t>
+            </a:r>
+            <a:endParaRPr lang="ko-KR" altLang="ko-KR" sz="2800" dirty="0">
+              <a:solidFill>
+                <a:schemeClr val="bg1">
+                  <a:lumMod val="95000"/>
+                </a:schemeClr>
+              </a:solidFill>
+              <a:effectLst/>
+              <a:latin typeface="+mj-lt"/>
+              <a:ea typeface="함초롬바탕" panose="02030504000101010101" pitchFamily="18" charset="-127"/>
+              <a:cs typeface="굴림" panose="020B0600000101010101" pitchFamily="50" charset="-127"/>
+            </a:endParaRPr>
+          </a:p>
+        </p:txBody>
+      </p:sp>
+    </p:spTree>
+    <p:extLst>
+      <p:ext uri="{BB962C8B-B14F-4D97-AF65-F5344CB8AC3E}">
+        <p14:creationId xmlns:p14="http://schemas.microsoft.com/office/powerpoint/2010/main" val="1044177494"/>
+      </p:ext>
+    </p:extLst>
+  </p:cSld>
+  <p:clrMapOvr>
+    <a:masterClrMapping/>
+  </p:clrMapOvr>
+</p:sld>
+</file>
+
+<file path=ppt/slides/slide11.xml><?xml version="1.0" encoding="utf-8"?>
+<p:sld xmlns:a="http://schemas.openxmlformats.org/drawingml/2006/main" xmlns:r="http://schemas.openxmlformats.org/officeDocument/2006/relationships" xmlns:p="http://schemas.openxmlformats.org/presentationml/2006/main">
+  <p:cSld>
+    <p:spTree>
+      <p:nvGrpSpPr>
+        <p:cNvPr id="1" name=""/>
+        <p:cNvGrpSpPr/>
+        <p:nvPr/>
+      </p:nvGrpSpPr>
+      <p:grpSpPr>
+        <a:xfrm>
+          <a:off x="0" y="0"/>
+          <a:ext cx="0" cy="0"/>
+          <a:chOff x="0" y="0"/>
+          <a:chExt cx="0" cy="0"/>
+        </a:xfrm>
+      </p:grpSpPr>
+      <p:sp>
+        <p:nvSpPr>
+          <p:cNvPr id="4" name="TextBox 3">
+            <a:extLst>
+              <a:ext uri="{FF2B5EF4-FFF2-40B4-BE49-F238E27FC236}">
                 <a16:creationId xmlns:a16="http://schemas.microsoft.com/office/drawing/2014/main" id="{86F8687B-DF9F-3ABD-B296-52BB83E79372}"/>
               </a:ext>
             </a:extLst>
@@ -5006,7 +5101,7 @@
 </p:sld>
 </file>
 
-<file path=ppt/slides/slide11.xml><?xml version="1.0" encoding="utf-8"?>
+<file path=ppt/slides/slide12.xml><?xml version="1.0" encoding="utf-8"?>
 <p:sld xmlns:a="http://schemas.openxmlformats.org/drawingml/2006/main" xmlns:r="http://schemas.openxmlformats.org/officeDocument/2006/relationships" xmlns:p="http://schemas.openxmlformats.org/presentationml/2006/main">
   <p:cSld>
     <p:spTree>
@@ -5337,6 +5432,130 @@
       </p:grpSpPr>
       <p:sp>
         <p:nvSpPr>
+          <p:cNvPr id="4" name="TextBox 3">
+            <a:extLst>
+              <a:ext uri="{FF2B5EF4-FFF2-40B4-BE49-F238E27FC236}">
+                <a16:creationId xmlns:a16="http://schemas.microsoft.com/office/drawing/2014/main" id="{DEA59F9A-2FCD-DE57-6598-1BE3D947B8DC}"/>
+              </a:ext>
+            </a:extLst>
+          </p:cNvPr>
+          <p:cNvSpPr txBox="1"/>
+          <p:nvPr/>
+        </p:nvSpPr>
+        <p:spPr>
+          <a:xfrm>
+            <a:off x="141777" y="0"/>
+            <a:ext cx="3153427" cy="704873"/>
+          </a:xfrm>
+          <a:prstGeom prst="rect">
+            <a:avLst/>
+          </a:prstGeom>
+          <a:noFill/>
+        </p:spPr>
+        <p:txBody>
+          <a:bodyPr wrap="none" rtlCol="0">
+            <a:spAutoFit/>
+          </a:bodyPr>
+          <a:lstStyle/>
+          <a:p>
+            <a:pPr latinLnBrk="0">
+              <a:lnSpc>
+                <a:spcPct val="160000"/>
+              </a:lnSpc>
+              <a:tabLst>
+                <a:tab pos="1630680" algn="l"/>
+              </a:tabLst>
+            </a:pPr>
+            <a:r>
+              <a:rPr lang="en-US" altLang="ko-KR" sz="2800" b="1" dirty="0">
+                <a:solidFill>
+                  <a:schemeClr val="bg1">
+                    <a:lumMod val="95000"/>
+                  </a:schemeClr>
+                </a:solidFill>
+                <a:effectLst/>
+                <a:latin typeface="+mj-lt"/>
+                <a:ea typeface="함초롬바탕" panose="02030504000101010101" pitchFamily="18" charset="-127"/>
+                <a:cs typeface="Times New Roman" panose="02020603050405020304" pitchFamily="18" charset="0"/>
+              </a:rPr>
+              <a:t>Project Managing</a:t>
+            </a:r>
+            <a:endParaRPr lang="ko-KR" altLang="ko-KR" sz="2800" dirty="0">
+              <a:solidFill>
+                <a:schemeClr val="bg1">
+                  <a:lumMod val="95000"/>
+                </a:schemeClr>
+              </a:solidFill>
+              <a:effectLst/>
+              <a:latin typeface="+mj-lt"/>
+              <a:ea typeface="함초롬바탕" panose="02030504000101010101" pitchFamily="18" charset="-127"/>
+              <a:cs typeface="굴림" panose="020B0600000101010101" pitchFamily="50" charset="-127"/>
+            </a:endParaRPr>
+          </a:p>
+        </p:txBody>
+      </p:sp>
+      <p:pic>
+        <p:nvPicPr>
+          <p:cNvPr id="3" name="그림 2">
+            <a:extLst>
+              <a:ext uri="{FF2B5EF4-FFF2-40B4-BE49-F238E27FC236}">
+                <a16:creationId xmlns:a16="http://schemas.microsoft.com/office/drawing/2014/main" id="{CEE01D52-A01B-5609-2946-E4FF140E3016}"/>
+              </a:ext>
+            </a:extLst>
+          </p:cNvPr>
+          <p:cNvPicPr>
+            <a:picLocks noChangeAspect="1"/>
+          </p:cNvPicPr>
+          <p:nvPr/>
+        </p:nvPicPr>
+        <p:blipFill>
+          <a:blip r:embed="rId2"/>
+          <a:stretch>
+            <a:fillRect/>
+          </a:stretch>
+        </p:blipFill>
+        <p:spPr>
+          <a:xfrm>
+            <a:off x="2545416" y="1794949"/>
+            <a:ext cx="7101167" cy="3268102"/>
+          </a:xfrm>
+          <a:prstGeom prst="rect">
+            <a:avLst/>
+          </a:prstGeom>
+        </p:spPr>
+      </p:pic>
+    </p:spTree>
+    <p:extLst>
+      <p:ext uri="{BB962C8B-B14F-4D97-AF65-F5344CB8AC3E}">
+        <p14:creationId xmlns:p14="http://schemas.microsoft.com/office/powerpoint/2010/main" val="691737116"/>
+      </p:ext>
+    </p:extLst>
+  </p:cSld>
+  <p:clrMapOvr>
+    <a:masterClrMapping/>
+  </p:clrMapOvr>
+</p:sld>
+</file>
+
+<file path=ppt/slides/slide4.xml><?xml version="1.0" encoding="utf-8"?>
+<p:sld xmlns:a="http://schemas.openxmlformats.org/drawingml/2006/main" xmlns:r="http://schemas.openxmlformats.org/officeDocument/2006/relationships" xmlns:p="http://schemas.openxmlformats.org/presentationml/2006/main">
+  <p:cSld>
+    <p:spTree>
+      <p:nvGrpSpPr>
+        <p:cNvPr id="1" name=""/>
+        <p:cNvGrpSpPr/>
+        <p:nvPr/>
+      </p:nvGrpSpPr>
+      <p:grpSpPr>
+        <a:xfrm>
+          <a:off x="0" y="0"/>
+          <a:ext cx="0" cy="0"/>
+          <a:chOff x="0" y="0"/>
+          <a:chExt cx="0" cy="0"/>
+        </a:xfrm>
+      </p:grpSpPr>
+      <p:sp>
+        <p:nvSpPr>
           <p:cNvPr id="3" name="TextBox 2">
             <a:extLst>
               <a:ext uri="{FF2B5EF4-FFF2-40B4-BE49-F238E27FC236}">
@@ -5412,7 +5631,7 @@
 </p:sld>
 </file>
 
-<file path=ppt/slides/slide4.xml><?xml version="1.0" encoding="utf-8"?>
+<file path=ppt/slides/slide5.xml><?xml version="1.0" encoding="utf-8"?>
 <p:sld xmlns:a="http://schemas.openxmlformats.org/drawingml/2006/main" xmlns:r="http://schemas.openxmlformats.org/officeDocument/2006/relationships" xmlns:p="http://schemas.openxmlformats.org/presentationml/2006/main">
   <p:cSld>
     <p:spTree>
@@ -6198,7 +6417,7 @@
 </p:sld>
 </file>
 
-<file path=ppt/slides/slide5.xml><?xml version="1.0" encoding="utf-8"?>
+<file path=ppt/slides/slide6.xml><?xml version="1.0" encoding="utf-8"?>
 <p:sld xmlns:a="http://schemas.openxmlformats.org/drawingml/2006/main" xmlns:r="http://schemas.openxmlformats.org/officeDocument/2006/relationships" xmlns:p="http://schemas.openxmlformats.org/presentationml/2006/main">
   <p:cSld>
     <p:spTree>
@@ -6422,7 +6641,7 @@
 </p:sld>
 </file>
 
-<file path=ppt/slides/slide6.xml><?xml version="1.0" encoding="utf-8"?>
+<file path=ppt/slides/slide7.xml><?xml version="1.0" encoding="utf-8"?>
 <p:sld xmlns:a="http://schemas.openxmlformats.org/drawingml/2006/main" xmlns:r="http://schemas.openxmlformats.org/officeDocument/2006/relationships" xmlns:p="http://schemas.openxmlformats.org/presentationml/2006/main">
   <p:cSld>
     <p:spTree>
@@ -6647,7 +6866,7 @@
 </p:sld>
 </file>
 
-<file path=ppt/slides/slide7.xml><?xml version="1.0" encoding="utf-8"?>
+<file path=ppt/slides/slide8.xml><?xml version="1.0" encoding="utf-8"?>
 <p:sld xmlns:a="http://schemas.openxmlformats.org/drawingml/2006/main" xmlns:r="http://schemas.openxmlformats.org/officeDocument/2006/relationships" xmlns:p="http://schemas.openxmlformats.org/presentationml/2006/main">
   <p:cSld>
     <p:spTree>
@@ -6862,407 +7081,6 @@
     <p:extLst>
       <p:ext uri="{BB962C8B-B14F-4D97-AF65-F5344CB8AC3E}">
         <p14:creationId xmlns:p14="http://schemas.microsoft.com/office/powerpoint/2010/main" val="1684936799"/>
-      </p:ext>
-    </p:extLst>
-  </p:cSld>
-  <p:clrMapOvr>
-    <a:masterClrMapping/>
-  </p:clrMapOvr>
-</p:sld>
-</file>
-
-<file path=ppt/slides/slide8.xml><?xml version="1.0" encoding="utf-8"?>
-<p:sld xmlns:a="http://schemas.openxmlformats.org/drawingml/2006/main" xmlns:r="http://schemas.openxmlformats.org/officeDocument/2006/relationships" xmlns:p="http://schemas.openxmlformats.org/presentationml/2006/main">
-  <p:cSld>
-    <p:spTree>
-      <p:nvGrpSpPr>
-        <p:cNvPr id="1" name=""/>
-        <p:cNvGrpSpPr/>
-        <p:nvPr/>
-      </p:nvGrpSpPr>
-      <p:grpSpPr>
-        <a:xfrm>
-          <a:off x="0" y="0"/>
-          <a:ext cx="0" cy="0"/>
-          <a:chOff x="0" y="0"/>
-          <a:chExt cx="0" cy="0"/>
-        </a:xfrm>
-      </p:grpSpPr>
-      <p:sp>
-        <p:nvSpPr>
-          <p:cNvPr id="4" name="TextBox 3">
-            <a:extLst>
-              <a:ext uri="{FF2B5EF4-FFF2-40B4-BE49-F238E27FC236}">
-                <a16:creationId xmlns:a16="http://schemas.microsoft.com/office/drawing/2014/main" id="{87EFD2A3-4EE1-C360-BDC0-24F7F1D8691C}"/>
-              </a:ext>
-            </a:extLst>
-          </p:cNvPr>
-          <p:cNvSpPr txBox="1"/>
-          <p:nvPr/>
-        </p:nvSpPr>
-        <p:spPr>
-          <a:xfrm>
-            <a:off x="116114" y="0"/>
-            <a:ext cx="2518638" cy="704873"/>
-          </a:xfrm>
-          <a:prstGeom prst="rect">
-            <a:avLst/>
-          </a:prstGeom>
-          <a:noFill/>
-        </p:spPr>
-        <p:txBody>
-          <a:bodyPr wrap="none" rtlCol="0">
-            <a:spAutoFit/>
-          </a:bodyPr>
-          <a:lstStyle/>
-          <a:p>
-            <a:pPr latinLnBrk="0">
-              <a:lnSpc>
-                <a:spcPct val="160000"/>
-              </a:lnSpc>
-              <a:tabLst>
-                <a:tab pos="1630680" algn="l"/>
-              </a:tabLst>
-            </a:pPr>
-            <a:r>
-              <a:rPr lang="en-US" altLang="ko-KR" sz="2800" dirty="0">
-                <a:solidFill>
-                  <a:schemeClr val="bg1">
-                    <a:lumMod val="95000"/>
-                  </a:schemeClr>
-                </a:solidFill>
-                <a:effectLst/>
-                <a:latin typeface="+mj-lt"/>
-                <a:ea typeface="함초롬바탕" panose="02030504000101010101" pitchFamily="18" charset="-127"/>
-                <a:cs typeface="굴림" panose="020B0600000101010101" pitchFamily="50" charset="-127"/>
-              </a:rPr>
-              <a:t>Build and Run</a:t>
-            </a:r>
-            <a:endParaRPr lang="ko-KR" altLang="ko-KR" sz="2800" dirty="0">
-              <a:solidFill>
-                <a:schemeClr val="bg1">
-                  <a:lumMod val="95000"/>
-                </a:schemeClr>
-              </a:solidFill>
-              <a:effectLst/>
-              <a:latin typeface="+mj-lt"/>
-              <a:ea typeface="함초롬바탕" panose="02030504000101010101" pitchFamily="18" charset="-127"/>
-              <a:cs typeface="굴림" panose="020B0600000101010101" pitchFamily="50" charset="-127"/>
-            </a:endParaRPr>
-          </a:p>
-        </p:txBody>
-      </p:sp>
-      <p:sp>
-        <p:nvSpPr>
-          <p:cNvPr id="5" name="TextBox 4">
-            <a:extLst>
-              <a:ext uri="{FF2B5EF4-FFF2-40B4-BE49-F238E27FC236}">
-                <a16:creationId xmlns:a16="http://schemas.microsoft.com/office/drawing/2014/main" id="{AC703704-3A1E-52D4-1600-CCE73D99FEFD}"/>
-              </a:ext>
-            </a:extLst>
-          </p:cNvPr>
-          <p:cNvSpPr txBox="1"/>
-          <p:nvPr/>
-        </p:nvSpPr>
-        <p:spPr>
-          <a:xfrm>
-            <a:off x="574055" y="2180896"/>
-            <a:ext cx="8353569" cy="3976923"/>
-          </a:xfrm>
-          <a:prstGeom prst="rect">
-            <a:avLst/>
-          </a:prstGeom>
-          <a:noFill/>
-        </p:spPr>
-        <p:txBody>
-          <a:bodyPr wrap="none" rtlCol="0">
-            <a:spAutoFit/>
-          </a:bodyPr>
-          <a:lstStyle/>
-          <a:p>
-            <a:pPr latinLnBrk="0">
-              <a:lnSpc>
-                <a:spcPct val="160000"/>
-              </a:lnSpc>
-              <a:tabLst>
-                <a:tab pos="1630680" algn="l"/>
-              </a:tabLst>
-            </a:pPr>
-            <a:r>
-              <a:rPr lang="en-US" altLang="ko-KR" sz="2000" dirty="0">
-                <a:solidFill>
-                  <a:schemeClr val="bg1">
-                    <a:lumMod val="95000"/>
-                  </a:schemeClr>
-                </a:solidFill>
-                <a:latin typeface="+mj-lt"/>
-                <a:ea typeface="함초롬바탕" panose="02030504000101010101" pitchFamily="18" charset="-127"/>
-                <a:cs typeface="굴림" panose="020B0600000101010101" pitchFamily="50" charset="-127"/>
-              </a:rPr>
-              <a:t># </a:t>
-            </a:r>
-            <a:r>
-              <a:rPr lang="en-US" altLang="ko-KR" sz="2000" dirty="0">
-                <a:solidFill>
-                  <a:schemeClr val="bg1">
-                    <a:lumMod val="95000"/>
-                  </a:schemeClr>
-                </a:solidFill>
-                <a:effectLst/>
-                <a:latin typeface="+mj-lt"/>
-                <a:ea typeface="함초롬바탕" panose="02030504000101010101" pitchFamily="18" charset="-127"/>
-                <a:cs typeface="굴림" panose="020B0600000101010101" pitchFamily="50" charset="-127"/>
-              </a:rPr>
-              <a:t>Build</a:t>
-            </a:r>
-          </a:p>
-          <a:p>
-            <a:pPr latinLnBrk="0">
-              <a:lnSpc>
-                <a:spcPct val="160000"/>
-              </a:lnSpc>
-              <a:tabLst>
-                <a:tab pos="1630680" algn="l"/>
-              </a:tabLst>
-            </a:pPr>
-            <a:r>
-              <a:rPr lang="en-US" altLang="ko-KR" sz="2000" dirty="0">
-                <a:solidFill>
-                  <a:schemeClr val="bg1">
-                    <a:lumMod val="95000"/>
-                  </a:schemeClr>
-                </a:solidFill>
-                <a:effectLst/>
-                <a:latin typeface="+mj-lt"/>
-                <a:ea typeface="함초롬바탕" panose="02030504000101010101" pitchFamily="18" charset="-127"/>
-                <a:cs typeface="굴림" panose="020B0600000101010101" pitchFamily="50" charset="-127"/>
-              </a:rPr>
-              <a:t>$ make</a:t>
-            </a:r>
-          </a:p>
-          <a:p>
-            <a:pPr latinLnBrk="0">
-              <a:lnSpc>
-                <a:spcPct val="160000"/>
-              </a:lnSpc>
-              <a:tabLst>
-                <a:tab pos="1630680" algn="l"/>
-              </a:tabLst>
-            </a:pPr>
-            <a:endParaRPr lang="en-US" altLang="ko-KR" sz="2000" dirty="0">
-              <a:solidFill>
-                <a:schemeClr val="bg1">
-                  <a:lumMod val="95000"/>
-                </a:schemeClr>
-              </a:solidFill>
-              <a:latin typeface="+mj-lt"/>
-              <a:ea typeface="함초롬바탕" panose="02030504000101010101" pitchFamily="18" charset="-127"/>
-              <a:cs typeface="굴림" panose="020B0600000101010101" pitchFamily="50" charset="-127"/>
-            </a:endParaRPr>
-          </a:p>
-          <a:p>
-            <a:pPr latinLnBrk="0">
-              <a:lnSpc>
-                <a:spcPct val="160000"/>
-              </a:lnSpc>
-              <a:tabLst>
-                <a:tab pos="1630680" algn="l"/>
-              </a:tabLst>
-            </a:pPr>
-            <a:r>
-              <a:rPr lang="en-US" altLang="ko-KR" sz="2000" dirty="0">
-                <a:solidFill>
-                  <a:schemeClr val="bg1">
-                    <a:lumMod val="95000"/>
-                  </a:schemeClr>
-                </a:solidFill>
-                <a:latin typeface="+mj-lt"/>
-                <a:ea typeface="함초롬바탕" panose="02030504000101010101" pitchFamily="18" charset="-127"/>
-                <a:cs typeface="굴림" panose="020B0600000101010101" pitchFamily="50" charset="-127"/>
-              </a:rPr>
-              <a:t># </a:t>
-            </a:r>
-            <a:r>
-              <a:rPr lang="en-US" altLang="ko-KR" sz="2000" dirty="0">
-                <a:solidFill>
-                  <a:schemeClr val="bg1">
-                    <a:lumMod val="95000"/>
-                  </a:schemeClr>
-                </a:solidFill>
-                <a:effectLst/>
-                <a:latin typeface="+mj-lt"/>
-                <a:ea typeface="함초롬바탕" panose="02030504000101010101" pitchFamily="18" charset="-127"/>
-                <a:cs typeface="굴림" panose="020B0600000101010101" pitchFamily="50" charset="-127"/>
-              </a:rPr>
-              <a:t>Test environment</a:t>
-            </a:r>
-          </a:p>
-          <a:p>
-            <a:pPr marL="342900" indent="-342900" latinLnBrk="0">
-              <a:lnSpc>
-                <a:spcPct val="160000"/>
-              </a:lnSpc>
-              <a:buFont typeface="Arial" panose="020B0604020202020204" pitchFamily="34" charset="0"/>
-              <a:buChar char="•"/>
-              <a:tabLst>
-                <a:tab pos="1630680" algn="l"/>
-              </a:tabLst>
-            </a:pPr>
-            <a:r>
-              <a:rPr lang="en-US" altLang="ko-KR" sz="2000" dirty="0">
-                <a:solidFill>
-                  <a:schemeClr val="bg1">
-                    <a:lumMod val="95000"/>
-                  </a:schemeClr>
-                </a:solidFill>
-                <a:effectLst/>
-                <a:latin typeface="+mj-lt"/>
-                <a:ea typeface="함초롬바탕" panose="02030504000101010101" pitchFamily="18" charset="-127"/>
-                <a:cs typeface="굴림" panose="020B0600000101010101" pitchFamily="50" charset="-127"/>
-              </a:rPr>
-              <a:t>macOS 14.0 arm64 (clang 15.0.0)</a:t>
-            </a:r>
-          </a:p>
-          <a:p>
-            <a:pPr marL="342900" indent="-342900" latinLnBrk="0">
-              <a:lnSpc>
-                <a:spcPct val="160000"/>
-              </a:lnSpc>
-              <a:buFont typeface="Arial" panose="020B0604020202020204" pitchFamily="34" charset="0"/>
-              <a:buChar char="•"/>
-              <a:tabLst>
-                <a:tab pos="1630680" algn="l"/>
-              </a:tabLst>
-            </a:pPr>
-            <a:r>
-              <a:rPr lang="en-US" altLang="ko-KR" sz="2000" dirty="0">
-                <a:solidFill>
-                  <a:schemeClr val="bg1">
-                    <a:lumMod val="95000"/>
-                  </a:schemeClr>
-                </a:solidFill>
-                <a:effectLst/>
-                <a:latin typeface="+mj-lt"/>
-                <a:ea typeface="함초롬바탕" panose="02030504000101010101" pitchFamily="18" charset="-127"/>
-                <a:cs typeface="굴림" panose="020B0600000101010101" pitchFamily="50" charset="-127"/>
-              </a:rPr>
-              <a:t>Debian GNU/Linux 11 aarch64 (g++ 10.2.1)</a:t>
-            </a:r>
-          </a:p>
-          <a:p>
-            <a:pPr marL="342900" indent="-342900" latinLnBrk="0">
-              <a:lnSpc>
-                <a:spcPct val="160000"/>
-              </a:lnSpc>
-              <a:buFont typeface="Arial" panose="020B0604020202020204" pitchFamily="34" charset="0"/>
-              <a:buChar char="•"/>
-              <a:tabLst>
-                <a:tab pos="1630680" algn="l"/>
-              </a:tabLst>
-            </a:pPr>
-            <a:r>
-              <a:rPr lang="en-US" altLang="ko-KR" sz="2000" dirty="0">
-                <a:solidFill>
-                  <a:schemeClr val="bg1">
-                    <a:lumMod val="95000"/>
-                  </a:schemeClr>
-                </a:solidFill>
-                <a:effectLst/>
-                <a:latin typeface="+mj-lt"/>
-                <a:ea typeface="함초롬바탕" panose="02030504000101010101" pitchFamily="18" charset="-127"/>
-                <a:cs typeface="굴림" panose="020B0600000101010101" pitchFamily="50" charset="-127"/>
-              </a:rPr>
-              <a:t>if you want to execute on macOS(using Intel CPU),</a:t>
-            </a:r>
-          </a:p>
-          <a:p>
-            <a:pPr marL="342900" indent="-342900" latinLnBrk="0">
-              <a:lnSpc>
-                <a:spcPct val="160000"/>
-              </a:lnSpc>
-              <a:buFont typeface="Arial" panose="020B0604020202020204" pitchFamily="34" charset="0"/>
-              <a:buChar char="•"/>
-              <a:tabLst>
-                <a:tab pos="1630680" algn="l"/>
-              </a:tabLst>
-            </a:pPr>
-            <a:r>
-              <a:rPr lang="en-US" altLang="ko-KR" sz="2000" dirty="0">
-                <a:solidFill>
-                  <a:schemeClr val="bg1">
-                    <a:lumMod val="95000"/>
-                  </a:schemeClr>
-                </a:solidFill>
-                <a:effectLst/>
-                <a:latin typeface="+mj-lt"/>
-                <a:ea typeface="함초롬바탕" panose="02030504000101010101" pitchFamily="18" charset="-127"/>
-                <a:cs typeface="굴림" panose="020B0600000101010101" pitchFamily="50" charset="-127"/>
-              </a:rPr>
-              <a:t>delete "-</a:t>
-            </a:r>
-            <a:r>
-              <a:rPr lang="en-US" altLang="ko-KR" sz="2000" dirty="0" err="1">
-                <a:solidFill>
-                  <a:schemeClr val="bg1">
-                    <a:lumMod val="95000"/>
-                  </a:schemeClr>
-                </a:solidFill>
-                <a:effectLst/>
-                <a:latin typeface="+mj-lt"/>
-                <a:ea typeface="함초롬바탕" panose="02030504000101010101" pitchFamily="18" charset="-127"/>
-                <a:cs typeface="굴림" panose="020B0600000101010101" pitchFamily="50" charset="-127"/>
-              </a:rPr>
-              <a:t>fsanitize</a:t>
-            </a:r>
-            <a:r>
-              <a:rPr lang="en-US" altLang="ko-KR" sz="2000" dirty="0">
-                <a:solidFill>
-                  <a:schemeClr val="bg1">
-                    <a:lumMod val="95000"/>
-                  </a:schemeClr>
-                </a:solidFill>
-                <a:effectLst/>
-                <a:latin typeface="+mj-lt"/>
-                <a:ea typeface="함초롬바탕" panose="02030504000101010101" pitchFamily="18" charset="-127"/>
-                <a:cs typeface="굴림" panose="020B0600000101010101" pitchFamily="50" charset="-127"/>
-              </a:rPr>
-              <a:t>=address -g3" of (</a:t>
-            </a:r>
-            <a:r>
-              <a:rPr lang="en-US" altLang="ko-KR" sz="2000" dirty="0" err="1">
-                <a:solidFill>
-                  <a:schemeClr val="bg1">
-                    <a:lumMod val="95000"/>
-                  </a:schemeClr>
-                </a:solidFill>
-                <a:effectLst/>
-                <a:latin typeface="+mj-lt"/>
-                <a:ea typeface="함초롬바탕" panose="02030504000101010101" pitchFamily="18" charset="-127"/>
-                <a:cs typeface="굴림" panose="020B0600000101010101" pitchFamily="50" charset="-127"/>
-              </a:rPr>
-              <a:t>Makefile</a:t>
-            </a:r>
-            <a:r>
-              <a:rPr lang="en-US" altLang="ko-KR" sz="2000" dirty="0">
-                <a:solidFill>
-                  <a:schemeClr val="bg1">
-                    <a:lumMod val="95000"/>
-                  </a:schemeClr>
-                </a:solidFill>
-                <a:effectLst/>
-                <a:latin typeface="+mj-lt"/>
-                <a:ea typeface="함초롬바탕" panose="02030504000101010101" pitchFamily="18" charset="-127"/>
-                <a:cs typeface="굴림" panose="020B0600000101010101" pitchFamily="50" charset="-127"/>
-              </a:rPr>
-              <a:t> - CFLAG option) </a:t>
-            </a:r>
-          </a:p>
-        </p:txBody>
-      </p:sp>
-    </p:spTree>
-    <p:extLst>
-      <p:ext uri="{BB962C8B-B14F-4D97-AF65-F5344CB8AC3E}">
-        <p14:creationId xmlns:p14="http://schemas.microsoft.com/office/powerpoint/2010/main" val="2413034989"/>
       </p:ext>
     </p:extLst>
   </p:cSld>
@@ -7294,7 +7112,7 @@
           <p:cNvPr id="4" name="TextBox 3">
             <a:extLst>
               <a:ext uri="{FF2B5EF4-FFF2-40B4-BE49-F238E27FC236}">
-                <a16:creationId xmlns:a16="http://schemas.microsoft.com/office/drawing/2014/main" id="{BD6C7EE5-6F25-1E72-0204-44384DD90E8E}"/>
+                <a16:creationId xmlns:a16="http://schemas.microsoft.com/office/drawing/2014/main" id="{87EFD2A3-4EE1-C360-BDC0-24F7F1D8691C}"/>
               </a:ext>
             </a:extLst>
           </p:cNvPr>
@@ -7303,8 +7121,8 @@
         </p:nvSpPr>
         <p:spPr>
           <a:xfrm>
-            <a:off x="4208303" y="3076563"/>
-            <a:ext cx="3775393" cy="704873"/>
+            <a:off x="116114" y="0"/>
+            <a:ext cx="2518638" cy="704873"/>
           </a:xfrm>
           <a:prstGeom prst="rect">
             <a:avLst/>
@@ -7317,7 +7135,7 @@
           </a:bodyPr>
           <a:lstStyle/>
           <a:p>
-            <a:pPr algn="ctr" latinLnBrk="0">
+            <a:pPr latinLnBrk="0">
               <a:lnSpc>
                 <a:spcPct val="160000"/>
               </a:lnSpc>
@@ -7337,7 +7155,7 @@
                 <a:ea typeface="함초롬바탕" panose="02030504000101010101" pitchFamily="18" charset="-127"/>
                 <a:cs typeface="굴림" panose="020B0600000101010101" pitchFamily="50" charset="-127"/>
               </a:rPr>
-              <a:t>Code Review and Demo</a:t>
+              <a:t>Build and Run</a:t>
             </a:r>
             <a:endParaRPr lang="ko-KR" altLang="ko-KR" sz="2800" dirty="0">
               <a:solidFill>
@@ -7353,10 +7171,317 @@
           </a:p>
         </p:txBody>
       </p:sp>
+      <p:sp>
+        <p:nvSpPr>
+          <p:cNvPr id="5" name="TextBox 4">
+            <a:extLst>
+              <a:ext uri="{FF2B5EF4-FFF2-40B4-BE49-F238E27FC236}">
+                <a16:creationId xmlns:a16="http://schemas.microsoft.com/office/drawing/2014/main" id="{AC703704-3A1E-52D4-1600-CCE73D99FEFD}"/>
+              </a:ext>
+            </a:extLst>
+          </p:cNvPr>
+          <p:cNvSpPr txBox="1"/>
+          <p:nvPr/>
+        </p:nvSpPr>
+        <p:spPr>
+          <a:xfrm>
+            <a:off x="574055" y="2180896"/>
+            <a:ext cx="8353569" cy="3976923"/>
+          </a:xfrm>
+          <a:prstGeom prst="rect">
+            <a:avLst/>
+          </a:prstGeom>
+          <a:noFill/>
+        </p:spPr>
+        <p:txBody>
+          <a:bodyPr wrap="none" rtlCol="0">
+            <a:spAutoFit/>
+          </a:bodyPr>
+          <a:lstStyle/>
+          <a:p>
+            <a:pPr latinLnBrk="0">
+              <a:lnSpc>
+                <a:spcPct val="160000"/>
+              </a:lnSpc>
+              <a:tabLst>
+                <a:tab pos="1630680" algn="l"/>
+              </a:tabLst>
+            </a:pPr>
+            <a:r>
+              <a:rPr lang="en-US" altLang="ko-KR" sz="2000" dirty="0">
+                <a:solidFill>
+                  <a:schemeClr val="bg1">
+                    <a:lumMod val="95000"/>
+                  </a:schemeClr>
+                </a:solidFill>
+                <a:latin typeface="+mj-lt"/>
+                <a:ea typeface="함초롬바탕" panose="02030504000101010101" pitchFamily="18" charset="-127"/>
+                <a:cs typeface="굴림" panose="020B0600000101010101" pitchFamily="50" charset="-127"/>
+              </a:rPr>
+              <a:t># </a:t>
+            </a:r>
+            <a:r>
+              <a:rPr lang="en-US" altLang="ko-KR" sz="2000" dirty="0">
+                <a:solidFill>
+                  <a:schemeClr val="bg1">
+                    <a:lumMod val="95000"/>
+                  </a:schemeClr>
+                </a:solidFill>
+                <a:effectLst/>
+                <a:latin typeface="+mj-lt"/>
+                <a:ea typeface="함초롬바탕" panose="02030504000101010101" pitchFamily="18" charset="-127"/>
+                <a:cs typeface="굴림" panose="020B0600000101010101" pitchFamily="50" charset="-127"/>
+              </a:rPr>
+              <a:t>Build</a:t>
+            </a:r>
+          </a:p>
+          <a:p>
+            <a:pPr latinLnBrk="0">
+              <a:lnSpc>
+                <a:spcPct val="160000"/>
+              </a:lnSpc>
+              <a:tabLst>
+                <a:tab pos="1630680" algn="l"/>
+              </a:tabLst>
+            </a:pPr>
+            <a:r>
+              <a:rPr lang="en-US" altLang="ko-KR" sz="2000" dirty="0">
+                <a:solidFill>
+                  <a:schemeClr val="bg1">
+                    <a:lumMod val="95000"/>
+                  </a:schemeClr>
+                </a:solidFill>
+                <a:effectLst/>
+                <a:latin typeface="+mj-lt"/>
+                <a:ea typeface="함초롬바탕" panose="02030504000101010101" pitchFamily="18" charset="-127"/>
+                <a:cs typeface="굴림" panose="020B0600000101010101" pitchFamily="50" charset="-127"/>
+              </a:rPr>
+              <a:t>$ make</a:t>
+            </a:r>
+          </a:p>
+          <a:p>
+            <a:pPr latinLnBrk="0">
+              <a:lnSpc>
+                <a:spcPct val="160000"/>
+              </a:lnSpc>
+              <a:tabLst>
+                <a:tab pos="1630680" algn="l"/>
+              </a:tabLst>
+            </a:pPr>
+            <a:endParaRPr lang="en-US" altLang="ko-KR" sz="2000" dirty="0">
+              <a:solidFill>
+                <a:schemeClr val="bg1">
+                  <a:lumMod val="95000"/>
+                </a:schemeClr>
+              </a:solidFill>
+              <a:latin typeface="+mj-lt"/>
+              <a:ea typeface="함초롬바탕" panose="02030504000101010101" pitchFamily="18" charset="-127"/>
+              <a:cs typeface="굴림" panose="020B0600000101010101" pitchFamily="50" charset="-127"/>
+            </a:endParaRPr>
+          </a:p>
+          <a:p>
+            <a:pPr latinLnBrk="0">
+              <a:lnSpc>
+                <a:spcPct val="160000"/>
+              </a:lnSpc>
+              <a:tabLst>
+                <a:tab pos="1630680" algn="l"/>
+              </a:tabLst>
+            </a:pPr>
+            <a:r>
+              <a:rPr lang="en-US" altLang="ko-KR" sz="2000" dirty="0">
+                <a:solidFill>
+                  <a:schemeClr val="bg1">
+                    <a:lumMod val="95000"/>
+                  </a:schemeClr>
+                </a:solidFill>
+                <a:latin typeface="+mj-lt"/>
+                <a:ea typeface="함초롬바탕" panose="02030504000101010101" pitchFamily="18" charset="-127"/>
+                <a:cs typeface="굴림" panose="020B0600000101010101" pitchFamily="50" charset="-127"/>
+              </a:rPr>
+              <a:t># </a:t>
+            </a:r>
+            <a:r>
+              <a:rPr lang="en-US" altLang="ko-KR" sz="2000" dirty="0">
+                <a:solidFill>
+                  <a:schemeClr val="bg1">
+                    <a:lumMod val="95000"/>
+                  </a:schemeClr>
+                </a:solidFill>
+                <a:effectLst/>
+                <a:latin typeface="+mj-lt"/>
+                <a:ea typeface="함초롬바탕" panose="02030504000101010101" pitchFamily="18" charset="-127"/>
+                <a:cs typeface="굴림" panose="020B0600000101010101" pitchFamily="50" charset="-127"/>
+              </a:rPr>
+              <a:t>Test environment</a:t>
+            </a:r>
+          </a:p>
+          <a:p>
+            <a:pPr marL="342900" indent="-342900" latinLnBrk="0">
+              <a:lnSpc>
+                <a:spcPct val="160000"/>
+              </a:lnSpc>
+              <a:buFont typeface="Arial" panose="020B0604020202020204" pitchFamily="34" charset="0"/>
+              <a:buChar char="•"/>
+              <a:tabLst>
+                <a:tab pos="1630680" algn="l"/>
+              </a:tabLst>
+            </a:pPr>
+            <a:r>
+              <a:rPr lang="en-US" altLang="ko-KR" sz="2000" dirty="0">
+                <a:solidFill>
+                  <a:schemeClr val="bg1">
+                    <a:lumMod val="95000"/>
+                  </a:schemeClr>
+                </a:solidFill>
+                <a:effectLst/>
+                <a:latin typeface="+mj-lt"/>
+                <a:ea typeface="함초롬바탕" panose="02030504000101010101" pitchFamily="18" charset="-127"/>
+                <a:cs typeface="굴림" panose="020B0600000101010101" pitchFamily="50" charset="-127"/>
+              </a:rPr>
+              <a:t>macOS 14.0 arm64 (clang 15.0.0)</a:t>
+            </a:r>
+          </a:p>
+          <a:p>
+            <a:pPr marL="342900" indent="-342900" latinLnBrk="0">
+              <a:lnSpc>
+                <a:spcPct val="160000"/>
+              </a:lnSpc>
+              <a:buFont typeface="Arial" panose="020B0604020202020204" pitchFamily="34" charset="0"/>
+              <a:buChar char="•"/>
+              <a:tabLst>
+                <a:tab pos="1630680" algn="l"/>
+              </a:tabLst>
+            </a:pPr>
+            <a:r>
+              <a:rPr lang="en-US" altLang="ko-KR" sz="2000" dirty="0">
+                <a:solidFill>
+                  <a:schemeClr val="bg1">
+                    <a:lumMod val="95000"/>
+                  </a:schemeClr>
+                </a:solidFill>
+                <a:effectLst/>
+                <a:latin typeface="+mj-lt"/>
+                <a:ea typeface="함초롬바탕" panose="02030504000101010101" pitchFamily="18" charset="-127"/>
+                <a:cs typeface="굴림" panose="020B0600000101010101" pitchFamily="50" charset="-127"/>
+              </a:rPr>
+              <a:t>Debian GNU/Linux 11 aarch64 (g++ 10.2.1)</a:t>
+            </a:r>
+          </a:p>
+          <a:p>
+            <a:pPr marL="342900" indent="-342900" latinLnBrk="0">
+              <a:lnSpc>
+                <a:spcPct val="160000"/>
+              </a:lnSpc>
+              <a:buFont typeface="Arial" panose="020B0604020202020204" pitchFamily="34" charset="0"/>
+              <a:buChar char="•"/>
+              <a:tabLst>
+                <a:tab pos="1630680" algn="l"/>
+              </a:tabLst>
+            </a:pPr>
+            <a:r>
+              <a:rPr lang="en-US" altLang="ko-KR" sz="2000" dirty="0">
+                <a:solidFill>
+                  <a:schemeClr val="bg1">
+                    <a:lumMod val="95000"/>
+                  </a:schemeClr>
+                </a:solidFill>
+                <a:effectLst/>
+                <a:latin typeface="+mj-lt"/>
+                <a:ea typeface="함초롬바탕" panose="02030504000101010101" pitchFamily="18" charset="-127"/>
+                <a:cs typeface="굴림" panose="020B0600000101010101" pitchFamily="50" charset="-127"/>
+              </a:rPr>
+              <a:t>if you want to execute on macOS(using Intel CPU),</a:t>
+            </a:r>
+          </a:p>
+          <a:p>
+            <a:pPr marL="342900" indent="-342900" latinLnBrk="0">
+              <a:lnSpc>
+                <a:spcPct val="160000"/>
+              </a:lnSpc>
+              <a:buFont typeface="Arial" panose="020B0604020202020204" pitchFamily="34" charset="0"/>
+              <a:buChar char="•"/>
+              <a:tabLst>
+                <a:tab pos="1630680" algn="l"/>
+              </a:tabLst>
+            </a:pPr>
+            <a:r>
+              <a:rPr lang="en-US" altLang="ko-KR" sz="2000" dirty="0">
+                <a:solidFill>
+                  <a:schemeClr val="bg1">
+                    <a:lumMod val="95000"/>
+                  </a:schemeClr>
+                </a:solidFill>
+                <a:effectLst/>
+                <a:latin typeface="+mj-lt"/>
+                <a:ea typeface="함초롬바탕" panose="02030504000101010101" pitchFamily="18" charset="-127"/>
+                <a:cs typeface="굴림" panose="020B0600000101010101" pitchFamily="50" charset="-127"/>
+              </a:rPr>
+              <a:t>delete "-</a:t>
+            </a:r>
+            <a:r>
+              <a:rPr lang="en-US" altLang="ko-KR" sz="2000" dirty="0" err="1">
+                <a:solidFill>
+                  <a:schemeClr val="bg1">
+                    <a:lumMod val="95000"/>
+                  </a:schemeClr>
+                </a:solidFill>
+                <a:effectLst/>
+                <a:latin typeface="+mj-lt"/>
+                <a:ea typeface="함초롬바탕" panose="02030504000101010101" pitchFamily="18" charset="-127"/>
+                <a:cs typeface="굴림" panose="020B0600000101010101" pitchFamily="50" charset="-127"/>
+              </a:rPr>
+              <a:t>fsanitize</a:t>
+            </a:r>
+            <a:r>
+              <a:rPr lang="en-US" altLang="ko-KR" sz="2000" dirty="0">
+                <a:solidFill>
+                  <a:schemeClr val="bg1">
+                    <a:lumMod val="95000"/>
+                  </a:schemeClr>
+                </a:solidFill>
+                <a:effectLst/>
+                <a:latin typeface="+mj-lt"/>
+                <a:ea typeface="함초롬바탕" panose="02030504000101010101" pitchFamily="18" charset="-127"/>
+                <a:cs typeface="굴림" panose="020B0600000101010101" pitchFamily="50" charset="-127"/>
+              </a:rPr>
+              <a:t>=address -g3" of (</a:t>
+            </a:r>
+            <a:r>
+              <a:rPr lang="en-US" altLang="ko-KR" sz="2000" dirty="0" err="1">
+                <a:solidFill>
+                  <a:schemeClr val="bg1">
+                    <a:lumMod val="95000"/>
+                  </a:schemeClr>
+                </a:solidFill>
+                <a:effectLst/>
+                <a:latin typeface="+mj-lt"/>
+                <a:ea typeface="함초롬바탕" panose="02030504000101010101" pitchFamily="18" charset="-127"/>
+                <a:cs typeface="굴림" panose="020B0600000101010101" pitchFamily="50" charset="-127"/>
+              </a:rPr>
+              <a:t>Makefile</a:t>
+            </a:r>
+            <a:r>
+              <a:rPr lang="en-US" altLang="ko-KR" sz="2000" dirty="0">
+                <a:solidFill>
+                  <a:schemeClr val="bg1">
+                    <a:lumMod val="95000"/>
+                  </a:schemeClr>
+                </a:solidFill>
+                <a:effectLst/>
+                <a:latin typeface="+mj-lt"/>
+                <a:ea typeface="함초롬바탕" panose="02030504000101010101" pitchFamily="18" charset="-127"/>
+                <a:cs typeface="굴림" panose="020B0600000101010101" pitchFamily="50" charset="-127"/>
+              </a:rPr>
+              <a:t> - CFLAG option) </a:t>
+            </a:r>
+          </a:p>
+        </p:txBody>
+      </p:sp>
     </p:spTree>
     <p:extLst>
       <p:ext uri="{BB962C8B-B14F-4D97-AF65-F5344CB8AC3E}">
-        <p14:creationId xmlns:p14="http://schemas.microsoft.com/office/powerpoint/2010/main" val="1044177494"/>
+        <p14:creationId xmlns:p14="http://schemas.microsoft.com/office/powerpoint/2010/main" val="2413034989"/>
       </p:ext>
     </p:extLst>
   </p:cSld>

</xml_diff>

<commit_message>
feat: add class UML
</commit_message>
<xml_diff>
--- a/OOP_Project02_Team07.pptx
+++ b/OOP_Project02_Team07.pptx
@@ -5618,6 +5618,36 @@
           </a:p>
         </p:txBody>
       </p:sp>
+      <p:pic>
+        <p:nvPicPr>
+          <p:cNvPr id="4" name="그림 3">
+            <a:extLst>
+              <a:ext uri="{FF2B5EF4-FFF2-40B4-BE49-F238E27FC236}">
+                <a16:creationId xmlns:a16="http://schemas.microsoft.com/office/drawing/2014/main" id="{9DA7D3A3-A2D0-2291-F0B5-B49F08BB1795}"/>
+              </a:ext>
+            </a:extLst>
+          </p:cNvPr>
+          <p:cNvPicPr>
+            <a:picLocks noChangeAspect="1"/>
+          </p:cNvPicPr>
+          <p:nvPr/>
+        </p:nvPicPr>
+        <p:blipFill>
+          <a:blip r:embed="rId2"/>
+          <a:stretch>
+            <a:fillRect/>
+          </a:stretch>
+        </p:blipFill>
+        <p:spPr>
+          <a:xfrm>
+            <a:off x="4195441" y="800100"/>
+            <a:ext cx="4037895" cy="5509260"/>
+          </a:xfrm>
+          <a:prstGeom prst="rect">
+            <a:avLst/>
+          </a:prstGeom>
+        </p:spPr>
+      </p:pic>
     </p:spTree>
     <p:extLst>
       <p:ext uri="{BB962C8B-B14F-4D97-AF65-F5344CB8AC3E}">

</xml_diff>